<commit_message>
NVIS-1304 PPTX generation from page builder
 - update to include notes correctly
 - reference media files correctly
</commit_message>
<xml_diff>
--- a/samples/pptx/test-output.pptx
+++ b/samples/pptx/test-output.pptx
@@ -5,6 +5,9 @@
     <p:sldMasterId id="2147483648" r:id="rId1"/>
     <p:sldMasterId id="2147483660" r:id="rId9999"/>
   </p:sldMasterIdLst>
+  <p:notesMasterIdLst>
+    <p:notesMasterId r:id="rId99999"/>
+  </p:notesMasterIdLst>
   <p:sldIdLst>
     <p:sldId id="256" r:id="rId6"/>
     <p:sldId id="257" r:id="rId7"/>
@@ -3148,6 +3151,953 @@
   </c:txPr>
   <c:externalData r:id="rId1"/>
 </c:chartSpace>
+</file>
+
+<file path=ppt/notesMasters/notesMaster1.xml><?xml version="1.0" encoding="utf-8"?>
+<p:notesMaster xmlns:a="http://schemas.openxmlformats.org/drawingml/2006/main" xmlns:r="http://schemas.openxmlformats.org/officeDocument/2006/relationships" xmlns:p="http://schemas.openxmlformats.org/presentationml/2006/main">
+  <p:cSld>
+    <p:bg>
+      <p:bgRef idx="1001">
+        <a:schemeClr val="bg1"/>
+      </p:bgRef>
+    </p:bg>
+    <p:spTree>
+      <p:nvGrpSpPr>
+        <p:cNvPr id="1" name=""/>
+        <p:cNvGrpSpPr/>
+        <p:nvPr/>
+      </p:nvGrpSpPr>
+      <p:grpSpPr>
+        <a:xfrm>
+          <a:off x="0" y="0"/>
+          <a:ext cx="0" cy="0"/>
+          <a:chOff x="0" y="0"/>
+          <a:chExt cx="0" cy="0"/>
+        </a:xfrm>
+      </p:grpSpPr>
+      <p:sp>
+        <p:nvSpPr>
+          <p:cNvPr id="2" name="Header Placeholder 1"/>
+          <p:cNvSpPr>
+            <a:spLocks noGrp="1"/>
+          </p:cNvSpPr>
+          <p:nvPr>
+            <p:ph type="hdr" sz="quarter"/>
+          </p:nvPr>
+        </p:nvSpPr>
+        <p:spPr>
+          <a:xfrm>
+            <a:off x="0" y="0"/>
+            <a:ext cx="2971800" cy="457200"/>
+          </a:xfrm>
+          <a:prstGeom prst="rect">
+            <a:avLst/>
+          </a:prstGeom>
+        </p:spPr>
+        <p:txBody>
+          <a:bodyPr vert="horz" lIns="91440" tIns="45720" rIns="91440" bIns="45720" rtlCol="0"/>
+          <a:lstStyle>
+            <a:lvl1pPr algn="l">
+              <a:defRPr sz="1200"/>
+            </a:lvl1pPr>
+          </a:lstStyle>
+          <a:p>
+            <a:endParaRPr lang="en-GB"/>
+          </a:p>
+        </p:txBody>
+      </p:sp>
+      <p:sp>
+        <p:nvSpPr>
+          <p:cNvPr id="3" name="Date Placeholder 2"/>
+          <p:cNvSpPr>
+            <a:spLocks noGrp="1"/>
+          </p:cNvSpPr>
+          <p:nvPr>
+            <p:ph type="dt" idx="1"/>
+          </p:nvPr>
+        </p:nvSpPr>
+        <p:spPr>
+          <a:xfrm>
+            <a:off x="3884613" y="0"/>
+            <a:ext cx="2971800" cy="457200"/>
+          </a:xfrm>
+          <a:prstGeom prst="rect">
+            <a:avLst/>
+          </a:prstGeom>
+        </p:spPr>
+        <p:txBody>
+          <a:bodyPr vert="horz" lIns="91440" tIns="45720" rIns="91440" bIns="45720" rtlCol="0"/>
+          <a:lstStyle>
+            <a:lvl1pPr algn="r">
+              <a:defRPr sz="1200"/>
+            </a:lvl1pPr>
+          </a:lstStyle>
+          <a:p>
+            <a:fld id="{60C5795E-B05D-4AED-B95B-280A47CACD51}" type="datetimeFigureOut">
+              <a:rPr lang="en-GB" smtClean="0"/>
+              <a:t>23/11/2015</a:t>
+            </a:fld>
+            <a:endParaRPr lang="en-GB"/>
+          </a:p>
+        </p:txBody>
+      </p:sp>
+      <p:sp>
+        <p:nvSpPr>
+          <p:cNvPr id="4" name="Slide Image Placeholder 3"/>
+          <p:cNvSpPr>
+            <a:spLocks noGrp="1" noRot="1" noChangeAspect="1"/>
+          </p:cNvSpPr>
+          <p:nvPr>
+            <p:ph type="sldImg" idx="2"/>
+          </p:nvPr>
+        </p:nvSpPr>
+        <p:spPr>
+          <a:xfrm>
+            <a:off x="1143000" y="685800"/>
+            <a:ext cx="4572000" cy="3429000"/>
+          </a:xfrm>
+          <a:prstGeom prst="rect">
+            <a:avLst/>
+          </a:prstGeom>
+          <a:noFill/>
+          <a:ln w="12700">
+            <a:solidFill>
+              <a:prstClr val="black"/>
+            </a:solidFill>
+          </a:ln>
+        </p:spPr>
+        <p:txBody>
+          <a:bodyPr vert="horz" lIns="91440" tIns="45720" rIns="91440" bIns="45720" rtlCol="0" anchor="ctr"/>
+          <a:lstStyle/>
+          <a:p>
+            <a:endParaRPr lang="en-GB"/>
+          </a:p>
+        </p:txBody>
+      </p:sp>
+      <p:sp>
+        <p:nvSpPr>
+          <p:cNvPr id="5" name="Notes Placeholder 4"/>
+          <p:cNvSpPr>
+            <a:spLocks noGrp="1"/>
+          </p:cNvSpPr>
+          <p:nvPr>
+            <p:ph type="body" sz="quarter" idx="3"/>
+          </p:nvPr>
+        </p:nvSpPr>
+        <p:spPr>
+          <a:xfrm>
+            <a:off x="685800" y="4343400"/>
+            <a:ext cx="5486400" cy="4114800"/>
+          </a:xfrm>
+          <a:prstGeom prst="rect">
+            <a:avLst/>
+          </a:prstGeom>
+        </p:spPr>
+        <p:txBody>
+          <a:bodyPr vert="horz" lIns="91440" tIns="45720" rIns="91440" bIns="45720" rtlCol="0">
+            <a:normAutofit/>
+          </a:bodyPr>
+          <a:lstStyle/>
+          <a:p>
+            <a:pPr lvl="0"/>
+            <a:r>
+              <a:rPr lang="en-US" smtClean="0"/>
+              <a:t>Click to edit Master text styles</a:t>
+            </a:r>
+          </a:p>
+          <a:p>
+            <a:pPr lvl="1"/>
+            <a:r>
+              <a:rPr lang="en-US" smtClean="0"/>
+              <a:t>Second level</a:t>
+            </a:r>
+          </a:p>
+          <a:p>
+            <a:pPr lvl="2"/>
+            <a:r>
+              <a:rPr lang="en-US" smtClean="0"/>
+              <a:t>Third level</a:t>
+            </a:r>
+          </a:p>
+          <a:p>
+            <a:pPr lvl="3"/>
+            <a:r>
+              <a:rPr lang="en-US" smtClean="0"/>
+              <a:t>Fourth level</a:t>
+            </a:r>
+          </a:p>
+          <a:p>
+            <a:pPr lvl="4"/>
+            <a:r>
+              <a:rPr lang="en-US" smtClean="0"/>
+              <a:t>Fifth level</a:t>
+            </a:r>
+            <a:endParaRPr lang="en-GB"/>
+          </a:p>
+        </p:txBody>
+      </p:sp>
+      <p:sp>
+        <p:nvSpPr>
+          <p:cNvPr id="6" name="Footer Placeholder 5"/>
+          <p:cNvSpPr>
+            <a:spLocks noGrp="1"/>
+          </p:cNvSpPr>
+          <p:nvPr>
+            <p:ph type="ftr" sz="quarter" idx="4"/>
+          </p:nvPr>
+        </p:nvSpPr>
+        <p:spPr>
+          <a:xfrm>
+            <a:off x="0" y="8685213"/>
+            <a:ext cx="2971800" cy="457200"/>
+          </a:xfrm>
+          <a:prstGeom prst="rect">
+            <a:avLst/>
+          </a:prstGeom>
+        </p:spPr>
+        <p:txBody>
+          <a:bodyPr vert="horz" lIns="91440" tIns="45720" rIns="91440" bIns="45720" rtlCol="0" anchor="b"/>
+          <a:lstStyle>
+            <a:lvl1pPr algn="l">
+              <a:defRPr sz="1200"/>
+            </a:lvl1pPr>
+          </a:lstStyle>
+          <a:p>
+            <a:endParaRPr lang="en-GB"/>
+          </a:p>
+        </p:txBody>
+      </p:sp>
+      <p:sp>
+        <p:nvSpPr>
+          <p:cNvPr id="7" name="Slide Number Placeholder 6"/>
+          <p:cNvSpPr>
+            <a:spLocks noGrp="1"/>
+          </p:cNvSpPr>
+          <p:nvPr>
+            <p:ph type="sldNum" sz="quarter" idx="5"/>
+          </p:nvPr>
+        </p:nvSpPr>
+        <p:spPr>
+          <a:xfrm>
+            <a:off x="3884613" y="8685213"/>
+            <a:ext cx="2971800" cy="457200"/>
+          </a:xfrm>
+          <a:prstGeom prst="rect">
+            <a:avLst/>
+          </a:prstGeom>
+        </p:spPr>
+        <p:txBody>
+          <a:bodyPr vert="horz" lIns="91440" tIns="45720" rIns="91440" bIns="45720" rtlCol="0" anchor="b"/>
+          <a:lstStyle>
+            <a:lvl1pPr algn="r">
+              <a:defRPr sz="1200"/>
+            </a:lvl1pPr>
+          </a:lstStyle>
+          <a:p>
+            <a:fld id="{53A4B6B3-EDD5-4A07-9C02-78FA354A0153}" type="slidenum">
+              <a:rPr lang="en-GB" smtClean="0"/>
+              <a:t>‹#›</a:t>
+            </a:fld>
+            <a:endParaRPr lang="en-GB"/>
+          </a:p>
+        </p:txBody>
+      </p:sp>
+    </p:spTree>
+  </p:cSld>
+  <p:clrMap bg1="lt1" tx1="dk1" bg2="lt2" tx2="dk2" accent1="accent1" accent2="accent2" accent3="accent3" accent4="accent4" accent5="accent5" accent6="accent6" hlink="hlink" folHlink="folHlink"/>
+  <p:notesStyle>
+    <a:lvl1pPr marL="0" algn="l" defTabSz="914400" rtl="0" eaLnBrk="1" latinLnBrk="0" hangingPunct="1">
+      <a:defRPr sz="1200" kern="1200">
+        <a:solidFill>
+          <a:schemeClr val="tx1"/>
+        </a:solidFill>
+        <a:latin typeface="+mn-lt"/>
+        <a:ea typeface="+mn-ea"/>
+        <a:cs typeface="+mn-cs"/>
+      </a:defRPr>
+    </a:lvl1pPr>
+    <a:lvl2pPr marL="457200" algn="l" defTabSz="914400" rtl="0" eaLnBrk="1" latinLnBrk="0" hangingPunct="1">
+      <a:defRPr sz="1200" kern="1200">
+        <a:solidFill>
+          <a:schemeClr val="tx1"/>
+        </a:solidFill>
+        <a:latin typeface="+mn-lt"/>
+        <a:ea typeface="+mn-ea"/>
+        <a:cs typeface="+mn-cs"/>
+      </a:defRPr>
+    </a:lvl2pPr>
+    <a:lvl3pPr marL="914400" algn="l" defTabSz="914400" rtl="0" eaLnBrk="1" latinLnBrk="0" hangingPunct="1">
+      <a:defRPr sz="1200" kern="1200">
+        <a:solidFill>
+          <a:schemeClr val="tx1"/>
+        </a:solidFill>
+        <a:latin typeface="+mn-lt"/>
+        <a:ea typeface="+mn-ea"/>
+        <a:cs typeface="+mn-cs"/>
+      </a:defRPr>
+    </a:lvl3pPr>
+    <a:lvl4pPr marL="1371600" algn="l" defTabSz="914400" rtl="0" eaLnBrk="1" latinLnBrk="0" hangingPunct="1">
+      <a:defRPr sz="1200" kern="1200">
+        <a:solidFill>
+          <a:schemeClr val="tx1"/>
+        </a:solidFill>
+        <a:latin typeface="+mn-lt"/>
+        <a:ea typeface="+mn-ea"/>
+        <a:cs typeface="+mn-cs"/>
+      </a:defRPr>
+    </a:lvl4pPr>
+    <a:lvl5pPr marL="1828800" algn="l" defTabSz="914400" rtl="0" eaLnBrk="1" latinLnBrk="0" hangingPunct="1">
+      <a:defRPr sz="1200" kern="1200">
+        <a:solidFill>
+          <a:schemeClr val="tx1"/>
+        </a:solidFill>
+        <a:latin typeface="+mn-lt"/>
+        <a:ea typeface="+mn-ea"/>
+        <a:cs typeface="+mn-cs"/>
+      </a:defRPr>
+    </a:lvl5pPr>
+    <a:lvl6pPr marL="2286000" algn="l" defTabSz="914400" rtl="0" eaLnBrk="1" latinLnBrk="0" hangingPunct="1">
+      <a:defRPr sz="1200" kern="1200">
+        <a:solidFill>
+          <a:schemeClr val="tx1"/>
+        </a:solidFill>
+        <a:latin typeface="+mn-lt"/>
+        <a:ea typeface="+mn-ea"/>
+        <a:cs typeface="+mn-cs"/>
+      </a:defRPr>
+    </a:lvl6pPr>
+    <a:lvl7pPr marL="2743200" algn="l" defTabSz="914400" rtl="0" eaLnBrk="1" latinLnBrk="0" hangingPunct="1">
+      <a:defRPr sz="1200" kern="1200">
+        <a:solidFill>
+          <a:schemeClr val="tx1"/>
+        </a:solidFill>
+        <a:latin typeface="+mn-lt"/>
+        <a:ea typeface="+mn-ea"/>
+        <a:cs typeface="+mn-cs"/>
+      </a:defRPr>
+    </a:lvl7pPr>
+    <a:lvl8pPr marL="3200400" algn="l" defTabSz="914400" rtl="0" eaLnBrk="1" latinLnBrk="0" hangingPunct="1">
+      <a:defRPr sz="1200" kern="1200">
+        <a:solidFill>
+          <a:schemeClr val="tx1"/>
+        </a:solidFill>
+        <a:latin typeface="+mn-lt"/>
+        <a:ea typeface="+mn-ea"/>
+        <a:cs typeface="+mn-cs"/>
+      </a:defRPr>
+    </a:lvl8pPr>
+    <a:lvl9pPr marL="3657600" algn="l" defTabSz="914400" rtl="0" eaLnBrk="1" latinLnBrk="0" hangingPunct="1">
+      <a:defRPr sz="1200" kern="1200">
+        <a:solidFill>
+          <a:schemeClr val="tx1"/>
+        </a:solidFill>
+        <a:latin typeface="+mn-lt"/>
+        <a:ea typeface="+mn-ea"/>
+        <a:cs typeface="+mn-cs"/>
+      </a:defRPr>
+    </a:lvl9pPr>
+  </p:notesStyle>
+</p:notesMaster>
+</file>
+
+<file path=ppt/notesSlides/notesSlide6.xml><?xml version="1.0" encoding="utf-8"?>
+<p:notes xmlns:a="http://schemas.openxmlformats.org/drawingml/2006/main" xmlns:r="http://schemas.openxmlformats.org/officeDocument/2006/relationships" xmlns:p="http://schemas.openxmlformats.org/presentationml/2006/main">
+  <p:cSld>
+    <p:spTree>
+      <p:nvGrpSpPr>
+        <p:cNvPr id="1" name=""/>
+        <p:cNvGrpSpPr/>
+        <p:nvPr/>
+      </p:nvGrpSpPr>
+      <p:grpSpPr>
+        <a:xfrm>
+          <a:off x="0" y="0"/>
+          <a:ext cx="0" cy="0"/>
+          <a:chOff x="0" y="0"/>
+          <a:chExt cx="0" cy="0"/>
+        </a:xfrm>
+      </p:grpSpPr>
+      <p:sp>
+        <p:nvSpPr>
+          <p:cNvPr id="2" name="Slide Image Placeholder 1"/>
+          <p:cNvSpPr>
+            <a:spLocks noGrp="1" noRot="1" noChangeAspect="1"/>
+          </p:cNvSpPr>
+          <p:nvPr>
+            <p:ph type="sldImg"/>
+          </p:nvPr>
+        </p:nvSpPr>
+        <p:spPr/>
+      </p:sp>
+      <p:sp>
+        <p:nvSpPr>
+          <p:cNvPr id="3" name="Notes Placeholder 2"/>
+          <p:cNvSpPr>
+            <a:spLocks noGrp="1"/>
+          </p:cNvSpPr>
+          <p:nvPr>
+            <p:ph type="body" idx="1"/>
+          </p:nvPr>
+        </p:nvSpPr>
+        <p:spPr/>
+        <p:txBody>
+          <a:bodyPr>
+            <a:normAutofit/>
+          </a:bodyPr>
+          <a:lstStyle/>
+          <a:p>
+            <a:pPr marL="0" marR="0" indent="0" algn="l" defTabSz="914400" rtl="0" eaLnBrk="0" fontAlgn="base" latinLnBrk="0" hangingPunct="0">
+              <a:lnSpc>
+                <a:spcPct val="100000"/>
+              </a:lnSpc>
+              <a:spcBef>
+                <a:spcPct val="50000"/>
+              </a:spcBef>
+              <a:spcAft>
+                <a:spcPct val="0"/>
+              </a:spcAft>
+              <a:buClrTx/>
+              <a:buSzTx/>
+              <a:buFontTx/>
+              <a:buNone/>
+              <a:tabLst/>
+              <a:defRPr/>
+            </a:pPr>
+            <a:r>
+              <a:rPr lang="en-GB" sz="1100" kern="1200" dirty="0" smtClean="0">
+                <a:solidFill>
+                  <a:schemeClr val="tx1"/>
+                </a:solidFill>
+                <a:latin typeface="Arial" pitchFamily="34" charset="0"/>
+                <a:ea typeface="+mn-ea"/>
+                <a:cs typeface="Arial" pitchFamily="34" charset="0"/>
+              </a:rPr>
+              <a:t>Additional data are included with this chart. </a:t>
+            </a:r>
+            <a:r>
+              <a:rPr lang="en-GB" sz="1100" kern="1200" smtClean="0">
+                <a:solidFill>
+                  <a:schemeClr val="tx1"/>
+                </a:solidFill>
+                <a:latin typeface="Arial" pitchFamily="34" charset="0"/>
+                <a:ea typeface="+mn-ea"/>
+                <a:cs typeface="Arial" pitchFamily="34" charset="0"/>
+              </a:rPr>
+              <a:t>Right click and select “</a:t>
+            </a:r>
+            <a:r>
+              <a:rPr lang="en-GB" sz="1100" b="1" kern="1200" smtClean="0">
+                <a:solidFill>
+                  <a:schemeClr val="tx1"/>
+                </a:solidFill>
+                <a:latin typeface="Arial" pitchFamily="34" charset="0"/>
+                <a:ea typeface="+mn-ea"/>
+                <a:cs typeface="Arial" pitchFamily="34" charset="0"/>
+              </a:rPr>
+              <a:t>Edit Data</a:t>
+            </a:r>
+            <a:r>
+              <a:rPr lang="en-GB" sz="1100" kern="1200" smtClean="0">
+                <a:solidFill>
+                  <a:schemeClr val="tx1"/>
+                </a:solidFill>
+                <a:latin typeface="Arial" pitchFamily="34" charset="0"/>
+                <a:ea typeface="+mn-ea"/>
+                <a:cs typeface="Arial" pitchFamily="34" charset="0"/>
+              </a:rPr>
+              <a:t>” to find demographic breakdowns and definitions.</a:t>
+            </a:r>
+            <a:endParaRPr lang="en-GB" sz="1100" kern="1200" dirty="0" smtClean="0">
+              <a:solidFill>
+                <a:schemeClr val="tx1"/>
+              </a:solidFill>
+              <a:latin typeface="Arial" pitchFamily="34" charset="0"/>
+              <a:ea typeface="+mn-ea"/>
+              <a:cs typeface="Arial" pitchFamily="34" charset="0"/>
+            </a:endParaRPr>
+          </a:p>
+        </p:txBody>
+      </p:sp>
+      <p:sp>
+        <p:nvSpPr>
+          <p:cNvPr id="4" name="Slide Number Placeholder 3"/>
+          <p:cNvSpPr>
+            <a:spLocks noGrp="1"/>
+          </p:cNvSpPr>
+          <p:nvPr>
+            <p:ph type="sldNum" sz="quarter" idx="10"/>
+          </p:nvPr>
+        </p:nvSpPr>
+        <p:spPr/>
+        <p:txBody>
+          <a:bodyPr/>
+          <a:lstStyle/>
+          <a:p>
+            <a:fld id="{E23096E1-B3E2-4534-A28D-1261E61EFEBD}" type="slidenum">
+              <a:rPr lang="en-GB" smtClean="0"/>
+              <a:pPr/>
+              <a:t>1</a:t>
+            </a:fld>
+            <a:endParaRPr lang="en-GB"/>
+          </a:p>
+        </p:txBody>
+      </p:sp>
+    </p:spTree>
+  </p:cSld>
+  <p:clrMapOvr>
+    <a:masterClrMapping/>
+  </p:clrMapOvr>
+</p:notes>
+</file>
+
+<file path=ppt/notesSlides/notesSlide7.xml><?xml version="1.0" encoding="utf-8"?>
+<p:notes xmlns:a="http://schemas.openxmlformats.org/drawingml/2006/main" xmlns:r="http://schemas.openxmlformats.org/officeDocument/2006/relationships" xmlns:p="http://schemas.openxmlformats.org/presentationml/2006/main">
+  <p:cSld>
+    <p:spTree>
+      <p:nvGrpSpPr>
+        <p:cNvPr id="1" name=""/>
+        <p:cNvGrpSpPr/>
+        <p:nvPr/>
+      </p:nvGrpSpPr>
+      <p:grpSpPr>
+        <a:xfrm>
+          <a:off x="0" y="0"/>
+          <a:ext cx="0" cy="0"/>
+          <a:chOff x="0" y="0"/>
+          <a:chExt cx="0" cy="0"/>
+        </a:xfrm>
+      </p:grpSpPr>
+      <p:sp>
+        <p:nvSpPr>
+          <p:cNvPr id="2" name="Slide Image Placeholder 1"/>
+          <p:cNvSpPr>
+            <a:spLocks noGrp="1" noRot="1" noChangeAspect="1"/>
+          </p:cNvSpPr>
+          <p:nvPr>
+            <p:ph type="sldImg"/>
+          </p:nvPr>
+        </p:nvSpPr>
+        <p:spPr/>
+      </p:sp>
+      <p:sp>
+        <p:nvSpPr>
+          <p:cNvPr id="3" name="Notes Placeholder 2"/>
+          <p:cNvSpPr>
+            <a:spLocks noGrp="1"/>
+          </p:cNvSpPr>
+          <p:nvPr>
+            <p:ph type="body" idx="1"/>
+          </p:nvPr>
+        </p:nvSpPr>
+        <p:spPr/>
+        <p:txBody>
+          <a:bodyPr>
+            <a:normAutofit/>
+          </a:bodyPr>
+          <a:lstStyle/>
+          <a:p>
+            <a:pPr marL="0" marR="0" indent="0" algn="l" defTabSz="914400" rtl="0" eaLnBrk="0" fontAlgn="base" latinLnBrk="0" hangingPunct="0">
+              <a:lnSpc>
+                <a:spcPct val="100000"/>
+              </a:lnSpc>
+              <a:spcBef>
+                <a:spcPct val="50000"/>
+              </a:spcBef>
+              <a:spcAft>
+                <a:spcPct val="0"/>
+              </a:spcAft>
+              <a:buClrTx/>
+              <a:buSzTx/>
+              <a:buFontTx/>
+              <a:buNone/>
+              <a:tabLst/>
+              <a:defRPr/>
+            </a:pPr>
+            <a:r>
+              <a:rPr lang="en-GB" sz="1100" kern="1200" dirty="0" smtClean="0">
+                <a:solidFill>
+                  <a:schemeClr val="tx1"/>
+                </a:solidFill>
+                <a:latin typeface="Arial" pitchFamily="34" charset="0"/>
+                <a:ea typeface="+mn-ea"/>
+                <a:cs typeface="Arial" pitchFamily="34" charset="0"/>
+              </a:rPr>
+              <a:t>Additional data are included with this chart. </a:t>
+            </a:r>
+            <a:r>
+              <a:rPr lang="en-GB" sz="1100" kern="1200" smtClean="0">
+                <a:solidFill>
+                  <a:schemeClr val="tx1"/>
+                </a:solidFill>
+                <a:latin typeface="Arial" pitchFamily="34" charset="0"/>
+                <a:ea typeface="+mn-ea"/>
+                <a:cs typeface="Arial" pitchFamily="34" charset="0"/>
+              </a:rPr>
+              <a:t>Right click and select “</a:t>
+            </a:r>
+            <a:r>
+              <a:rPr lang="en-GB" sz="1100" b="1" kern="1200" smtClean="0">
+                <a:solidFill>
+                  <a:schemeClr val="tx1"/>
+                </a:solidFill>
+                <a:latin typeface="Arial" pitchFamily="34" charset="0"/>
+                <a:ea typeface="+mn-ea"/>
+                <a:cs typeface="Arial" pitchFamily="34" charset="0"/>
+              </a:rPr>
+              <a:t>Edit Data</a:t>
+            </a:r>
+            <a:r>
+              <a:rPr lang="en-GB" sz="1100" kern="1200" smtClean="0">
+                <a:solidFill>
+                  <a:schemeClr val="tx1"/>
+                </a:solidFill>
+                <a:latin typeface="Arial" pitchFamily="34" charset="0"/>
+                <a:ea typeface="+mn-ea"/>
+                <a:cs typeface="Arial" pitchFamily="34" charset="0"/>
+              </a:rPr>
+              <a:t>” to find demographic breakdowns and definitions.</a:t>
+            </a:r>
+            <a:endParaRPr lang="en-GB" sz="1100" kern="1200" dirty="0" smtClean="0">
+              <a:solidFill>
+                <a:schemeClr val="tx1"/>
+              </a:solidFill>
+              <a:latin typeface="Arial" pitchFamily="34" charset="0"/>
+              <a:ea typeface="+mn-ea"/>
+              <a:cs typeface="Arial" pitchFamily="34" charset="0"/>
+            </a:endParaRPr>
+          </a:p>
+        </p:txBody>
+      </p:sp>
+      <p:sp>
+        <p:nvSpPr>
+          <p:cNvPr id="4" name="Slide Number Placeholder 3"/>
+          <p:cNvSpPr>
+            <a:spLocks noGrp="1"/>
+          </p:cNvSpPr>
+          <p:nvPr>
+            <p:ph type="sldNum" sz="quarter" idx="10"/>
+          </p:nvPr>
+        </p:nvSpPr>
+        <p:spPr/>
+        <p:txBody>
+          <a:bodyPr/>
+          <a:lstStyle/>
+          <a:p>
+            <a:fld id="{E23096E1-B3E2-4534-A28D-1261E61EFEBD}" type="slidenum">
+              <a:rPr lang="en-GB" smtClean="0"/>
+              <a:pPr/>
+              <a:t>2</a:t>
+            </a:fld>
+            <a:endParaRPr lang="en-GB"/>
+          </a:p>
+        </p:txBody>
+      </p:sp>
+    </p:spTree>
+  </p:cSld>
+  <p:clrMapOvr>
+    <a:masterClrMapping/>
+  </p:clrMapOvr>
+</p:notes>
+</file>
+
+<file path=ppt/notesSlides/notesSlide8.xml><?xml version="1.0" encoding="utf-8"?>
+<p:notes xmlns:a="http://schemas.openxmlformats.org/drawingml/2006/main" xmlns:r="http://schemas.openxmlformats.org/officeDocument/2006/relationships" xmlns:p="http://schemas.openxmlformats.org/presentationml/2006/main">
+  <p:cSld>
+    <p:spTree>
+      <p:nvGrpSpPr>
+        <p:cNvPr id="1" name=""/>
+        <p:cNvGrpSpPr/>
+        <p:nvPr/>
+      </p:nvGrpSpPr>
+      <p:grpSpPr>
+        <a:xfrm>
+          <a:off x="0" y="0"/>
+          <a:ext cx="0" cy="0"/>
+          <a:chOff x="0" y="0"/>
+          <a:chExt cx="0" cy="0"/>
+        </a:xfrm>
+      </p:grpSpPr>
+      <p:sp>
+        <p:nvSpPr>
+          <p:cNvPr id="2" name="Slide Image Placeholder 1"/>
+          <p:cNvSpPr>
+            <a:spLocks noGrp="1" noRot="1" noChangeAspect="1"/>
+          </p:cNvSpPr>
+          <p:nvPr>
+            <p:ph type="sldImg"/>
+          </p:nvPr>
+        </p:nvSpPr>
+        <p:spPr/>
+      </p:sp>
+      <p:sp>
+        <p:nvSpPr>
+          <p:cNvPr id="3" name="Notes Placeholder 2"/>
+          <p:cNvSpPr>
+            <a:spLocks noGrp="1"/>
+          </p:cNvSpPr>
+          <p:nvPr>
+            <p:ph type="body" idx="1"/>
+          </p:nvPr>
+        </p:nvSpPr>
+        <p:spPr/>
+        <p:txBody>
+          <a:bodyPr>
+            <a:normAutofit/>
+          </a:bodyPr>
+          <a:lstStyle/>
+          <a:p>
+            <a:pPr marL="0" marR="0" indent="0" algn="l" defTabSz="914400" rtl="0" eaLnBrk="0" fontAlgn="base" latinLnBrk="0" hangingPunct="0">
+              <a:lnSpc>
+                <a:spcPct val="100000"/>
+              </a:lnSpc>
+              <a:spcBef>
+                <a:spcPct val="50000"/>
+              </a:spcBef>
+              <a:spcAft>
+                <a:spcPct val="0"/>
+              </a:spcAft>
+              <a:buClrTx/>
+              <a:buSzTx/>
+              <a:buFontTx/>
+              <a:buNone/>
+              <a:tabLst/>
+              <a:defRPr/>
+            </a:pPr>
+            <a:r>
+              <a:rPr lang="en-GB" sz="1100" kern="1200" dirty="0" smtClean="0">
+                <a:solidFill>
+                  <a:schemeClr val="tx1"/>
+                </a:solidFill>
+                <a:latin typeface="Arial" pitchFamily="34" charset="0"/>
+                <a:ea typeface="+mn-ea"/>
+                <a:cs typeface="Arial" pitchFamily="34" charset="0"/>
+              </a:rPr>
+              <a:t>Additional data are included with this chart. </a:t>
+            </a:r>
+            <a:r>
+              <a:rPr lang="en-GB" sz="1100" kern="1200" smtClean="0">
+                <a:solidFill>
+                  <a:schemeClr val="tx1"/>
+                </a:solidFill>
+                <a:latin typeface="Arial" pitchFamily="34" charset="0"/>
+                <a:ea typeface="+mn-ea"/>
+                <a:cs typeface="Arial" pitchFamily="34" charset="0"/>
+              </a:rPr>
+              <a:t>Right click and select “</a:t>
+            </a:r>
+            <a:r>
+              <a:rPr lang="en-GB" sz="1100" b="1" kern="1200" smtClean="0">
+                <a:solidFill>
+                  <a:schemeClr val="tx1"/>
+                </a:solidFill>
+                <a:latin typeface="Arial" pitchFamily="34" charset="0"/>
+                <a:ea typeface="+mn-ea"/>
+                <a:cs typeface="Arial" pitchFamily="34" charset="0"/>
+              </a:rPr>
+              <a:t>Edit Data</a:t>
+            </a:r>
+            <a:r>
+              <a:rPr lang="en-GB" sz="1100" kern="1200" smtClean="0">
+                <a:solidFill>
+                  <a:schemeClr val="tx1"/>
+                </a:solidFill>
+                <a:latin typeface="Arial" pitchFamily="34" charset="0"/>
+                <a:ea typeface="+mn-ea"/>
+                <a:cs typeface="Arial" pitchFamily="34" charset="0"/>
+              </a:rPr>
+              <a:t>” to find demographic breakdowns and definitions.</a:t>
+            </a:r>
+            <a:endParaRPr lang="en-GB" sz="1100" kern="1200" dirty="0" smtClean="0">
+              <a:solidFill>
+                <a:schemeClr val="tx1"/>
+              </a:solidFill>
+              <a:latin typeface="Arial" pitchFamily="34" charset="0"/>
+              <a:ea typeface="+mn-ea"/>
+              <a:cs typeface="Arial" pitchFamily="34" charset="0"/>
+            </a:endParaRPr>
+          </a:p>
+        </p:txBody>
+      </p:sp>
+      <p:sp>
+        <p:nvSpPr>
+          <p:cNvPr id="4" name="Slide Number Placeholder 3"/>
+          <p:cNvSpPr>
+            <a:spLocks noGrp="1"/>
+          </p:cNvSpPr>
+          <p:nvPr>
+            <p:ph type="sldNum" sz="quarter" idx="10"/>
+          </p:nvPr>
+        </p:nvSpPr>
+        <p:spPr/>
+        <p:txBody>
+          <a:bodyPr/>
+          <a:lstStyle/>
+          <a:p>
+            <a:fld id="{E23096E1-B3E2-4534-A28D-1261E61EFEBD}" type="slidenum">
+              <a:rPr lang="en-GB" smtClean="0"/>
+              <a:pPr/>
+              <a:t>3</a:t>
+            </a:fld>
+            <a:endParaRPr lang="en-GB"/>
+          </a:p>
+        </p:txBody>
+      </p:sp>
+    </p:spTree>
+  </p:cSld>
+  <p:clrMapOvr>
+    <a:masterClrMapping/>
+  </p:clrMapOvr>
+</p:notes>
+</file>
+
+<file path=ppt/notesSlides/notesSlide9.xml><?xml version="1.0" encoding="utf-8"?>
+<p:notes xmlns:a="http://schemas.openxmlformats.org/drawingml/2006/main" xmlns:r="http://schemas.openxmlformats.org/officeDocument/2006/relationships" xmlns:p="http://schemas.openxmlformats.org/presentationml/2006/main">
+  <p:cSld>
+    <p:spTree>
+      <p:nvGrpSpPr>
+        <p:cNvPr id="1" name=""/>
+        <p:cNvGrpSpPr/>
+        <p:nvPr/>
+      </p:nvGrpSpPr>
+      <p:grpSpPr>
+        <a:xfrm>
+          <a:off x="0" y="0"/>
+          <a:ext cx="0" cy="0"/>
+          <a:chOff x="0" y="0"/>
+          <a:chExt cx="0" cy="0"/>
+        </a:xfrm>
+      </p:grpSpPr>
+      <p:sp>
+        <p:nvSpPr>
+          <p:cNvPr id="2" name="Slide Image Placeholder 1"/>
+          <p:cNvSpPr>
+            <a:spLocks noGrp="1" noRot="1" noChangeAspect="1"/>
+          </p:cNvSpPr>
+          <p:nvPr>
+            <p:ph type="sldImg"/>
+          </p:nvPr>
+        </p:nvSpPr>
+        <p:spPr/>
+      </p:sp>
+      <p:sp>
+        <p:nvSpPr>
+          <p:cNvPr id="3" name="Notes Placeholder 2"/>
+          <p:cNvSpPr>
+            <a:spLocks noGrp="1"/>
+          </p:cNvSpPr>
+          <p:nvPr>
+            <p:ph type="body" idx="1"/>
+          </p:nvPr>
+        </p:nvSpPr>
+        <p:spPr/>
+        <p:txBody>
+          <a:bodyPr>
+            <a:normAutofit/>
+          </a:bodyPr>
+          <a:lstStyle/>
+          <a:p>
+            <a:pPr marL="0" marR="0" indent="0" algn="l" defTabSz="914400" rtl="0" eaLnBrk="0" fontAlgn="base" latinLnBrk="0" hangingPunct="0">
+              <a:lnSpc>
+                <a:spcPct val="100000"/>
+              </a:lnSpc>
+              <a:spcBef>
+                <a:spcPct val="50000"/>
+              </a:spcBef>
+              <a:spcAft>
+                <a:spcPct val="0"/>
+              </a:spcAft>
+              <a:buClrTx/>
+              <a:buSzTx/>
+              <a:buFontTx/>
+              <a:buNone/>
+              <a:tabLst/>
+              <a:defRPr/>
+            </a:pPr>
+            <a:r>
+              <a:rPr lang="en-GB" sz="1100" kern="1200" dirty="0" smtClean="0">
+                <a:solidFill>
+                  <a:schemeClr val="tx1"/>
+                </a:solidFill>
+                <a:latin typeface="Arial" pitchFamily="34" charset="0"/>
+                <a:ea typeface="+mn-ea"/>
+                <a:cs typeface="Arial" pitchFamily="34" charset="0"/>
+              </a:rPr>
+              <a:t>Additional data are included with this chart. </a:t>
+            </a:r>
+            <a:r>
+              <a:rPr lang="en-GB" sz="1100" kern="1200" smtClean="0">
+                <a:solidFill>
+                  <a:schemeClr val="tx1"/>
+                </a:solidFill>
+                <a:latin typeface="Arial" pitchFamily="34" charset="0"/>
+                <a:ea typeface="+mn-ea"/>
+                <a:cs typeface="Arial" pitchFamily="34" charset="0"/>
+              </a:rPr>
+              <a:t>Right click and select “</a:t>
+            </a:r>
+            <a:r>
+              <a:rPr lang="en-GB" sz="1100" b="1" kern="1200" smtClean="0">
+                <a:solidFill>
+                  <a:schemeClr val="tx1"/>
+                </a:solidFill>
+                <a:latin typeface="Arial" pitchFamily="34" charset="0"/>
+                <a:ea typeface="+mn-ea"/>
+                <a:cs typeface="Arial" pitchFamily="34" charset="0"/>
+              </a:rPr>
+              <a:t>Edit Data</a:t>
+            </a:r>
+            <a:r>
+              <a:rPr lang="en-GB" sz="1100" kern="1200" smtClean="0">
+                <a:solidFill>
+                  <a:schemeClr val="tx1"/>
+                </a:solidFill>
+                <a:latin typeface="Arial" pitchFamily="34" charset="0"/>
+                <a:ea typeface="+mn-ea"/>
+                <a:cs typeface="Arial" pitchFamily="34" charset="0"/>
+              </a:rPr>
+              <a:t>” to find demographic breakdowns and definitions.</a:t>
+            </a:r>
+            <a:endParaRPr lang="en-GB" sz="1100" kern="1200" dirty="0" smtClean="0">
+              <a:solidFill>
+                <a:schemeClr val="tx1"/>
+              </a:solidFill>
+              <a:latin typeface="Arial" pitchFamily="34" charset="0"/>
+              <a:ea typeface="+mn-ea"/>
+              <a:cs typeface="Arial" pitchFamily="34" charset="0"/>
+            </a:endParaRPr>
+          </a:p>
+        </p:txBody>
+      </p:sp>
+      <p:sp>
+        <p:nvSpPr>
+          <p:cNvPr id="4" name="Slide Number Placeholder 3"/>
+          <p:cNvSpPr>
+            <a:spLocks noGrp="1"/>
+          </p:cNvSpPr>
+          <p:nvPr>
+            <p:ph type="sldNum" sz="quarter" idx="10"/>
+          </p:nvPr>
+        </p:nvSpPr>
+        <p:spPr/>
+        <p:txBody>
+          <a:bodyPr/>
+          <a:lstStyle/>
+          <a:p>
+            <a:fld id="{E23096E1-B3E2-4534-A28D-1261E61EFEBD}" type="slidenum">
+              <a:rPr lang="en-GB" smtClean="0"/>
+              <a:pPr/>
+              <a:t>4</a:t>
+            </a:fld>
+            <a:endParaRPr lang="en-GB"/>
+          </a:p>
+        </p:txBody>
+      </p:sp>
+    </p:spTree>
+  </p:cSld>
+  <p:clrMapOvr>
+    <a:masterClrMapping/>
+  </p:clrMapOvr>
+</p:notes>
 </file>
 
 <file path=ppt/slideLayouts/master2/slideLayout1.xml><?xml version="1.0" encoding="utf-8"?>
@@ -19775,7 +20725,7 @@
         </p:spPr>
         <p:txBody>
           <a:bodyPr lIns="0" tIns="0" rIns="0" bIns="0">
-            <a:noAutofit/>
+            <a:normAutofit/>
           </a:bodyPr>
           <a:lstStyle>
             <a:lvl1pPr algn="ctr">
@@ -20816,595 +21766,6 @@
 </p:sldLayout>
 </file>
 
-<file path=ppt/slideLayouts/slideLayout26.xml><?xml version="1.0" encoding="utf-8"?>
-<p:sldLayout xmlns:a="http://schemas.openxmlformats.org/drawingml/2006/main" xmlns:r="http://schemas.openxmlformats.org/officeDocument/2006/relationships" xmlns:p="http://schemas.openxmlformats.org/presentationml/2006/main" preserve="1">
-  <p:cSld name="Intelligence Slide">
-    <p:spTree>
-      <p:nvGrpSpPr>
-        <p:cNvPr id="1" name=""/>
-        <p:cNvGrpSpPr/>
-        <p:nvPr/>
-      </p:nvGrpSpPr>
-      <p:grpSpPr>
-        <a:xfrm>
-          <a:off x="0" y="0"/>
-          <a:ext cx="0" cy="0"/>
-          <a:chOff x="0" y="0"/>
-          <a:chExt cx="0" cy="0"/>
-        </a:xfrm>
-      </p:grpSpPr>
-      <p:sp>
-        <p:nvSpPr>
-          <p:cNvPr id="3" name="Content Placeholder 2"/>
-          <p:cNvSpPr>
-            <a:spLocks noGrp="1"/>
-          </p:cNvSpPr>
-          <p:nvPr>
-            <p:ph idx="1" hasCustomPrompt="1"/>
-          </p:nvPr>
-        </p:nvSpPr>
-        <p:spPr>
-          <a:xfrm>
-            <a:off x="250824" y="1592758"/>
-            <a:ext cx="8642348" cy="4536580"/>
-          </a:xfrm>
-          <a:prstGeom prst="rect">
-            <a:avLst/>
-          </a:prstGeom>
-        </p:spPr>
-        <p:txBody>
-          <a:bodyPr lIns="0" tIns="0" rIns="0" bIns="0">
-            <a:noAutofit/>
-          </a:bodyPr>
-          <a:lstStyle>
-            <a:lvl1pPr marL="449263" indent="-449263">
-              <a:lnSpc>
-                <a:spcPct val="90000"/>
-              </a:lnSpc>
-              <a:spcBef>
-                <a:spcPts val="600"/>
-              </a:spcBef>
-              <a:buClr>
-                <a:schemeClr val="bg2"/>
-              </a:buClr>
-              <a:buFontTx/>
-              <a:buNone/>
-              <a:defRPr sz="1600" baseline="0">
-                <a:latin typeface="Arial" pitchFamily="34" charset="0"/>
-                <a:cs typeface="Arial" pitchFamily="34" charset="0"/>
-              </a:defRPr>
-            </a:lvl1pPr>
-            <a:lvl2pPr marL="715963" indent="-266700">
-              <a:lnSpc>
-                <a:spcPct val="90000"/>
-              </a:lnSpc>
-              <a:spcBef>
-                <a:spcPts val="600"/>
-              </a:spcBef>
-              <a:buClr>
-                <a:schemeClr val="tx2"/>
-              </a:buClr>
-              <a:buFont typeface="Wingdings" pitchFamily="2" charset="2"/>
-              <a:buChar char="§"/>
-              <a:tabLst/>
-              <a:defRPr sz="2400">
-                <a:latin typeface="Arial" pitchFamily="34" charset="0"/>
-                <a:cs typeface="Arial" pitchFamily="34" charset="0"/>
-              </a:defRPr>
-            </a:lvl2pPr>
-            <a:lvl3pPr marL="982663" indent="-266700">
-              <a:defRPr>
-                <a:latin typeface="Arial" pitchFamily="34" charset="0"/>
-                <a:cs typeface="Arial" pitchFamily="34" charset="0"/>
-              </a:defRPr>
-            </a:lvl3pPr>
-            <a:lvl4pPr>
-              <a:defRPr>
-                <a:latin typeface="Arial" pitchFamily="34" charset="0"/>
-                <a:cs typeface="Arial" pitchFamily="34" charset="0"/>
-              </a:defRPr>
-            </a:lvl4pPr>
-            <a:lvl5pPr>
-              <a:defRPr>
-                <a:latin typeface="Arial" pitchFamily="34" charset="0"/>
-                <a:cs typeface="Arial" pitchFamily="34" charset="0"/>
-              </a:defRPr>
-            </a:lvl5pPr>
-          </a:lstStyle>
-          <a:p>
-            <a:pPr lvl="0"/>
-            <a:r>
-              <a:rPr lang="en-GB" dirty="0" smtClean="0"/>
-              <a:t>Insert chart</a:t>
-            </a:r>
-          </a:p>
-        </p:txBody>
-      </p:sp>
-      <p:sp>
-        <p:nvSpPr>
-          <p:cNvPr id="8" name="TextBox 7"/>
-          <p:cNvSpPr txBox="1"/>
-          <p:nvPr/>
-        </p:nvSpPr>
-        <p:spPr>
-          <a:xfrm>
-            <a:off x="8662881" y="6338849"/>
-            <a:ext cx="309700" cy="194925"/>
-          </a:xfrm>
-          <a:prstGeom prst="rect">
-            <a:avLst/>
-          </a:prstGeom>
-          <a:noFill/>
-        </p:spPr>
-        <p:txBody>
-          <a:bodyPr wrap="none" rtlCol="0" anchor="ctr">
-            <a:spAutoFit/>
-          </a:bodyPr>
-          <a:lstStyle/>
-          <a:p>
-            <a:pPr algn="r">
-              <a:lnSpc>
-                <a:spcPts val="800"/>
-              </a:lnSpc>
-            </a:pPr>
-            <a:fld id="{0E0A9B4E-19F2-4E81-81C4-98D63547DE75}" type="slidenum">
-              <a:rPr lang="en-GB" sz="800" smtClean="0">
-                <a:solidFill>
-                  <a:schemeClr val="bg2"/>
-                </a:solidFill>
-                <a:latin typeface="Arial" pitchFamily="34" charset="0"/>
-                <a:cs typeface="Arial" pitchFamily="34" charset="0"/>
-              </a:rPr>
-              <a:pPr algn="r">
-                <a:lnSpc>
-                  <a:spcPts val="800"/>
-                </a:lnSpc>
-              </a:pPr>
-              <a:t>‹#›</a:t>
-            </a:fld>
-            <a:endParaRPr lang="en-GB" sz="800">
-              <a:solidFill>
-                <a:schemeClr val="bg2"/>
-              </a:solidFill>
-              <a:latin typeface="Arial" pitchFamily="34" charset="0"/>
-              <a:cs typeface="Arial" pitchFamily="34" charset="0"/>
-            </a:endParaRPr>
-          </a:p>
-        </p:txBody>
-      </p:sp>
-      <p:cxnSp>
-        <p:nvCxnSpPr>
-          <p:cNvPr id="10" name="Straight Connector 9"/>
-          <p:cNvCxnSpPr/>
-          <p:nvPr/>
-        </p:nvCxnSpPr>
-        <p:spPr>
-          <a:xfrm rot="5400000">
-            <a:off x="8330221" y="6547429"/>
-            <a:ext cx="619558" cy="1589"/>
-          </a:xfrm>
-          <a:prstGeom prst="line">
-            <a:avLst/>
-          </a:prstGeom>
-          <a:ln w="19050">
-            <a:solidFill>
-              <a:schemeClr val="bg2"/>
-            </a:solidFill>
-          </a:ln>
-          <a:effectLst/>
-        </p:spPr>
-        <p:style>
-          <a:lnRef idx="2">
-            <a:schemeClr val="accent1"/>
-          </a:lnRef>
-          <a:fillRef idx="0">
-            <a:schemeClr val="accent1"/>
-          </a:fillRef>
-          <a:effectRef idx="1">
-            <a:schemeClr val="accent1"/>
-          </a:effectRef>
-          <a:fontRef idx="minor">
-            <a:schemeClr val="tx1"/>
-          </a:fontRef>
-        </p:style>
-      </p:cxnSp>
-      <p:sp>
-        <p:nvSpPr>
-          <p:cNvPr id="15" name="Text Placeholder 14"/>
-          <p:cNvSpPr>
-            <a:spLocks noGrp="1"/>
-          </p:cNvSpPr>
-          <p:nvPr>
-            <p:ph type="body" sz="quarter" idx="10" hasCustomPrompt="1"/>
-          </p:nvPr>
-        </p:nvSpPr>
-        <p:spPr>
-          <a:xfrm>
-            <a:off x="684213" y="6338849"/>
-            <a:ext cx="7929834" cy="194925"/>
-          </a:xfrm>
-          <a:prstGeom prst="rect">
-            <a:avLst/>
-          </a:prstGeom>
-        </p:spPr>
-        <p:txBody>
-          <a:bodyPr anchor="ctr">
-            <a:noAutofit/>
-          </a:bodyPr>
-          <a:lstStyle>
-            <a:lvl1pPr marL="0" marR="0" indent="0" algn="r" defTabSz="457200" rtl="0" eaLnBrk="1" fontAlgn="auto" latinLnBrk="0" hangingPunct="1">
-              <a:lnSpc>
-                <a:spcPts val="800"/>
-              </a:lnSpc>
-              <a:spcBef>
-                <a:spcPts val="0"/>
-              </a:spcBef>
-              <a:spcAft>
-                <a:spcPts val="0"/>
-              </a:spcAft>
-              <a:buClrTx/>
-              <a:buSzTx/>
-              <a:buFont typeface="Arial"/>
-              <a:buNone/>
-              <a:tabLst/>
-              <a:defRPr sz="800" baseline="0">
-                <a:solidFill>
-                  <a:schemeClr val="tx1">
-                    <a:lumMod val="50000"/>
-                    <a:lumOff val="50000"/>
-                  </a:schemeClr>
-                </a:solidFill>
-              </a:defRPr>
-            </a:lvl1pPr>
-          </a:lstStyle>
-          <a:p>
-            <a:pPr lvl="0"/>
-            <a:r>
-              <a:rPr lang="en-GB" dirty="0" smtClean="0"/>
-              <a:t>Insert source/photo credit here</a:t>
-            </a:r>
-          </a:p>
-        </p:txBody>
-      </p:sp>
-      <p:sp>
-        <p:nvSpPr>
-          <p:cNvPr id="16" name="Title 1"/>
-          <p:cNvSpPr>
-            <a:spLocks noGrp="1"/>
-          </p:cNvSpPr>
-          <p:nvPr>
-            <p:ph type="title" hasCustomPrompt="1"/>
-          </p:nvPr>
-        </p:nvSpPr>
-        <p:spPr>
-          <a:xfrm>
-            <a:off x="250824" y="260350"/>
-            <a:ext cx="8642349" cy="886397"/>
-          </a:xfrm>
-          <a:prstGeom prst="rect">
-            <a:avLst/>
-          </a:prstGeom>
-        </p:spPr>
-        <p:txBody>
-          <a:bodyPr wrap="square" lIns="0" tIns="0" rIns="0" bIns="0" anchor="t">
-            <a:spAutoFit/>
-          </a:bodyPr>
-          <a:lstStyle>
-            <a:lvl1pPr algn="l">
-              <a:lnSpc>
-                <a:spcPct val="90000"/>
-              </a:lnSpc>
-              <a:defRPr sz="3200">
-                <a:solidFill>
-                  <a:schemeClr val="bg2"/>
-                </a:solidFill>
-                <a:latin typeface="Arial" pitchFamily="34" charset="0"/>
-                <a:cs typeface="Arial" pitchFamily="34" charset="0"/>
-              </a:defRPr>
-            </a:lvl1pPr>
-          </a:lstStyle>
-          <a:p>
-            <a:r>
-              <a:rPr lang="en-GB" dirty="0" smtClean="0"/>
-              <a:t>Insert slide title</a:t>
-            </a:r>
-            <a:br>
-              <a:rPr lang="en-GB" dirty="0" smtClean="0"/>
-            </a:br>
-            <a:r>
-              <a:rPr lang="en-GB" dirty="0" smtClean="0"/>
-              <a:t>(second line)</a:t>
-            </a:r>
-            <a:endParaRPr lang="en-US" dirty="0"/>
-          </a:p>
-        </p:txBody>
-      </p:sp>
-      <p:sp>
-        <p:nvSpPr>
-          <p:cNvPr id="14" name="Text Placeholder 13"/>
-          <p:cNvSpPr>
-            <a:spLocks noGrp="1"/>
-          </p:cNvSpPr>
-          <p:nvPr>
-            <p:ph type="body" sz="quarter" idx="11" hasCustomPrompt="1"/>
-          </p:nvPr>
-        </p:nvSpPr>
-        <p:spPr>
-          <a:xfrm>
-            <a:off x="250824" y="1268760"/>
-            <a:ext cx="8642349" cy="221599"/>
-          </a:xfrm>
-          <a:prstGeom prst="rect">
-            <a:avLst/>
-          </a:prstGeom>
-        </p:spPr>
-        <p:txBody>
-          <a:bodyPr lIns="0" tIns="0" rIns="0" bIns="0">
-            <a:spAutoFit/>
-          </a:bodyPr>
-          <a:lstStyle>
-            <a:lvl1pPr marL="0" indent="0">
-              <a:lnSpc>
-                <a:spcPct val="90000"/>
-              </a:lnSpc>
-              <a:spcBef>
-                <a:spcPts val="0"/>
-              </a:spcBef>
-              <a:buNone/>
-              <a:defRPr sz="1600"/>
-            </a:lvl1pPr>
-          </a:lstStyle>
-          <a:p>
-            <a:pPr lvl="0"/>
-            <a:r>
-              <a:rPr lang="en-GB" dirty="0" smtClean="0"/>
-              <a:t>Question wording</a:t>
-            </a:r>
-            <a:endParaRPr lang="en-GB" dirty="0"/>
-          </a:p>
-        </p:txBody>
-      </p:sp>
-      <p:grpSp>
-        <p:nvGrpSpPr>
-          <p:cNvPr id="2" name="Group 5"/>
-          <p:cNvGrpSpPr>
-            <a:grpSpLocks noChangeAspect="1"/>
-          </p:cNvGrpSpPr>
-          <p:nvPr/>
-        </p:nvGrpSpPr>
-        <p:grpSpPr bwMode="auto">
-          <a:xfrm>
-            <a:off x="250826" y="6236525"/>
-            <a:ext cx="433388" cy="361125"/>
-            <a:chOff x="-796" y="1752"/>
-            <a:chExt cx="2267" cy="1889"/>
-          </a:xfrm>
-          <a:solidFill>
-            <a:schemeClr val="bg2"/>
-          </a:solidFill>
-        </p:grpSpPr>
-        <p:sp>
-          <p:nvSpPr>
-            <p:cNvPr id="13" name="Freeform 6"/>
-            <p:cNvSpPr>
-              <a:spLocks/>
-            </p:cNvSpPr>
-            <p:nvPr userDrawn="1"/>
-          </p:nvSpPr>
-          <p:spPr bwMode="auto">
-            <a:xfrm>
-              <a:off x="-360" y="1752"/>
-              <a:ext cx="1831" cy="1889"/>
-            </a:xfrm>
-            <a:custGeom>
-              <a:avLst/>
-              <a:gdLst/>
-              <a:ahLst/>
-              <a:cxnLst>
-                <a:cxn ang="0">
-                  <a:pos x="1454" y="0"/>
-                </a:cxn>
-                <a:cxn ang="0">
-                  <a:pos x="1454" y="1511"/>
-                </a:cxn>
-                <a:cxn ang="0">
-                  <a:pos x="0" y="1511"/>
-                </a:cxn>
-                <a:cxn ang="0">
-                  <a:pos x="0" y="1889"/>
-                </a:cxn>
-                <a:cxn ang="0">
-                  <a:pos x="1831" y="1889"/>
-                </a:cxn>
-                <a:cxn ang="0">
-                  <a:pos x="1831" y="0"/>
-                </a:cxn>
-                <a:cxn ang="0">
-                  <a:pos x="1454" y="0"/>
-                </a:cxn>
-              </a:cxnLst>
-              <a:rect l="0" t="0" r="r" b="b"/>
-              <a:pathLst>
-                <a:path w="1831" h="1889">
-                  <a:moveTo>
-                    <a:pt x="1454" y="0"/>
-                  </a:moveTo>
-                  <a:lnTo>
-                    <a:pt x="1454" y="1511"/>
-                  </a:lnTo>
-                  <a:lnTo>
-                    <a:pt x="0" y="1511"/>
-                  </a:lnTo>
-                  <a:lnTo>
-                    <a:pt x="0" y="1889"/>
-                  </a:lnTo>
-                  <a:lnTo>
-                    <a:pt x="1831" y="1889"/>
-                  </a:lnTo>
-                  <a:lnTo>
-                    <a:pt x="1831" y="0"/>
-                  </a:lnTo>
-                  <a:lnTo>
-                    <a:pt x="1454" y="0"/>
-                  </a:lnTo>
-                  <a:close/>
-                </a:path>
-              </a:pathLst>
-            </a:custGeom>
-            <a:grpFill/>
-            <a:ln w="9525">
-              <a:noFill/>
-              <a:round/>
-              <a:headEnd/>
-              <a:tailEnd/>
-            </a:ln>
-          </p:spPr>
-          <p:txBody>
-            <a:bodyPr vert="horz" wrap="square" lIns="91440" tIns="45720" rIns="91440" bIns="45720" numCol="1" anchor="t" anchorCtr="0" compatLnSpc="1">
-              <a:prstTxWarp prst="textNoShape">
-                <a:avLst/>
-              </a:prstTxWarp>
-            </a:bodyPr>
-            <a:lstStyle/>
-            <a:p>
-              <a:endParaRPr lang="en-GB"/>
-            </a:p>
-          </p:txBody>
-        </p:sp>
-        <p:sp>
-          <p:nvSpPr>
-            <p:cNvPr id="17" name="Freeform 7"/>
-            <p:cNvSpPr>
-              <a:spLocks/>
-            </p:cNvSpPr>
-            <p:nvPr userDrawn="1"/>
-          </p:nvSpPr>
-          <p:spPr bwMode="auto">
-            <a:xfrm>
-              <a:off x="-796" y="1752"/>
-              <a:ext cx="1832" cy="1889"/>
-            </a:xfrm>
-            <a:custGeom>
-              <a:avLst/>
-              <a:gdLst/>
-              <a:ahLst/>
-              <a:cxnLst>
-                <a:cxn ang="0">
-                  <a:pos x="1832" y="378"/>
-                </a:cxn>
-                <a:cxn ang="0">
-                  <a:pos x="1832" y="0"/>
-                </a:cxn>
-                <a:cxn ang="0">
-                  <a:pos x="0" y="0"/>
-                </a:cxn>
-                <a:cxn ang="0">
-                  <a:pos x="0" y="1889"/>
-                </a:cxn>
-                <a:cxn ang="0">
-                  <a:pos x="378" y="1889"/>
-                </a:cxn>
-                <a:cxn ang="0">
-                  <a:pos x="378" y="378"/>
-                </a:cxn>
-                <a:cxn ang="0">
-                  <a:pos x="1832" y="378"/>
-                </a:cxn>
-              </a:cxnLst>
-              <a:rect l="0" t="0" r="r" b="b"/>
-              <a:pathLst>
-                <a:path w="1832" h="1889">
-                  <a:moveTo>
-                    <a:pt x="1832" y="378"/>
-                  </a:moveTo>
-                  <a:lnTo>
-                    <a:pt x="1832" y="0"/>
-                  </a:lnTo>
-                  <a:lnTo>
-                    <a:pt x="0" y="0"/>
-                  </a:lnTo>
-                  <a:lnTo>
-                    <a:pt x="0" y="1889"/>
-                  </a:lnTo>
-                  <a:lnTo>
-                    <a:pt x="378" y="1889"/>
-                  </a:lnTo>
-                  <a:lnTo>
-                    <a:pt x="378" y="378"/>
-                  </a:lnTo>
-                  <a:lnTo>
-                    <a:pt x="1832" y="378"/>
-                  </a:lnTo>
-                  <a:close/>
-                </a:path>
-              </a:pathLst>
-            </a:custGeom>
-            <a:grpFill/>
-            <a:ln w="9525">
-              <a:noFill/>
-              <a:round/>
-              <a:headEnd/>
-              <a:tailEnd/>
-            </a:ln>
-          </p:spPr>
-          <p:txBody>
-            <a:bodyPr vert="horz" wrap="square" lIns="91440" tIns="45720" rIns="91440" bIns="45720" numCol="1" anchor="t" anchorCtr="0" compatLnSpc="1">
-              <a:prstTxWarp prst="textNoShape">
-                <a:avLst/>
-              </a:prstTxWarp>
-            </a:bodyPr>
-            <a:lstStyle/>
-            <a:p>
-              <a:endParaRPr lang="en-GB"/>
-            </a:p>
-          </p:txBody>
-        </p:sp>
-        <p:sp>
-          <p:nvSpPr>
-            <p:cNvPr id="21" name="Rectangle 8"/>
-            <p:cNvSpPr>
-              <a:spLocks noChangeArrowheads="1"/>
-            </p:cNvSpPr>
-            <p:nvPr userDrawn="1"/>
-          </p:nvSpPr>
-          <p:spPr bwMode="auto">
-            <a:xfrm>
-              <a:off x="-40" y="2508"/>
-              <a:ext cx="756" cy="377"/>
-            </a:xfrm>
-            <a:prstGeom prst="rect">
-              <a:avLst/>
-            </a:prstGeom>
-            <a:grpFill/>
-            <a:ln w="9525">
-              <a:noFill/>
-              <a:miter lim="800000"/>
-              <a:headEnd/>
-              <a:tailEnd/>
-            </a:ln>
-          </p:spPr>
-          <p:txBody>
-            <a:bodyPr vert="horz" wrap="square" lIns="91440" tIns="45720" rIns="91440" bIns="45720" numCol="1" anchor="t" anchorCtr="0" compatLnSpc="1">
-              <a:prstTxWarp prst="textNoShape">
-                <a:avLst/>
-              </a:prstTxWarp>
-            </a:bodyPr>
-            <a:lstStyle/>
-            <a:p>
-              <a:endParaRPr lang="en-GB"/>
-            </a:p>
-          </p:txBody>
-        </p:sp>
-      </p:grpSp>
-    </p:spTree>
-  </p:cSld>
-  <p:clrMapOvr>
-    <a:masterClrMapping/>
-  </p:clrMapOvr>
-  <p:transition/>
-</p:sldLayout>
-</file>
-
 <file path=ppt/slideLayouts/slideLayout3.xml><?xml version="1.0" encoding="utf-8"?>
 <p:sldLayout xmlns:a="http://schemas.openxmlformats.org/drawingml/2006/main" xmlns:r="http://schemas.openxmlformats.org/officeDocument/2006/relationships" xmlns:p="http://schemas.openxmlformats.org/presentationml/2006/main" preserve="1" userDrawn="1">
   <p:cSld name="Global differences">
@@ -21982,7 +22343,7 @@
         </p:nvSpPr>
         <p:spPr>
           <a:xfrm>
-            <a:off x="250825" y="873125"/>
+            <a:off x="260794" y="836712"/>
             <a:ext cx="8642350" cy="5076825"/>
           </a:xfrm>
           <a:prstGeom prst="rect">
@@ -22899,7 +23260,7 @@
               </a:pPr>
               <a:t>‹#›</a:t>
             </a:fld>
-            <a:endParaRPr lang="en-GB" sz="800">
+            <a:endParaRPr lang="en-GB" sz="800" dirty="0">
               <a:solidFill>
                 <a:srgbClr val="FFFFFF"/>
               </a:solidFill>
@@ -23434,7 +23795,7 @@
         </p:spPr>
         <p:txBody>
           <a:bodyPr lIns="0" tIns="0" rIns="0" bIns="0" anchor="b" anchorCtr="0">
-            <a:noAutofit/>
+            <a:normAutofit/>
           </a:bodyPr>
           <a:lstStyle>
             <a:lvl1pPr algn="ctr">
@@ -23516,7 +23877,7 @@
         </p:spPr>
         <p:txBody>
           <a:bodyPr lIns="0" tIns="0" rIns="0" bIns="0" anchor="b" anchorCtr="0">
-            <a:noAutofit/>
+            <a:normAutofit/>
           </a:bodyPr>
           <a:lstStyle>
             <a:lvl1pPr algn="ctr">
@@ -23598,7 +23959,7 @@
         </p:spPr>
         <p:txBody>
           <a:bodyPr lIns="0" tIns="0" rIns="0" bIns="0" anchor="b" anchorCtr="0">
-            <a:noAutofit/>
+            <a:normAutofit/>
           </a:bodyPr>
           <a:lstStyle>
             <a:lvl1pPr algn="ctr">
@@ -23764,7 +24125,9 @@
           </a:prstGeom>
         </p:spPr>
         <p:txBody>
-          <a:bodyPr/>
+          <a:bodyPr>
+            <a:normAutofit/>
+          </a:bodyPr>
           <a:lstStyle>
             <a:lvl1pPr marL="0" marR="0" indent="0" algn="ctr" defTabSz="914400" rtl="0" eaLnBrk="1" fontAlgn="auto" latinLnBrk="0" hangingPunct="1">
               <a:lnSpc>
@@ -23817,10 +24180,6 @@
             </a:r>
             <a:endParaRPr lang="en-GB" dirty="0"/>
           </a:p>
-          <a:p>
-            <a:pPr lvl="0"/>
-            <a:endParaRPr lang="en-GB" dirty="0"/>
-          </a:p>
         </p:txBody>
       </p:sp>
       <p:sp>
@@ -23843,7 +24202,9 @@
           </a:prstGeom>
         </p:spPr>
         <p:txBody>
-          <a:bodyPr/>
+          <a:bodyPr>
+            <a:normAutofit/>
+          </a:bodyPr>
           <a:lstStyle>
             <a:lvl1pPr marL="0" marR="0" indent="0" algn="ctr" defTabSz="914400" rtl="0" eaLnBrk="1" fontAlgn="auto" latinLnBrk="0" hangingPunct="1">
               <a:lnSpc>
@@ -24505,7 +24866,9 @@
           </a:prstGeom>
         </p:spPr>
         <p:txBody>
-          <a:bodyPr/>
+          <a:bodyPr>
+            <a:normAutofit/>
+          </a:bodyPr>
           <a:lstStyle>
             <a:lvl1pPr>
               <a:buNone/>
@@ -27907,744 +28270,6 @@
       </p:graphicFrame>
       <p:sp>
         <p:nvSpPr>
-          <p:cNvPr id="13" name="Text Placeholder 29"/>
-          <p:cNvSpPr>
-            <a:spLocks noGrp="1"/>
-          </p:cNvSpPr>
-          <p:nvPr>
-            <p:ph type="body" sz="quarter" idx="12" hasCustomPrompt="1"/>
-          </p:nvPr>
-        </p:nvSpPr>
-        <p:spPr>
-          <a:xfrm>
-            <a:off x="334177" y="1556793"/>
-            <a:ext cx="2617644" cy="1771718"/>
-          </a:xfrm>
-          <a:prstGeom prst="rect">
-            <a:avLst/>
-          </a:prstGeom>
-        </p:spPr>
-        <p:txBody>
-          <a:bodyPr lIns="0" tIns="0" rIns="0" bIns="0" anchor="t" anchorCtr="0">
-            <a:noAutofit/>
-          </a:bodyPr>
-          <a:lstStyle>
-            <a:lvl1pPr algn="l">
-              <a:buFontTx/>
-              <a:buNone/>
-              <a:defRPr sz="1600">
-                <a:solidFill>
-                  <a:schemeClr val="bg1"/>
-                </a:solidFill>
-                <a:latin typeface="Arial" pitchFamily="34" charset="0"/>
-                <a:cs typeface="Arial" pitchFamily="34" charset="0"/>
-              </a:defRPr>
-            </a:lvl1pPr>
-            <a:lvl2pPr>
-              <a:defRPr sz="3600">
-                <a:solidFill>
-                  <a:schemeClr val="bg1"/>
-                </a:solidFill>
-                <a:latin typeface="Arial" pitchFamily="34" charset="0"/>
-                <a:cs typeface="Arial" pitchFamily="34" charset="0"/>
-              </a:defRPr>
-            </a:lvl2pPr>
-            <a:lvl3pPr>
-              <a:defRPr sz="3600">
-                <a:solidFill>
-                  <a:schemeClr val="bg1"/>
-                </a:solidFill>
-                <a:latin typeface="Arial" pitchFamily="34" charset="0"/>
-                <a:cs typeface="Arial" pitchFamily="34" charset="0"/>
-              </a:defRPr>
-            </a:lvl3pPr>
-            <a:lvl4pPr>
-              <a:defRPr sz="3600">
-                <a:solidFill>
-                  <a:schemeClr val="bg1"/>
-                </a:solidFill>
-                <a:latin typeface="Arial" pitchFamily="34" charset="0"/>
-                <a:cs typeface="Arial" pitchFamily="34" charset="0"/>
-              </a:defRPr>
-            </a:lvl4pPr>
-            <a:lvl5pPr>
-              <a:defRPr sz="3600">
-                <a:solidFill>
-                  <a:schemeClr val="bg1"/>
-                </a:solidFill>
-                <a:latin typeface="Arial" pitchFamily="34" charset="0"/>
-                <a:cs typeface="Arial" pitchFamily="34" charset="0"/>
-              </a:defRPr>
-            </a:lvl5pPr>
-          </a:lstStyle>
-          <a:p>
-            <a:pPr lvl="0"/>
-            <a:r>
-              <a:rPr lang="en-US" dirty="0"/>
-              <a:t>&lt;Text&gt;</a:t>
-            </a:r>
-            <a:endParaRPr lang="en-GB" dirty="0"/>
-          </a:p>
-        </p:txBody>
-      </p:sp>
-      <p:sp>
-        <p:nvSpPr>
-          <p:cNvPr id="14" name="Text Placeholder 29"/>
-          <p:cNvSpPr>
-            <a:spLocks noGrp="1"/>
-          </p:cNvSpPr>
-          <p:nvPr>
-            <p:ph type="body" sz="quarter" idx="13" hasCustomPrompt="1"/>
-          </p:nvPr>
-        </p:nvSpPr>
-        <p:spPr>
-          <a:xfrm>
-            <a:off x="334177" y="3498088"/>
-            <a:ext cx="2617644" cy="1371071"/>
-          </a:xfrm>
-          <a:prstGeom prst="rect">
-            <a:avLst/>
-          </a:prstGeom>
-        </p:spPr>
-        <p:txBody>
-          <a:bodyPr lIns="0" tIns="0" rIns="0" bIns="0" anchor="t" anchorCtr="0">
-            <a:noAutofit/>
-          </a:bodyPr>
-          <a:lstStyle>
-            <a:lvl1pPr algn="l">
-              <a:buFontTx/>
-              <a:buNone/>
-              <a:defRPr sz="1600">
-                <a:solidFill>
-                  <a:schemeClr val="bg1"/>
-                </a:solidFill>
-                <a:latin typeface="Arial" pitchFamily="34" charset="0"/>
-                <a:cs typeface="Arial" pitchFamily="34" charset="0"/>
-              </a:defRPr>
-            </a:lvl1pPr>
-            <a:lvl2pPr>
-              <a:defRPr sz="3600">
-                <a:solidFill>
-                  <a:schemeClr val="bg1"/>
-                </a:solidFill>
-                <a:latin typeface="Arial" pitchFamily="34" charset="0"/>
-                <a:cs typeface="Arial" pitchFamily="34" charset="0"/>
-              </a:defRPr>
-            </a:lvl2pPr>
-            <a:lvl3pPr>
-              <a:defRPr sz="3600">
-                <a:solidFill>
-                  <a:schemeClr val="bg1"/>
-                </a:solidFill>
-                <a:latin typeface="Arial" pitchFamily="34" charset="0"/>
-                <a:cs typeface="Arial" pitchFamily="34" charset="0"/>
-              </a:defRPr>
-            </a:lvl3pPr>
-            <a:lvl4pPr>
-              <a:defRPr sz="3600">
-                <a:solidFill>
-                  <a:schemeClr val="bg1"/>
-                </a:solidFill>
-                <a:latin typeface="Arial" pitchFamily="34" charset="0"/>
-                <a:cs typeface="Arial" pitchFamily="34" charset="0"/>
-              </a:defRPr>
-            </a:lvl4pPr>
-            <a:lvl5pPr>
-              <a:defRPr sz="3600">
-                <a:solidFill>
-                  <a:schemeClr val="bg1"/>
-                </a:solidFill>
-                <a:latin typeface="Arial" pitchFamily="34" charset="0"/>
-                <a:cs typeface="Arial" pitchFamily="34" charset="0"/>
-              </a:defRPr>
-            </a:lvl5pPr>
-          </a:lstStyle>
-          <a:p>
-            <a:pPr lvl="0"/>
-            <a:r>
-              <a:rPr lang="en-US" dirty="0"/>
-              <a:t>&lt;Text&gt;</a:t>
-            </a:r>
-            <a:endParaRPr lang="en-GB" dirty="0"/>
-          </a:p>
-        </p:txBody>
-      </p:sp>
-      <p:sp>
-        <p:nvSpPr>
-          <p:cNvPr id="15" name="Text Placeholder 29"/>
-          <p:cNvSpPr>
-            <a:spLocks noGrp="1"/>
-          </p:cNvSpPr>
-          <p:nvPr>
-            <p:ph type="body" sz="quarter" idx="14" hasCustomPrompt="1"/>
-          </p:nvPr>
-        </p:nvSpPr>
-        <p:spPr>
-          <a:xfrm>
-            <a:off x="334177" y="5049180"/>
-            <a:ext cx="2617644" cy="828092"/>
-          </a:xfrm>
-          <a:prstGeom prst="rect">
-            <a:avLst/>
-          </a:prstGeom>
-        </p:spPr>
-        <p:txBody>
-          <a:bodyPr lIns="0" tIns="0" rIns="0" bIns="0" anchor="t" anchorCtr="0">
-            <a:noAutofit/>
-          </a:bodyPr>
-          <a:lstStyle>
-            <a:lvl1pPr algn="l">
-              <a:buFontTx/>
-              <a:buNone/>
-              <a:defRPr sz="1600">
-                <a:solidFill>
-                  <a:schemeClr val="bg1"/>
-                </a:solidFill>
-                <a:latin typeface="Arial" pitchFamily="34" charset="0"/>
-                <a:cs typeface="Arial" pitchFamily="34" charset="0"/>
-              </a:defRPr>
-            </a:lvl1pPr>
-            <a:lvl2pPr>
-              <a:defRPr sz="3600">
-                <a:solidFill>
-                  <a:schemeClr val="bg1"/>
-                </a:solidFill>
-                <a:latin typeface="Arial" pitchFamily="34" charset="0"/>
-                <a:cs typeface="Arial" pitchFamily="34" charset="0"/>
-              </a:defRPr>
-            </a:lvl2pPr>
-            <a:lvl3pPr>
-              <a:defRPr sz="3600">
-                <a:solidFill>
-                  <a:schemeClr val="bg1"/>
-                </a:solidFill>
-                <a:latin typeface="Arial" pitchFamily="34" charset="0"/>
-                <a:cs typeface="Arial" pitchFamily="34" charset="0"/>
-              </a:defRPr>
-            </a:lvl3pPr>
-            <a:lvl4pPr>
-              <a:defRPr sz="3600">
-                <a:solidFill>
-                  <a:schemeClr val="bg1"/>
-                </a:solidFill>
-                <a:latin typeface="Arial" pitchFamily="34" charset="0"/>
-                <a:cs typeface="Arial" pitchFamily="34" charset="0"/>
-              </a:defRPr>
-            </a:lvl4pPr>
-            <a:lvl5pPr>
-              <a:defRPr sz="3600">
-                <a:solidFill>
-                  <a:schemeClr val="bg1"/>
-                </a:solidFill>
-                <a:latin typeface="Arial" pitchFamily="34" charset="0"/>
-                <a:cs typeface="Arial" pitchFamily="34" charset="0"/>
-              </a:defRPr>
-            </a:lvl5pPr>
-          </a:lstStyle>
-          <a:p>
-            <a:pPr lvl="0"/>
-            <a:r>
-              <a:rPr lang="en-US" dirty="0"/>
-              <a:t>&lt;Text&gt;</a:t>
-            </a:r>
-            <a:endParaRPr lang="en-GB" dirty="0"/>
-          </a:p>
-        </p:txBody>
-      </p:sp>
-      <p:sp>
-        <p:nvSpPr>
-          <p:cNvPr id="16" name="Text Placeholder 29"/>
-          <p:cNvSpPr>
-            <a:spLocks noGrp="1"/>
-          </p:cNvSpPr>
-          <p:nvPr>
-            <p:ph type="body" sz="quarter" idx="15" hasCustomPrompt="1"/>
-          </p:nvPr>
-        </p:nvSpPr>
-        <p:spPr>
-          <a:xfrm>
-            <a:off x="3263178" y="1538585"/>
-            <a:ext cx="2617644" cy="1789926"/>
-          </a:xfrm>
-          <a:prstGeom prst="rect">
-            <a:avLst/>
-          </a:prstGeom>
-        </p:spPr>
-        <p:txBody>
-          <a:bodyPr lIns="0" tIns="0" rIns="0" bIns="0" anchor="t" anchorCtr="0">
-            <a:noAutofit/>
-          </a:bodyPr>
-          <a:lstStyle>
-            <a:lvl1pPr algn="l">
-              <a:buFontTx/>
-              <a:buNone/>
-              <a:defRPr sz="1600">
-                <a:solidFill>
-                  <a:schemeClr val="tx1"/>
-                </a:solidFill>
-                <a:latin typeface="Arial" pitchFamily="34" charset="0"/>
-                <a:cs typeface="Arial" pitchFamily="34" charset="0"/>
-              </a:defRPr>
-            </a:lvl1pPr>
-            <a:lvl2pPr>
-              <a:defRPr sz="3600">
-                <a:solidFill>
-                  <a:schemeClr val="bg1"/>
-                </a:solidFill>
-                <a:latin typeface="Arial" pitchFamily="34" charset="0"/>
-                <a:cs typeface="Arial" pitchFamily="34" charset="0"/>
-              </a:defRPr>
-            </a:lvl2pPr>
-            <a:lvl3pPr>
-              <a:defRPr sz="3600">
-                <a:solidFill>
-                  <a:schemeClr val="bg1"/>
-                </a:solidFill>
-                <a:latin typeface="Arial" pitchFamily="34" charset="0"/>
-                <a:cs typeface="Arial" pitchFamily="34" charset="0"/>
-              </a:defRPr>
-            </a:lvl3pPr>
-            <a:lvl4pPr>
-              <a:defRPr sz="3600">
-                <a:solidFill>
-                  <a:schemeClr val="bg1"/>
-                </a:solidFill>
-                <a:latin typeface="Arial" pitchFamily="34" charset="0"/>
-                <a:cs typeface="Arial" pitchFamily="34" charset="0"/>
-              </a:defRPr>
-            </a:lvl4pPr>
-            <a:lvl5pPr>
-              <a:defRPr sz="3600">
-                <a:solidFill>
-                  <a:schemeClr val="bg1"/>
-                </a:solidFill>
-                <a:latin typeface="Arial" pitchFamily="34" charset="0"/>
-                <a:cs typeface="Arial" pitchFamily="34" charset="0"/>
-              </a:defRPr>
-            </a:lvl5pPr>
-          </a:lstStyle>
-          <a:p>
-            <a:pPr lvl="0"/>
-            <a:r>
-              <a:rPr lang="en-US" dirty="0"/>
-              <a:t>&lt;Text&gt;</a:t>
-            </a:r>
-            <a:endParaRPr lang="en-GB" dirty="0"/>
-          </a:p>
-        </p:txBody>
-      </p:sp>
-      <p:sp>
-        <p:nvSpPr>
-          <p:cNvPr id="26" name="Text Placeholder 29"/>
-          <p:cNvSpPr>
-            <a:spLocks noGrp="1"/>
-          </p:cNvSpPr>
-          <p:nvPr>
-            <p:ph type="body" sz="quarter" idx="16" hasCustomPrompt="1"/>
-          </p:nvPr>
-        </p:nvSpPr>
-        <p:spPr>
-          <a:xfrm>
-            <a:off x="3263178" y="3498088"/>
-            <a:ext cx="2617644" cy="1371072"/>
-          </a:xfrm>
-          <a:prstGeom prst="rect">
-            <a:avLst/>
-          </a:prstGeom>
-        </p:spPr>
-        <p:txBody>
-          <a:bodyPr lIns="0" tIns="0" rIns="0" bIns="0" anchor="t" anchorCtr="0">
-            <a:noAutofit/>
-          </a:bodyPr>
-          <a:lstStyle>
-            <a:lvl1pPr algn="l">
-              <a:buFontTx/>
-              <a:buNone/>
-              <a:defRPr sz="1600">
-                <a:solidFill>
-                  <a:schemeClr val="tx1"/>
-                </a:solidFill>
-                <a:latin typeface="Arial" pitchFamily="34" charset="0"/>
-                <a:cs typeface="Arial" pitchFamily="34" charset="0"/>
-              </a:defRPr>
-            </a:lvl1pPr>
-            <a:lvl2pPr>
-              <a:defRPr sz="3600">
-                <a:solidFill>
-                  <a:schemeClr val="bg1"/>
-                </a:solidFill>
-                <a:latin typeface="Arial" pitchFamily="34" charset="0"/>
-                <a:cs typeface="Arial" pitchFamily="34" charset="0"/>
-              </a:defRPr>
-            </a:lvl2pPr>
-            <a:lvl3pPr>
-              <a:defRPr sz="3600">
-                <a:solidFill>
-                  <a:schemeClr val="bg1"/>
-                </a:solidFill>
-                <a:latin typeface="Arial" pitchFamily="34" charset="0"/>
-                <a:cs typeface="Arial" pitchFamily="34" charset="0"/>
-              </a:defRPr>
-            </a:lvl3pPr>
-            <a:lvl4pPr>
-              <a:defRPr sz="3600">
-                <a:solidFill>
-                  <a:schemeClr val="bg1"/>
-                </a:solidFill>
-                <a:latin typeface="Arial" pitchFamily="34" charset="0"/>
-                <a:cs typeface="Arial" pitchFamily="34" charset="0"/>
-              </a:defRPr>
-            </a:lvl4pPr>
-            <a:lvl5pPr>
-              <a:defRPr sz="3600">
-                <a:solidFill>
-                  <a:schemeClr val="bg1"/>
-                </a:solidFill>
-                <a:latin typeface="Arial" pitchFamily="34" charset="0"/>
-                <a:cs typeface="Arial" pitchFamily="34" charset="0"/>
-              </a:defRPr>
-            </a:lvl5pPr>
-          </a:lstStyle>
-          <a:p>
-            <a:pPr lvl="0"/>
-            <a:r>
-              <a:rPr lang="en-US" dirty="0"/>
-              <a:t>&lt;Text&gt;</a:t>
-            </a:r>
-            <a:endParaRPr lang="en-GB" dirty="0"/>
-          </a:p>
-        </p:txBody>
-      </p:sp>
-      <p:sp>
-        <p:nvSpPr>
-          <p:cNvPr id="27" name="Text Placeholder 29"/>
-          <p:cNvSpPr>
-            <a:spLocks noGrp="1"/>
-          </p:cNvSpPr>
-          <p:nvPr>
-            <p:ph type="body" sz="quarter" idx="17" hasCustomPrompt="1"/>
-          </p:nvPr>
-        </p:nvSpPr>
-        <p:spPr>
-          <a:xfrm>
-            <a:off x="3263178" y="5049179"/>
-            <a:ext cx="2617644" cy="828093"/>
-          </a:xfrm>
-          <a:prstGeom prst="rect">
-            <a:avLst/>
-          </a:prstGeom>
-        </p:spPr>
-        <p:txBody>
-          <a:bodyPr lIns="0" tIns="0" rIns="0" bIns="0" anchor="t" anchorCtr="0">
-            <a:noAutofit/>
-          </a:bodyPr>
-          <a:lstStyle>
-            <a:lvl1pPr algn="l">
-              <a:buFontTx/>
-              <a:buNone/>
-              <a:defRPr sz="1600">
-                <a:solidFill>
-                  <a:schemeClr val="tx1"/>
-                </a:solidFill>
-                <a:latin typeface="Arial" pitchFamily="34" charset="0"/>
-                <a:cs typeface="Arial" pitchFamily="34" charset="0"/>
-              </a:defRPr>
-            </a:lvl1pPr>
-            <a:lvl2pPr>
-              <a:defRPr sz="3600">
-                <a:solidFill>
-                  <a:schemeClr val="bg1"/>
-                </a:solidFill>
-                <a:latin typeface="Arial" pitchFamily="34" charset="0"/>
-                <a:cs typeface="Arial" pitchFamily="34" charset="0"/>
-              </a:defRPr>
-            </a:lvl2pPr>
-            <a:lvl3pPr>
-              <a:defRPr sz="3600">
-                <a:solidFill>
-                  <a:schemeClr val="bg1"/>
-                </a:solidFill>
-                <a:latin typeface="Arial" pitchFamily="34" charset="0"/>
-                <a:cs typeface="Arial" pitchFamily="34" charset="0"/>
-              </a:defRPr>
-            </a:lvl3pPr>
-            <a:lvl4pPr>
-              <a:defRPr sz="3600">
-                <a:solidFill>
-                  <a:schemeClr val="bg1"/>
-                </a:solidFill>
-                <a:latin typeface="Arial" pitchFamily="34" charset="0"/>
-                <a:cs typeface="Arial" pitchFamily="34" charset="0"/>
-              </a:defRPr>
-            </a:lvl4pPr>
-            <a:lvl5pPr>
-              <a:defRPr sz="3600">
-                <a:solidFill>
-                  <a:schemeClr val="bg1"/>
-                </a:solidFill>
-                <a:latin typeface="Arial" pitchFamily="34" charset="0"/>
-                <a:cs typeface="Arial" pitchFamily="34" charset="0"/>
-              </a:defRPr>
-            </a:lvl5pPr>
-          </a:lstStyle>
-          <a:p>
-            <a:pPr lvl="0"/>
-            <a:r>
-              <a:rPr lang="en-US" dirty="0"/>
-              <a:t>&lt;Text&gt;</a:t>
-            </a:r>
-            <a:endParaRPr lang="en-GB" dirty="0"/>
-          </a:p>
-        </p:txBody>
-      </p:sp>
-      <p:sp>
-        <p:nvSpPr>
-          <p:cNvPr id="28" name="Text Placeholder 29"/>
-          <p:cNvSpPr>
-            <a:spLocks noGrp="1"/>
-          </p:cNvSpPr>
-          <p:nvPr>
-            <p:ph type="body" sz="quarter" idx="18" hasCustomPrompt="1"/>
-          </p:nvPr>
-        </p:nvSpPr>
-        <p:spPr>
-          <a:xfrm>
-            <a:off x="6234806" y="1538584"/>
-            <a:ext cx="2617644" cy="1796284"/>
-          </a:xfrm>
-          <a:prstGeom prst="rect">
-            <a:avLst/>
-          </a:prstGeom>
-        </p:spPr>
-        <p:txBody>
-          <a:bodyPr lIns="0" tIns="0" rIns="0" bIns="0" anchor="t" anchorCtr="0">
-            <a:noAutofit/>
-          </a:bodyPr>
-          <a:lstStyle>
-            <a:lvl1pPr algn="l">
-              <a:buFontTx/>
-              <a:buNone/>
-              <a:defRPr sz="1600">
-                <a:solidFill>
-                  <a:schemeClr val="tx1"/>
-                </a:solidFill>
-                <a:latin typeface="Arial" pitchFamily="34" charset="0"/>
-                <a:cs typeface="Arial" pitchFamily="34" charset="0"/>
-              </a:defRPr>
-            </a:lvl1pPr>
-            <a:lvl2pPr>
-              <a:defRPr sz="3600">
-                <a:solidFill>
-                  <a:schemeClr val="bg1"/>
-                </a:solidFill>
-                <a:latin typeface="Arial" pitchFamily="34" charset="0"/>
-                <a:cs typeface="Arial" pitchFamily="34" charset="0"/>
-              </a:defRPr>
-            </a:lvl2pPr>
-            <a:lvl3pPr>
-              <a:defRPr sz="3600">
-                <a:solidFill>
-                  <a:schemeClr val="bg1"/>
-                </a:solidFill>
-                <a:latin typeface="Arial" pitchFamily="34" charset="0"/>
-                <a:cs typeface="Arial" pitchFamily="34" charset="0"/>
-              </a:defRPr>
-            </a:lvl3pPr>
-            <a:lvl4pPr>
-              <a:defRPr sz="3600">
-                <a:solidFill>
-                  <a:schemeClr val="bg1"/>
-                </a:solidFill>
-                <a:latin typeface="Arial" pitchFamily="34" charset="0"/>
-                <a:cs typeface="Arial" pitchFamily="34" charset="0"/>
-              </a:defRPr>
-            </a:lvl4pPr>
-            <a:lvl5pPr>
-              <a:defRPr sz="3600">
-                <a:solidFill>
-                  <a:schemeClr val="bg1"/>
-                </a:solidFill>
-                <a:latin typeface="Arial" pitchFamily="34" charset="0"/>
-                <a:cs typeface="Arial" pitchFamily="34" charset="0"/>
-              </a:defRPr>
-            </a:lvl5pPr>
-          </a:lstStyle>
-          <a:p>
-            <a:pPr lvl="0"/>
-            <a:r>
-              <a:rPr lang="en-US" dirty="0"/>
-              <a:t>&lt;Text&gt;</a:t>
-            </a:r>
-            <a:endParaRPr lang="en-GB" dirty="0"/>
-          </a:p>
-        </p:txBody>
-      </p:sp>
-      <p:sp>
-        <p:nvSpPr>
-          <p:cNvPr id="29" name="Text Placeholder 29"/>
-          <p:cNvSpPr>
-            <a:spLocks noGrp="1"/>
-          </p:cNvSpPr>
-          <p:nvPr>
-            <p:ph type="body" sz="quarter" idx="19" hasCustomPrompt="1"/>
-          </p:nvPr>
-        </p:nvSpPr>
-        <p:spPr>
-          <a:xfrm>
-            <a:off x="6238832" y="3504445"/>
-            <a:ext cx="2617644" cy="1364715"/>
-          </a:xfrm>
-          <a:prstGeom prst="rect">
-            <a:avLst/>
-          </a:prstGeom>
-        </p:spPr>
-        <p:txBody>
-          <a:bodyPr lIns="0" tIns="0" rIns="0" bIns="0" anchor="t" anchorCtr="0">
-            <a:noAutofit/>
-          </a:bodyPr>
-          <a:lstStyle>
-            <a:lvl1pPr algn="l">
-              <a:buFontTx/>
-              <a:buNone/>
-              <a:defRPr sz="1600">
-                <a:solidFill>
-                  <a:schemeClr val="tx1"/>
-                </a:solidFill>
-                <a:latin typeface="Arial" pitchFamily="34" charset="0"/>
-                <a:cs typeface="Arial" pitchFamily="34" charset="0"/>
-              </a:defRPr>
-            </a:lvl1pPr>
-            <a:lvl2pPr>
-              <a:defRPr sz="3600">
-                <a:solidFill>
-                  <a:schemeClr val="bg1"/>
-                </a:solidFill>
-                <a:latin typeface="Arial" pitchFamily="34" charset="0"/>
-                <a:cs typeface="Arial" pitchFamily="34" charset="0"/>
-              </a:defRPr>
-            </a:lvl2pPr>
-            <a:lvl3pPr>
-              <a:defRPr sz="3600">
-                <a:solidFill>
-                  <a:schemeClr val="bg1"/>
-                </a:solidFill>
-                <a:latin typeface="Arial" pitchFamily="34" charset="0"/>
-                <a:cs typeface="Arial" pitchFamily="34" charset="0"/>
-              </a:defRPr>
-            </a:lvl3pPr>
-            <a:lvl4pPr>
-              <a:defRPr sz="3600">
-                <a:solidFill>
-                  <a:schemeClr val="bg1"/>
-                </a:solidFill>
-                <a:latin typeface="Arial" pitchFamily="34" charset="0"/>
-                <a:cs typeface="Arial" pitchFamily="34" charset="0"/>
-              </a:defRPr>
-            </a:lvl4pPr>
-            <a:lvl5pPr>
-              <a:defRPr sz="3600">
-                <a:solidFill>
-                  <a:schemeClr val="bg1"/>
-                </a:solidFill>
-                <a:latin typeface="Arial" pitchFamily="34" charset="0"/>
-                <a:cs typeface="Arial" pitchFamily="34" charset="0"/>
-              </a:defRPr>
-            </a:lvl5pPr>
-          </a:lstStyle>
-          <a:p>
-            <a:pPr lvl="0"/>
-            <a:r>
-              <a:rPr lang="en-US" dirty="0"/>
-              <a:t>&lt;Text&gt;</a:t>
-            </a:r>
-            <a:endParaRPr lang="en-GB" dirty="0"/>
-          </a:p>
-        </p:txBody>
-      </p:sp>
-      <p:sp>
-        <p:nvSpPr>
-          <p:cNvPr id="30" name="Text Placeholder 29"/>
-          <p:cNvSpPr>
-            <a:spLocks noGrp="1"/>
-          </p:cNvSpPr>
-          <p:nvPr>
-            <p:ph type="body" sz="quarter" idx="20" hasCustomPrompt="1"/>
-          </p:nvPr>
-        </p:nvSpPr>
-        <p:spPr>
-          <a:xfrm>
-            <a:off x="6238832" y="5038910"/>
-            <a:ext cx="2617644" cy="838362"/>
-          </a:xfrm>
-          <a:prstGeom prst="rect">
-            <a:avLst/>
-          </a:prstGeom>
-        </p:spPr>
-        <p:txBody>
-          <a:bodyPr lIns="0" tIns="0" rIns="0" bIns="0" anchor="t" anchorCtr="0">
-            <a:noAutofit/>
-          </a:bodyPr>
-          <a:lstStyle>
-            <a:lvl1pPr algn="l">
-              <a:buFontTx/>
-              <a:buNone/>
-              <a:defRPr sz="1600">
-                <a:solidFill>
-                  <a:schemeClr val="tx1"/>
-                </a:solidFill>
-                <a:latin typeface="Arial" pitchFamily="34" charset="0"/>
-                <a:cs typeface="Arial" pitchFamily="34" charset="0"/>
-              </a:defRPr>
-            </a:lvl1pPr>
-            <a:lvl2pPr>
-              <a:defRPr sz="3600">
-                <a:solidFill>
-                  <a:schemeClr val="bg1"/>
-                </a:solidFill>
-                <a:latin typeface="Arial" pitchFamily="34" charset="0"/>
-                <a:cs typeface="Arial" pitchFamily="34" charset="0"/>
-              </a:defRPr>
-            </a:lvl2pPr>
-            <a:lvl3pPr>
-              <a:defRPr sz="3600">
-                <a:solidFill>
-                  <a:schemeClr val="bg1"/>
-                </a:solidFill>
-                <a:latin typeface="Arial" pitchFamily="34" charset="0"/>
-                <a:cs typeface="Arial" pitchFamily="34" charset="0"/>
-              </a:defRPr>
-            </a:lvl3pPr>
-            <a:lvl4pPr>
-              <a:defRPr sz="3600">
-                <a:solidFill>
-                  <a:schemeClr val="bg1"/>
-                </a:solidFill>
-                <a:latin typeface="Arial" pitchFamily="34" charset="0"/>
-                <a:cs typeface="Arial" pitchFamily="34" charset="0"/>
-              </a:defRPr>
-            </a:lvl4pPr>
-            <a:lvl5pPr>
-              <a:defRPr sz="3600">
-                <a:solidFill>
-                  <a:schemeClr val="bg1"/>
-                </a:solidFill>
-                <a:latin typeface="Arial" pitchFamily="34" charset="0"/>
-                <a:cs typeface="Arial" pitchFamily="34" charset="0"/>
-              </a:defRPr>
-            </a:lvl5pPr>
-          </a:lstStyle>
-          <a:p>
-            <a:pPr lvl="0"/>
-            <a:r>
-              <a:rPr lang="en-US" dirty="0"/>
-              <a:t>&lt;Text&gt;</a:t>
-            </a:r>
-            <a:endParaRPr lang="en-GB" dirty="0"/>
-          </a:p>
-        </p:txBody>
-      </p:sp>
-      <p:sp>
-        <p:nvSpPr>
           <p:cNvPr id="9" name="Text Placeholder 8"/>
           <p:cNvSpPr>
             <a:spLocks noGrp="1"/>
@@ -28655,7 +28280,7 @@
         </p:nvSpPr>
         <p:spPr>
           <a:xfrm>
-            <a:off x="371562" y="945480"/>
+            <a:off x="335558" y="945480"/>
             <a:ext cx="2508250" cy="395288"/>
           </a:xfrm>
           <a:prstGeom prst="rect">
@@ -28663,7 +28288,9 @@
           </a:prstGeom>
         </p:spPr>
         <p:txBody>
-          <a:bodyPr anchor="ctr" anchorCtr="0"/>
+          <a:bodyPr anchor="ctr" anchorCtr="0">
+            <a:normAutofit/>
+          </a:bodyPr>
           <a:lstStyle>
             <a:lvl1pPr marL="0" indent="0">
               <a:buNone/>
@@ -28705,7 +28332,9 @@
           </a:prstGeom>
         </p:spPr>
         <p:txBody>
-          <a:bodyPr anchor="ctr" anchorCtr="0"/>
+          <a:bodyPr anchor="ctr" anchorCtr="0">
+            <a:normAutofit/>
+          </a:bodyPr>
           <a:lstStyle>
             <a:lvl1pPr marL="0" indent="0">
               <a:buNone/>
@@ -28744,7 +28373,9 @@
           </a:prstGeom>
         </p:spPr>
         <p:txBody>
-          <a:bodyPr anchor="ctr" anchorCtr="0"/>
+          <a:bodyPr anchor="ctr" anchorCtr="0">
+            <a:normAutofit/>
+          </a:bodyPr>
           <a:lstStyle>
             <a:lvl1pPr marL="0" indent="0">
               <a:buNone/>
@@ -28759,6 +28390,422 @@
             <a:r>
               <a:rPr lang="en-GB" dirty="0"/>
               <a:t>In 5 years</a:t>
+            </a:r>
+          </a:p>
+        </p:txBody>
+      </p:sp>
+      <p:sp>
+        <p:nvSpPr>
+          <p:cNvPr id="6" name="Text Placeholder 5"/>
+          <p:cNvSpPr>
+            <a:spLocks noGrp="1"/>
+          </p:cNvSpPr>
+          <p:nvPr>
+            <p:ph type="body" sz="quarter" idx="24" hasCustomPrompt="1"/>
+          </p:nvPr>
+        </p:nvSpPr>
+        <p:spPr>
+          <a:xfrm>
+            <a:off x="334963" y="1538288"/>
+            <a:ext cx="2544762" cy="1790700"/>
+          </a:xfrm>
+          <a:prstGeom prst="rect">
+            <a:avLst/>
+          </a:prstGeom>
+        </p:spPr>
+        <p:txBody>
+          <a:bodyPr>
+            <a:normAutofit/>
+          </a:bodyPr>
+          <a:lstStyle>
+            <a:lvl1pPr marL="0" indent="0">
+              <a:buNone/>
+              <a:defRPr sz="1800">
+                <a:solidFill>
+                  <a:schemeClr val="bg1"/>
+                </a:solidFill>
+              </a:defRPr>
+            </a:lvl1pPr>
+          </a:lstStyle>
+          <a:p>
+            <a:pPr lvl="0"/>
+            <a:r>
+              <a:rPr lang="en-GB" dirty="0"/>
+              <a:t>&lt;Text&gt;</a:t>
+            </a:r>
+          </a:p>
+        </p:txBody>
+      </p:sp>
+      <p:sp>
+        <p:nvSpPr>
+          <p:cNvPr id="8" name="Text Placeholder 7"/>
+          <p:cNvSpPr>
+            <a:spLocks noGrp="1"/>
+          </p:cNvSpPr>
+          <p:nvPr>
+            <p:ph type="body" sz="quarter" idx="25" hasCustomPrompt="1"/>
+          </p:nvPr>
+        </p:nvSpPr>
+        <p:spPr>
+          <a:xfrm>
+            <a:off x="334963" y="3500438"/>
+            <a:ext cx="2544762" cy="1333500"/>
+          </a:xfrm>
+          <a:prstGeom prst="rect">
+            <a:avLst/>
+          </a:prstGeom>
+        </p:spPr>
+        <p:txBody>
+          <a:bodyPr>
+            <a:normAutofit/>
+          </a:bodyPr>
+          <a:lstStyle>
+            <a:lvl1pPr marL="0" indent="0">
+              <a:buNone/>
+              <a:defRPr sz="1800" baseline="0">
+                <a:solidFill>
+                  <a:schemeClr val="bg1"/>
+                </a:solidFill>
+              </a:defRPr>
+            </a:lvl1pPr>
+          </a:lstStyle>
+          <a:p>
+            <a:pPr lvl="0"/>
+            <a:r>
+              <a:rPr lang="en-GB" dirty="0"/>
+              <a:t>&lt;Text&gt;</a:t>
+            </a:r>
+          </a:p>
+        </p:txBody>
+      </p:sp>
+      <p:sp>
+        <p:nvSpPr>
+          <p:cNvPr id="21" name="Text Placeholder 20"/>
+          <p:cNvSpPr>
+            <a:spLocks noGrp="1"/>
+          </p:cNvSpPr>
+          <p:nvPr>
+            <p:ph type="body" sz="quarter" idx="26" hasCustomPrompt="1"/>
+          </p:nvPr>
+        </p:nvSpPr>
+        <p:spPr>
+          <a:xfrm>
+            <a:off x="334963" y="5013325"/>
+            <a:ext cx="2544762" cy="863600"/>
+          </a:xfrm>
+          <a:prstGeom prst="rect">
+            <a:avLst/>
+          </a:prstGeom>
+        </p:spPr>
+        <p:txBody>
+          <a:bodyPr>
+            <a:normAutofit/>
+          </a:bodyPr>
+          <a:lstStyle>
+            <a:lvl1pPr marL="0" marR="0" indent="0" algn="l" defTabSz="914400" rtl="0" eaLnBrk="1" fontAlgn="auto" latinLnBrk="0" hangingPunct="1">
+              <a:lnSpc>
+                <a:spcPct val="100000"/>
+              </a:lnSpc>
+              <a:spcBef>
+                <a:spcPct val="20000"/>
+              </a:spcBef>
+              <a:spcAft>
+                <a:spcPts val="0"/>
+              </a:spcAft>
+              <a:buClrTx/>
+              <a:buSzTx/>
+              <a:buFont typeface="Arial" pitchFamily="34" charset="0"/>
+              <a:buNone/>
+              <a:tabLst/>
+              <a:defRPr sz="1800">
+                <a:solidFill>
+                  <a:schemeClr val="bg1"/>
+                </a:solidFill>
+              </a:defRPr>
+            </a:lvl1pPr>
+          </a:lstStyle>
+          <a:p>
+            <a:pPr marL="0" marR="0" lvl="0" indent="0" algn="l" defTabSz="914400" rtl="0" eaLnBrk="1" fontAlgn="auto" latinLnBrk="0" hangingPunct="1">
+              <a:lnSpc>
+                <a:spcPct val="100000"/>
+              </a:lnSpc>
+              <a:spcBef>
+                <a:spcPct val="20000"/>
+              </a:spcBef>
+              <a:spcAft>
+                <a:spcPts val="0"/>
+              </a:spcAft>
+              <a:buClrTx/>
+              <a:buSzTx/>
+              <a:buFont typeface="Arial" pitchFamily="34" charset="0"/>
+              <a:buNone/>
+              <a:tabLst/>
+              <a:defRPr/>
+            </a:pPr>
+            <a:r>
+              <a:rPr lang="en-GB" dirty="0"/>
+              <a:t>&lt;Text&gt;</a:t>
+            </a:r>
+          </a:p>
+          <a:p>
+            <a:pPr lvl="0"/>
+            <a:endParaRPr lang="en-GB" dirty="0"/>
+          </a:p>
+        </p:txBody>
+      </p:sp>
+      <p:sp>
+        <p:nvSpPr>
+          <p:cNvPr id="32" name="Text Placeholder 31"/>
+          <p:cNvSpPr>
+            <a:spLocks noGrp="1"/>
+          </p:cNvSpPr>
+          <p:nvPr>
+            <p:ph type="body" sz="quarter" idx="27" hasCustomPrompt="1"/>
+          </p:nvPr>
+        </p:nvSpPr>
+        <p:spPr>
+          <a:xfrm>
+            <a:off x="3263900" y="1538288"/>
+            <a:ext cx="2616200" cy="1790700"/>
+          </a:xfrm>
+          <a:prstGeom prst="rect">
+            <a:avLst/>
+          </a:prstGeom>
+        </p:spPr>
+        <p:txBody>
+          <a:bodyPr>
+            <a:normAutofit/>
+          </a:bodyPr>
+          <a:lstStyle>
+            <a:lvl1pPr marL="0" marR="0" indent="0" algn="l" defTabSz="914400" rtl="0" eaLnBrk="1" fontAlgn="auto" latinLnBrk="0" hangingPunct="1">
+              <a:lnSpc>
+                <a:spcPct val="100000"/>
+              </a:lnSpc>
+              <a:spcBef>
+                <a:spcPct val="20000"/>
+              </a:spcBef>
+              <a:spcAft>
+                <a:spcPts val="0"/>
+              </a:spcAft>
+              <a:buClrTx/>
+              <a:buSzTx/>
+              <a:buFont typeface="Arial" pitchFamily="34" charset="0"/>
+              <a:buNone/>
+              <a:tabLst/>
+              <a:defRPr sz="1800"/>
+            </a:lvl1pPr>
+          </a:lstStyle>
+          <a:p>
+            <a:pPr marL="0" marR="0" lvl="0" indent="0" algn="l" defTabSz="914400" rtl="0" eaLnBrk="1" fontAlgn="auto" latinLnBrk="0" hangingPunct="1">
+              <a:lnSpc>
+                <a:spcPct val="100000"/>
+              </a:lnSpc>
+              <a:spcBef>
+                <a:spcPct val="20000"/>
+              </a:spcBef>
+              <a:spcAft>
+                <a:spcPts val="0"/>
+              </a:spcAft>
+              <a:buClrTx/>
+              <a:buSzTx/>
+              <a:buFont typeface="Arial" pitchFamily="34" charset="0"/>
+              <a:buNone/>
+              <a:tabLst/>
+              <a:defRPr/>
+            </a:pPr>
+            <a:r>
+              <a:rPr lang="en-GB" dirty="0"/>
+              <a:t>&lt;Text&gt;</a:t>
+            </a:r>
+          </a:p>
+        </p:txBody>
+      </p:sp>
+      <p:sp>
+        <p:nvSpPr>
+          <p:cNvPr id="34" name="Text Placeholder 33"/>
+          <p:cNvSpPr>
+            <a:spLocks noGrp="1"/>
+          </p:cNvSpPr>
+          <p:nvPr>
+            <p:ph type="body" sz="quarter" idx="28" hasCustomPrompt="1"/>
+          </p:nvPr>
+        </p:nvSpPr>
+        <p:spPr>
+          <a:xfrm>
+            <a:off x="3263900" y="3500438"/>
+            <a:ext cx="2616200" cy="1333500"/>
+          </a:xfrm>
+          <a:prstGeom prst="rect">
+            <a:avLst/>
+          </a:prstGeom>
+        </p:spPr>
+        <p:txBody>
+          <a:bodyPr>
+            <a:normAutofit/>
+          </a:bodyPr>
+          <a:lstStyle>
+            <a:lvl1pPr marL="0" indent="0">
+              <a:buNone/>
+              <a:defRPr sz="1800"/>
+            </a:lvl1pPr>
+          </a:lstStyle>
+          <a:p>
+            <a:pPr lvl="0"/>
+            <a:r>
+              <a:rPr lang="en-GB" dirty="0"/>
+              <a:t>&lt;Text&gt;</a:t>
+            </a:r>
+          </a:p>
+        </p:txBody>
+      </p:sp>
+      <p:sp>
+        <p:nvSpPr>
+          <p:cNvPr id="36" name="Text Placeholder 35"/>
+          <p:cNvSpPr>
+            <a:spLocks noGrp="1"/>
+          </p:cNvSpPr>
+          <p:nvPr>
+            <p:ph type="body" sz="quarter" idx="29" hasCustomPrompt="1"/>
+          </p:nvPr>
+        </p:nvSpPr>
+        <p:spPr>
+          <a:xfrm>
+            <a:off x="3263900" y="5013325"/>
+            <a:ext cx="2616200" cy="863600"/>
+          </a:xfrm>
+          <a:prstGeom prst="rect">
+            <a:avLst/>
+          </a:prstGeom>
+        </p:spPr>
+        <p:txBody>
+          <a:bodyPr>
+            <a:normAutofit/>
+          </a:bodyPr>
+          <a:lstStyle>
+            <a:lvl1pPr marL="0" indent="0">
+              <a:buNone/>
+              <a:defRPr sz="1800"/>
+            </a:lvl1pPr>
+          </a:lstStyle>
+          <a:p>
+            <a:pPr lvl="0"/>
+            <a:r>
+              <a:rPr lang="en-GB" dirty="0"/>
+              <a:t>&lt;Text&gt;</a:t>
+            </a:r>
+          </a:p>
+        </p:txBody>
+      </p:sp>
+      <p:sp>
+        <p:nvSpPr>
+          <p:cNvPr id="38" name="Text Placeholder 37"/>
+          <p:cNvSpPr>
+            <a:spLocks noGrp="1"/>
+          </p:cNvSpPr>
+          <p:nvPr>
+            <p:ph type="body" sz="quarter" idx="30" hasCustomPrompt="1"/>
+          </p:nvPr>
+        </p:nvSpPr>
+        <p:spPr>
+          <a:xfrm>
+            <a:off x="6227763" y="1538288"/>
+            <a:ext cx="2551112" cy="1790700"/>
+          </a:xfrm>
+          <a:prstGeom prst="rect">
+            <a:avLst/>
+          </a:prstGeom>
+        </p:spPr>
+        <p:txBody>
+          <a:bodyPr>
+            <a:normAutofit/>
+          </a:bodyPr>
+          <a:lstStyle>
+            <a:lvl1pPr marL="0" indent="0">
+              <a:buNone/>
+              <a:defRPr sz="1800"/>
+            </a:lvl1pPr>
+          </a:lstStyle>
+          <a:p>
+            <a:pPr lvl="0"/>
+            <a:r>
+              <a:rPr lang="en-GB" dirty="0"/>
+              <a:t>&lt;Text&gt;</a:t>
+            </a:r>
+          </a:p>
+        </p:txBody>
+      </p:sp>
+      <p:sp>
+        <p:nvSpPr>
+          <p:cNvPr id="40" name="Text Placeholder 39"/>
+          <p:cNvSpPr>
+            <a:spLocks noGrp="1"/>
+          </p:cNvSpPr>
+          <p:nvPr>
+            <p:ph type="body" sz="quarter" idx="31" hasCustomPrompt="1"/>
+          </p:nvPr>
+        </p:nvSpPr>
+        <p:spPr>
+          <a:xfrm>
+            <a:off x="6227763" y="3500438"/>
+            <a:ext cx="2551112" cy="1333500"/>
+          </a:xfrm>
+          <a:prstGeom prst="rect">
+            <a:avLst/>
+          </a:prstGeom>
+        </p:spPr>
+        <p:txBody>
+          <a:bodyPr>
+            <a:normAutofit/>
+          </a:bodyPr>
+          <a:lstStyle>
+            <a:lvl1pPr marL="0" indent="0">
+              <a:buNone/>
+              <a:defRPr sz="1800" baseline="0"/>
+            </a:lvl1pPr>
+          </a:lstStyle>
+          <a:p>
+            <a:pPr lvl="0"/>
+            <a:r>
+              <a:rPr lang="en-GB" dirty="0"/>
+              <a:t>&lt;Text&gt;</a:t>
+            </a:r>
+          </a:p>
+        </p:txBody>
+      </p:sp>
+      <p:sp>
+        <p:nvSpPr>
+          <p:cNvPr id="42" name="Text Placeholder 41"/>
+          <p:cNvSpPr>
+            <a:spLocks noGrp="1"/>
+          </p:cNvSpPr>
+          <p:nvPr>
+            <p:ph type="body" sz="quarter" idx="32" hasCustomPrompt="1"/>
+          </p:nvPr>
+        </p:nvSpPr>
+        <p:spPr>
+          <a:xfrm>
+            <a:off x="6227763" y="5013325"/>
+            <a:ext cx="2551112" cy="863600"/>
+          </a:xfrm>
+          <a:prstGeom prst="rect">
+            <a:avLst/>
+          </a:prstGeom>
+        </p:spPr>
+        <p:txBody>
+          <a:bodyPr>
+            <a:normAutofit/>
+          </a:bodyPr>
+          <a:lstStyle>
+            <a:lvl1pPr marL="0" indent="0">
+              <a:buNone/>
+              <a:defRPr sz="1800"/>
+            </a:lvl1pPr>
+          </a:lstStyle>
+          <a:p>
+            <a:pPr lvl="0"/>
+            <a:r>
+              <a:rPr lang="en-GB" dirty="0"/>
+              <a:t>&lt;Text&gt;</a:t>
             </a:r>
           </a:p>
         </p:txBody>
@@ -29310,7 +29357,7 @@
         <p:spPr>
           <a:xfrm>
             <a:off x="250825" y="5265738"/>
-            <a:ext cx="8642350" cy="719137"/>
+            <a:ext cx="8642350" cy="1475630"/>
           </a:xfrm>
           <a:prstGeom prst="rect">
             <a:avLst/>
@@ -29318,7 +29365,7 @@
         </p:spPr>
         <p:txBody>
           <a:bodyPr>
-            <a:noAutofit/>
+            <a:normAutofit/>
           </a:bodyPr>
           <a:lstStyle>
             <a:lvl1pPr algn="ctr">
@@ -29342,7 +29389,7 @@
             </a:br>
             <a:r>
               <a:rPr lang="en-GB" dirty="0"/>
-              <a:t>trends@futurefoundation.co</a:t>
+              <a:t>trends@foresightfactory.co</a:t>
             </a:r>
           </a:p>
         </p:txBody>
@@ -29953,7 +30000,9 @@
           </a:prstGeom>
         </p:spPr>
         <p:txBody>
-          <a:bodyPr/>
+          <a:bodyPr>
+            <a:normAutofit/>
+          </a:bodyPr>
           <a:lstStyle>
             <a:lvl1pPr marL="266700" marR="0" indent="-266700" algn="l" defTabSz="457200" rtl="0" eaLnBrk="1" fontAlgn="auto" latinLnBrk="0" hangingPunct="1">
               <a:lnSpc>
@@ -31163,204 +31212,6 @@
             <a:spLocks noGrp="1"/>
           </p:cNvSpPr>
           <p:nvPr>
-            <p:ph type="body" sz="quarter" idx="12"/>
-          </p:nvPr>
-        </p:nvSpPr>
-        <p:spPr/>
-        <p:txBody>
-          <a:bodyPr/>
-          <a:lstStyle/>
-          <a:p>
-            <a:r>
-              <a:rPr lang="en-GB" dirty="0"/>
-              <a:t>Social media platforms and review sites extend the range of products and services that consumers can publicly review. In 2012, 340 million tweets were posted per day. </a:t>
-            </a:r>
-          </a:p>
-        </p:txBody>
-      </p:sp>
-      <p:sp>
-        <p:nvSpPr>
-          <p:cNvPr id="5" name="Text Placeholder 4"/>
-          <p:cNvSpPr>
-            <a:spLocks noGrp="1"/>
-          </p:cNvSpPr>
-          <p:nvPr>
-            <p:ph type="body" sz="quarter" idx="13"/>
-          </p:nvPr>
-        </p:nvSpPr>
-        <p:spPr/>
-        <p:txBody>
-          <a:bodyPr/>
-          <a:lstStyle/>
-          <a:p>
-            <a:r>
-              <a:rPr lang="en-GB" dirty="0"/>
-              <a:t>High smartphone ownership allows customers to quickly write or read reviews on the go. Semi-expert consumer voices have arisen in most sectors, whose opinions are given extra weight.</a:t>
-            </a:r>
-          </a:p>
-        </p:txBody>
-      </p:sp>
-      <p:sp>
-        <p:nvSpPr>
-          <p:cNvPr id="6" name="Text Placeholder 5"/>
-          <p:cNvSpPr>
-            <a:spLocks noGrp="1"/>
-          </p:cNvSpPr>
-          <p:nvPr>
-            <p:ph type="body" sz="quarter" idx="14"/>
-          </p:nvPr>
-        </p:nvSpPr>
-        <p:spPr/>
-        <p:txBody>
-          <a:bodyPr/>
-          <a:lstStyle/>
-          <a:p>
-            <a:r>
-              <a:rPr lang="en-GB" dirty="0"/>
-              <a:t>An increase in attempts to verify identifies of reviewers in order to rate the trustworthiness of their voices. Fewer sites will allow anonymous reviews to be posted.</a:t>
-            </a:r>
-          </a:p>
-        </p:txBody>
-      </p:sp>
-      <p:sp>
-        <p:nvSpPr>
-          <p:cNvPr id="7" name="Text Placeholder 6"/>
-          <p:cNvSpPr>
-            <a:spLocks noGrp="1"/>
-          </p:cNvSpPr>
-          <p:nvPr>
-            <p:ph type="body" sz="quarter" idx="15"/>
-          </p:nvPr>
-        </p:nvSpPr>
-        <p:spPr/>
-        <p:txBody>
-          <a:bodyPr/>
-          <a:lstStyle/>
-          <a:p>
-            <a:r>
-              <a:rPr lang="en-GB" dirty="0"/>
-              <a:t>Brand interaction with online customer complaints is limited, with customer service efforts focused on in-store feedback and complaints.</a:t>
-            </a:r>
-          </a:p>
-        </p:txBody>
-      </p:sp>
-      <p:sp>
-        <p:nvSpPr>
-          <p:cNvPr id="8" name="Text Placeholder 7"/>
-          <p:cNvSpPr>
-            <a:spLocks noGrp="1"/>
-          </p:cNvSpPr>
-          <p:nvPr>
-            <p:ph type="body" sz="quarter" idx="16"/>
-          </p:nvPr>
-        </p:nvSpPr>
-        <p:spPr/>
-        <p:txBody>
-          <a:bodyPr/>
-          <a:lstStyle/>
-          <a:p>
-            <a:r>
-              <a:rPr lang="en-GB" dirty="0"/>
-              <a:t>Brands find new ways of interacting with customers across a range of social media channels, addressing and responding to concerns, complaints and compliments.</a:t>
-            </a:r>
-          </a:p>
-        </p:txBody>
-      </p:sp>
-      <p:sp>
-        <p:nvSpPr>
-          <p:cNvPr id="9" name="Text Placeholder 8"/>
-          <p:cNvSpPr>
-            <a:spLocks noGrp="1"/>
-          </p:cNvSpPr>
-          <p:nvPr>
-            <p:ph type="body" sz="quarter" idx="17"/>
-          </p:nvPr>
-        </p:nvSpPr>
-        <p:spPr/>
-        <p:txBody>
-          <a:bodyPr/>
-          <a:lstStyle/>
-          <a:p>
-            <a:r>
-              <a:rPr lang="en-GB" dirty="0"/>
-              <a:t>Inviting and engaging consumers to react, review and critique in advance of product or service launches becomes more common for brands.</a:t>
-            </a:r>
-          </a:p>
-        </p:txBody>
-      </p:sp>
-      <p:sp>
-        <p:nvSpPr>
-          <p:cNvPr id="10" name="Text Placeholder 9"/>
-          <p:cNvSpPr>
-            <a:spLocks noGrp="1"/>
-          </p:cNvSpPr>
-          <p:nvPr>
-            <p:ph type="body" sz="quarter" idx="18"/>
-          </p:nvPr>
-        </p:nvSpPr>
-        <p:spPr/>
-        <p:txBody>
-          <a:bodyPr/>
-          <a:lstStyle/>
-          <a:p>
-            <a:r>
-              <a:rPr lang="en-GB" dirty="0"/>
-              <a:t>CSR efforts become an increasingly common way for brands to enhance their brand and raise their profile.</a:t>
-            </a:r>
-          </a:p>
-        </p:txBody>
-      </p:sp>
-      <p:sp>
-        <p:nvSpPr>
-          <p:cNvPr id="11" name="Text Placeholder 10"/>
-          <p:cNvSpPr>
-            <a:spLocks noGrp="1"/>
-          </p:cNvSpPr>
-          <p:nvPr>
-            <p:ph type="body" sz="quarter" idx="19"/>
-          </p:nvPr>
-        </p:nvSpPr>
-        <p:spPr/>
-        <p:txBody>
-          <a:bodyPr/>
-          <a:lstStyle/>
-          <a:p>
-            <a:r>
-              <a:rPr lang="en-GB" dirty="0"/>
-              <a:t>The transparency and lobby-building capacity of social media leads to CSR efforts deemed insincere or ineffectual more easily being called into question.</a:t>
-            </a:r>
-          </a:p>
-        </p:txBody>
-      </p:sp>
-      <p:sp>
-        <p:nvSpPr>
-          <p:cNvPr id="12" name="Text Placeholder 11"/>
-          <p:cNvSpPr>
-            <a:spLocks noGrp="1"/>
-          </p:cNvSpPr>
-          <p:nvPr>
-            <p:ph type="body" sz="quarter" idx="20"/>
-          </p:nvPr>
-        </p:nvSpPr>
-        <p:spPr/>
-        <p:txBody>
-          <a:bodyPr/>
-          <a:lstStyle/>
-          <a:p>
-            <a:r>
-              <a:rPr lang="en-GB" dirty="0"/>
-              <a:t>To pre-empt the quick forming of lobbies and factions, brands’ CSR eschew the general and hone in on specifics  -  ensuring the presence of clear goals.</a:t>
-            </a:r>
-          </a:p>
-        </p:txBody>
-      </p:sp>
-      <p:sp>
-        <p:nvSpPr>
-          <p:cNvPr id="13" name="Text Placeholder 12"/>
-          <p:cNvSpPr>
-            <a:spLocks noGrp="1"/>
-          </p:cNvSpPr>
-          <p:nvPr>
             <p:ph type="body" sz="quarter" idx="21"/>
           </p:nvPr>
         </p:nvSpPr>
@@ -31378,7 +31229,7 @@
       </p:sp>
       <p:sp>
         <p:nvSpPr>
-          <p:cNvPr id="14" name="Text Placeholder 13"/>
+          <p:cNvPr id="5" name="Text Placeholder 4"/>
           <p:cNvSpPr>
             <a:spLocks noGrp="1"/>
           </p:cNvSpPr>
@@ -31400,7 +31251,7 @@
       </p:sp>
       <p:sp>
         <p:nvSpPr>
-          <p:cNvPr id="15" name="Text Placeholder 14"/>
+          <p:cNvPr id="6" name="Text Placeholder 5"/>
           <p:cNvSpPr>
             <a:spLocks noGrp="1"/>
           </p:cNvSpPr>
@@ -31420,10 +31271,208 @@
           </a:p>
         </p:txBody>
       </p:sp>
+      <p:sp>
+        <p:nvSpPr>
+          <p:cNvPr id="7" name="Text Placeholder 6"/>
+          <p:cNvSpPr>
+            <a:spLocks noGrp="1"/>
+          </p:cNvSpPr>
+          <p:nvPr>
+            <p:ph type="body" sz="quarter" idx="24"/>
+          </p:nvPr>
+        </p:nvSpPr>
+        <p:spPr/>
+        <p:txBody>
+          <a:bodyPr/>
+          <a:lstStyle/>
+          <a:p>
+            <a:r>
+              <a:rPr lang="en-GB" dirty="0"/>
+              <a:t>Social media platforms and review sites extend the range of products and services that consumers can publicly review. In 2012, 340 million tweets were posted per day. </a:t>
+            </a:r>
+          </a:p>
+        </p:txBody>
+      </p:sp>
+      <p:sp>
+        <p:nvSpPr>
+          <p:cNvPr id="8" name="Text Placeholder 7"/>
+          <p:cNvSpPr>
+            <a:spLocks noGrp="1"/>
+          </p:cNvSpPr>
+          <p:nvPr>
+            <p:ph type="body" sz="quarter" idx="25"/>
+          </p:nvPr>
+        </p:nvSpPr>
+        <p:spPr/>
+        <p:txBody>
+          <a:bodyPr/>
+          <a:lstStyle/>
+          <a:p>
+            <a:r>
+              <a:rPr lang="en-GB" dirty="0"/>
+              <a:t>High smartphone ownership allows customers to quickly write or read reviews on the go. Semi-expert consumer voices have arisen in most sectors, whose opinions are given extra weight.</a:t>
+            </a:r>
+          </a:p>
+        </p:txBody>
+      </p:sp>
+      <p:sp>
+        <p:nvSpPr>
+          <p:cNvPr id="9" name="Text Placeholder 8"/>
+          <p:cNvSpPr>
+            <a:spLocks noGrp="1"/>
+          </p:cNvSpPr>
+          <p:nvPr>
+            <p:ph type="body" sz="quarter" idx="26"/>
+          </p:nvPr>
+        </p:nvSpPr>
+        <p:spPr/>
+        <p:txBody>
+          <a:bodyPr/>
+          <a:lstStyle/>
+          <a:p>
+            <a:r>
+              <a:rPr lang="en-GB" dirty="0"/>
+              <a:t>An increase in attempts to verify identifies of reviewers in order to rate the trustworthiness of their voices. Fewer sites will allow anonymous reviews to be posted.</a:t>
+            </a:r>
+          </a:p>
+        </p:txBody>
+      </p:sp>
+      <p:sp>
+        <p:nvSpPr>
+          <p:cNvPr id="10" name="Text Placeholder 9"/>
+          <p:cNvSpPr>
+            <a:spLocks noGrp="1"/>
+          </p:cNvSpPr>
+          <p:nvPr>
+            <p:ph type="body" sz="quarter" idx="27"/>
+          </p:nvPr>
+        </p:nvSpPr>
+        <p:spPr/>
+        <p:txBody>
+          <a:bodyPr/>
+          <a:lstStyle/>
+          <a:p>
+            <a:r>
+              <a:rPr lang="en-GB" dirty="0"/>
+              <a:t>Brand interaction with online customer complaints is limited, with customer service efforts focused on in-store feedback and complaints.</a:t>
+            </a:r>
+          </a:p>
+        </p:txBody>
+      </p:sp>
+      <p:sp>
+        <p:nvSpPr>
+          <p:cNvPr id="11" name="Text Placeholder 10"/>
+          <p:cNvSpPr>
+            <a:spLocks noGrp="1"/>
+          </p:cNvSpPr>
+          <p:nvPr>
+            <p:ph type="body" sz="quarter" idx="28"/>
+          </p:nvPr>
+        </p:nvSpPr>
+        <p:spPr/>
+        <p:txBody>
+          <a:bodyPr/>
+          <a:lstStyle/>
+          <a:p>
+            <a:r>
+              <a:rPr lang="en-GB" dirty="0"/>
+              <a:t>Brands find new ways of interacting with customers across a range of social media channels, addressing and responding to concerns, complaints and compliments.</a:t>
+            </a:r>
+          </a:p>
+        </p:txBody>
+      </p:sp>
+      <p:sp>
+        <p:nvSpPr>
+          <p:cNvPr id="12" name="Text Placeholder 11"/>
+          <p:cNvSpPr>
+            <a:spLocks noGrp="1"/>
+          </p:cNvSpPr>
+          <p:nvPr>
+            <p:ph type="body" sz="quarter" idx="29"/>
+          </p:nvPr>
+        </p:nvSpPr>
+        <p:spPr/>
+        <p:txBody>
+          <a:bodyPr/>
+          <a:lstStyle/>
+          <a:p>
+            <a:r>
+              <a:rPr lang="en-GB" dirty="0"/>
+              <a:t>Inviting and engaging consumers to react, review and critique in advance of product or service launches becomes more common for brands.</a:t>
+            </a:r>
+          </a:p>
+        </p:txBody>
+      </p:sp>
+      <p:sp>
+        <p:nvSpPr>
+          <p:cNvPr id="13" name="Text Placeholder 12"/>
+          <p:cNvSpPr>
+            <a:spLocks noGrp="1"/>
+          </p:cNvSpPr>
+          <p:nvPr>
+            <p:ph type="body" sz="quarter" idx="30"/>
+          </p:nvPr>
+        </p:nvSpPr>
+        <p:spPr/>
+        <p:txBody>
+          <a:bodyPr/>
+          <a:lstStyle/>
+          <a:p>
+            <a:r>
+              <a:rPr lang="en-GB" dirty="0"/>
+              <a:t>CSR efforts become an increasingly common way for brands to enhance their brand and raise their profile.</a:t>
+            </a:r>
+          </a:p>
+        </p:txBody>
+      </p:sp>
+      <p:sp>
+        <p:nvSpPr>
+          <p:cNvPr id="14" name="Text Placeholder 13"/>
+          <p:cNvSpPr>
+            <a:spLocks noGrp="1"/>
+          </p:cNvSpPr>
+          <p:nvPr>
+            <p:ph type="body" sz="quarter" idx="31"/>
+          </p:nvPr>
+        </p:nvSpPr>
+        <p:spPr/>
+        <p:txBody>
+          <a:bodyPr/>
+          <a:lstStyle/>
+          <a:p>
+            <a:r>
+              <a:rPr lang="en-GB" dirty="0"/>
+              <a:t>The transparency and lobby-building capacity of social media leads to CSR efforts deemed insincere or ineffectual more easily being called into question.</a:t>
+            </a:r>
+          </a:p>
+        </p:txBody>
+      </p:sp>
+      <p:sp>
+        <p:nvSpPr>
+          <p:cNvPr id="15" name="Text Placeholder 14"/>
+          <p:cNvSpPr>
+            <a:spLocks noGrp="1"/>
+          </p:cNvSpPr>
+          <p:nvPr>
+            <p:ph type="body" sz="quarter" idx="32"/>
+          </p:nvPr>
+        </p:nvSpPr>
+        <p:spPr/>
+        <p:txBody>
+          <a:bodyPr/>
+          <a:lstStyle/>
+          <a:p>
+            <a:r>
+              <a:rPr lang="en-GB" dirty="0"/>
+              <a:t>To pre-empt the quick forming of lobbies and factions, brands’ CSR eschew the general and hone in on specifics  -  ensuring the presence of clear goals.</a:t>
+            </a:r>
+          </a:p>
+        </p:txBody>
+      </p:sp>
     </p:spTree>
     <p:extLst>
       <p:ext uri="{BB962C8B-B14F-4D97-AF65-F5344CB8AC3E}">
-        <p14:creationId xmlns:p14="http://schemas.microsoft.com/office/powerpoint/2010/main" val="1787757013"/>
+        <p14:creationId xmlns:p14="http://schemas.microsoft.com/office/powerpoint/2010/main" val="607448638"/>
       </p:ext>
     </p:extLst>
   </p:cSld>

</xml_diff>

<commit_message>
NVIS-1304 Updating template files
</commit_message>
<xml_diff>
--- a/samples/pptx/test-output.pptx
+++ b/samples/pptx/test-output.pptx
@@ -30422,13 +30422,6 @@
     <p:sldLayoutId id="2147483690" r:id="rId30"/>
     <p:sldLayoutId id="2147483691" r:id="rId31"/>
   </p:sldLayoutIdLst>
-  <p:timing>
-    <p:tnLst>
-      <p:par>
-        <p:cTn id="1" dur="indefinite" restart="never" nodeType="tmRoot"/>
-      </p:par>
-    </p:tnLst>
-  </p:timing>
   <p:txStyles>
     <p:titleStyle>
       <a:lvl1pPr algn="l" defTabSz="457200" rtl="0" eaLnBrk="1" latinLnBrk="0" hangingPunct="1">
@@ -30862,9 +30855,6 @@
           <a:bodyPr/>
           <a:lstStyle/>
           <a:p>
-            <a:pPr>
-              <a:pStyle a:val="Heading2"/>
-            </a:pPr>
             <a:r>
               <a:rPr lang="en-GB" b="1" dirty="0"/>
               <a:t xml:space="preserve">Sub Heading 1</a:t>
@@ -30887,9 +30877,6 @@
             </a:r>
           </a:p>
           <a:p>
-            <a:pPr>
-              <a:pStyle a:val="Heading2"/>
-            </a:pPr>
             <a:r>
               <a:rPr lang="en-GB" b="1" dirty="0"/>
               <a:t xml:space="preserve">Sub Heading 2</a:t>

</xml_diff>

<commit_message>
NVIS-1304 update heading template
</commit_message>
<xml_diff>
--- a/samples/pptx/test-output.pptx
+++ b/samples/pptx/test-output.pptx
@@ -34768,6 +34768,301 @@
 </a:theme>
 </file>
 
+<file path=ppt/theme/theme3.xml><?xml version="1.0" encoding="utf-8"?>
+<a:theme xmlns:a="http://schemas.openxmlformats.org/drawingml/2006/main" name="Office Theme">
+  <a:themeElements>
+    <a:clrScheme name="Office">
+      <a:dk1>
+        <a:sysClr val="windowText" lastClr="000000"/>
+      </a:dk1>
+      <a:lt1>
+        <a:sysClr val="window" lastClr="FFFFFF"/>
+      </a:lt1>
+      <a:dk2>
+        <a:srgbClr val="44546A"/>
+      </a:dk2>
+      <a:lt2>
+        <a:srgbClr val="E7E6E6"/>
+      </a:lt2>
+      <a:accent1>
+        <a:srgbClr val="5B9BD5"/>
+      </a:accent1>
+      <a:accent2>
+        <a:srgbClr val="ED7D31"/>
+      </a:accent2>
+      <a:accent3>
+        <a:srgbClr val="A5A5A5"/>
+      </a:accent3>
+      <a:accent4>
+        <a:srgbClr val="FFC000"/>
+      </a:accent4>
+      <a:accent5>
+        <a:srgbClr val="4472C4"/>
+      </a:accent5>
+      <a:accent6>
+        <a:srgbClr val="70AD47"/>
+      </a:accent6>
+      <a:hlink>
+        <a:srgbClr val="0563C1"/>
+      </a:hlink>
+      <a:folHlink>
+        <a:srgbClr val="954F72"/>
+      </a:folHlink>
+    </a:clrScheme>
+    <a:fontScheme name="Office">
+      <a:majorFont>
+        <a:latin typeface="Calibri Light" panose="020F0302020204030204"/>
+        <a:ea typeface=""/>
+        <a:cs typeface=""/>
+        <a:font script="Jpan" typeface="游ゴシック Light"/>
+        <a:font script="Hang" typeface="맑은 고딕"/>
+        <a:font script="Hans" typeface="等线 Light"/>
+        <a:font script="Hant" typeface="新細明體"/>
+        <a:font script="Arab" typeface="Times New Roman"/>
+        <a:font script="Hebr" typeface="Times New Roman"/>
+        <a:font script="Thai" typeface="Angsana New"/>
+        <a:font script="Ethi" typeface="Nyala"/>
+        <a:font script="Beng" typeface="Vrinda"/>
+        <a:font script="Gujr" typeface="Shruti"/>
+        <a:font script="Khmr" typeface="MoolBoran"/>
+        <a:font script="Knda" typeface="Tunga"/>
+        <a:font script="Guru" typeface="Raavi"/>
+        <a:font script="Cans" typeface="Euphemia"/>
+        <a:font script="Cher" typeface="Plantagenet Cherokee"/>
+        <a:font script="Yiii" typeface="Microsoft Yi Baiti"/>
+        <a:font script="Tibt" typeface="Microsoft Himalaya"/>
+        <a:font script="Thaa" typeface="MV Boli"/>
+        <a:font script="Deva" typeface="Mangal"/>
+        <a:font script="Telu" typeface="Gautami"/>
+        <a:font script="Taml" typeface="Latha"/>
+        <a:font script="Syrc" typeface="Estrangelo Edessa"/>
+        <a:font script="Orya" typeface="Kalinga"/>
+        <a:font script="Mlym" typeface="Kartika"/>
+        <a:font script="Laoo" typeface="DokChampa"/>
+        <a:font script="Sinh" typeface="Iskoola Pota"/>
+        <a:font script="Mong" typeface="Mongolian Baiti"/>
+        <a:font script="Viet" typeface="Times New Roman"/>
+        <a:font script="Uigh" typeface="Microsoft Uighur"/>
+        <a:font script="Geor" typeface="Sylfaen"/>
+        <a:font script="Armn" typeface="Arial"/>
+        <a:font script="Bugi" typeface="Leelawadee UI"/>
+        <a:font script="Bopo" typeface="Microsoft JhengHei"/>
+        <a:font script="Java" typeface="Javanese Text"/>
+        <a:font script="Lisu" typeface="Segoe UI"/>
+        <a:font script="Mymr" typeface="Myanmar Text"/>
+        <a:font script="Nkoo" typeface="Ebrima"/>
+        <a:font script="Olck" typeface="Nirmala UI"/>
+        <a:font script="Osma" typeface="Ebrima"/>
+        <a:font script="Phag" typeface="Phagspa"/>
+        <a:font script="Syrn" typeface="Estrangelo Edessa"/>
+        <a:font script="Syrj" typeface="Estrangelo Edessa"/>
+        <a:font script="Syre" typeface="Estrangelo Edessa"/>
+        <a:font script="Sora" typeface="Nirmala UI"/>
+        <a:font script="Tale" typeface="Microsoft Tai Le"/>
+        <a:font script="Talu" typeface="Microsoft New Tai Lue"/>
+        <a:font script="Tfng" typeface="Ebrima"/>
+      </a:majorFont>
+      <a:minorFont>
+        <a:latin typeface="Calibri" panose="020F0502020204030204"/>
+        <a:ea typeface=""/>
+        <a:cs typeface=""/>
+        <a:font script="Jpan" typeface="游ゴシック"/>
+        <a:font script="Hang" typeface="맑은 고딕"/>
+        <a:font script="Hans" typeface="等线"/>
+        <a:font script="Hant" typeface="新細明體"/>
+        <a:font script="Arab" typeface="Arial"/>
+        <a:font script="Hebr" typeface="Arial"/>
+        <a:font script="Thai" typeface="Cordia New"/>
+        <a:font script="Ethi" typeface="Nyala"/>
+        <a:font script="Beng" typeface="Vrinda"/>
+        <a:font script="Gujr" typeface="Shruti"/>
+        <a:font script="Khmr" typeface="DaunPenh"/>
+        <a:font script="Knda" typeface="Tunga"/>
+        <a:font script="Guru" typeface="Raavi"/>
+        <a:font script="Cans" typeface="Euphemia"/>
+        <a:font script="Cher" typeface="Plantagenet Cherokee"/>
+        <a:font script="Yiii" typeface="Microsoft Yi Baiti"/>
+        <a:font script="Tibt" typeface="Microsoft Himalaya"/>
+        <a:font script="Thaa" typeface="MV Boli"/>
+        <a:font script="Deva" typeface="Mangal"/>
+        <a:font script="Telu" typeface="Gautami"/>
+        <a:font script="Taml" typeface="Latha"/>
+        <a:font script="Syrc" typeface="Estrangelo Edessa"/>
+        <a:font script="Orya" typeface="Kalinga"/>
+        <a:font script="Mlym" typeface="Kartika"/>
+        <a:font script="Laoo" typeface="DokChampa"/>
+        <a:font script="Sinh" typeface="Iskoola Pota"/>
+        <a:font script="Mong" typeface="Mongolian Baiti"/>
+        <a:font script="Viet" typeface="Arial"/>
+        <a:font script="Uigh" typeface="Microsoft Uighur"/>
+        <a:font script="Geor" typeface="Sylfaen"/>
+        <a:font script="Armn" typeface="Arial"/>
+        <a:font script="Bugi" typeface="Leelawadee UI"/>
+        <a:font script="Bopo" typeface="Microsoft JhengHei"/>
+        <a:font script="Java" typeface="Javanese Text"/>
+        <a:font script="Lisu" typeface="Segoe UI"/>
+        <a:font script="Mymr" typeface="Myanmar Text"/>
+        <a:font script="Nkoo" typeface="Ebrima"/>
+        <a:font script="Olck" typeface="Nirmala UI"/>
+        <a:font script="Osma" typeface="Ebrima"/>
+        <a:font script="Phag" typeface="Phagspa"/>
+        <a:font script="Syrn" typeface="Estrangelo Edessa"/>
+        <a:font script="Syrj" typeface="Estrangelo Edessa"/>
+        <a:font script="Syre" typeface="Estrangelo Edessa"/>
+        <a:font script="Sora" typeface="Nirmala UI"/>
+        <a:font script="Tale" typeface="Microsoft Tai Le"/>
+        <a:font script="Talu" typeface="Microsoft New Tai Lue"/>
+        <a:font script="Tfng" typeface="Ebrima"/>
+      </a:minorFont>
+    </a:fontScheme>
+    <a:fmtScheme name="Office">
+      <a:fillStyleLst>
+        <a:solidFill>
+          <a:schemeClr val="phClr"/>
+        </a:solidFill>
+        <a:gradFill rotWithShape="1">
+          <a:gsLst>
+            <a:gs pos="0">
+              <a:schemeClr val="phClr">
+                <a:lumMod val="110000"/>
+                <a:satMod val="105000"/>
+                <a:tint val="67000"/>
+              </a:schemeClr>
+            </a:gs>
+            <a:gs pos="50000">
+              <a:schemeClr val="phClr">
+                <a:lumMod val="105000"/>
+                <a:satMod val="103000"/>
+                <a:tint val="73000"/>
+              </a:schemeClr>
+            </a:gs>
+            <a:gs pos="100000">
+              <a:schemeClr val="phClr">
+                <a:lumMod val="105000"/>
+                <a:satMod val="109000"/>
+                <a:tint val="81000"/>
+              </a:schemeClr>
+            </a:gs>
+          </a:gsLst>
+          <a:lin ang="5400000" scaled="0"/>
+        </a:gradFill>
+        <a:gradFill rotWithShape="1">
+          <a:gsLst>
+            <a:gs pos="0">
+              <a:schemeClr val="phClr">
+                <a:satMod val="103000"/>
+                <a:lumMod val="102000"/>
+                <a:tint val="94000"/>
+              </a:schemeClr>
+            </a:gs>
+            <a:gs pos="50000">
+              <a:schemeClr val="phClr">
+                <a:satMod val="110000"/>
+                <a:lumMod val="100000"/>
+                <a:shade val="100000"/>
+              </a:schemeClr>
+            </a:gs>
+            <a:gs pos="100000">
+              <a:schemeClr val="phClr">
+                <a:lumMod val="99000"/>
+                <a:satMod val="120000"/>
+                <a:shade val="78000"/>
+              </a:schemeClr>
+            </a:gs>
+          </a:gsLst>
+          <a:lin ang="5400000" scaled="0"/>
+        </a:gradFill>
+      </a:fillStyleLst>
+      <a:lnStyleLst>
+        <a:ln w="6350" cap="flat" cmpd="sng" algn="ctr">
+          <a:solidFill>
+            <a:schemeClr val="phClr"/>
+          </a:solidFill>
+          <a:prstDash val="solid"/>
+          <a:miter lim="800000"/>
+        </a:ln>
+        <a:ln w="12700" cap="flat" cmpd="sng" algn="ctr">
+          <a:solidFill>
+            <a:schemeClr val="phClr"/>
+          </a:solidFill>
+          <a:prstDash val="solid"/>
+          <a:miter lim="800000"/>
+        </a:ln>
+        <a:ln w="19050" cap="flat" cmpd="sng" algn="ctr">
+          <a:solidFill>
+            <a:schemeClr val="phClr"/>
+          </a:solidFill>
+          <a:prstDash val="solid"/>
+          <a:miter lim="800000"/>
+        </a:ln>
+      </a:lnStyleLst>
+      <a:effectStyleLst>
+        <a:effectStyle>
+          <a:effectLst/>
+        </a:effectStyle>
+        <a:effectStyle>
+          <a:effectLst/>
+        </a:effectStyle>
+        <a:effectStyle>
+          <a:effectLst>
+            <a:outerShdw blurRad="57150" dist="19050" dir="5400000" algn="ctr" rotWithShape="0">
+              <a:srgbClr val="000000">
+                <a:alpha val="63000"/>
+              </a:srgbClr>
+            </a:outerShdw>
+          </a:effectLst>
+        </a:effectStyle>
+      </a:effectStyleLst>
+      <a:bgFillStyleLst>
+        <a:solidFill>
+          <a:schemeClr val="phClr"/>
+        </a:solidFill>
+        <a:solidFill>
+          <a:schemeClr val="phClr">
+            <a:tint val="95000"/>
+            <a:satMod val="170000"/>
+          </a:schemeClr>
+        </a:solidFill>
+        <a:gradFill rotWithShape="1">
+          <a:gsLst>
+            <a:gs pos="0">
+              <a:schemeClr val="phClr">
+                <a:tint val="93000"/>
+                <a:satMod val="150000"/>
+                <a:shade val="98000"/>
+                <a:lumMod val="102000"/>
+              </a:schemeClr>
+            </a:gs>
+            <a:gs pos="50000">
+              <a:schemeClr val="phClr">
+                <a:tint val="98000"/>
+                <a:satMod val="130000"/>
+                <a:shade val="90000"/>
+                <a:lumMod val="103000"/>
+              </a:schemeClr>
+            </a:gs>
+            <a:gs pos="100000">
+              <a:schemeClr val="phClr">
+                <a:shade val="63000"/>
+                <a:satMod val="120000"/>
+              </a:schemeClr>
+            </a:gs>
+          </a:gsLst>
+          <a:lin ang="5400000" scaled="0"/>
+        </a:gradFill>
+      </a:bgFillStyleLst>
+    </a:fmtScheme>
+  </a:themeElements>
+  <a:objectDefaults/>
+  <a:extraClrSchemeLst/>
+  <a:extLst>
+    <a:ext uri="{05A4C25C-085E-4340-85A3-A5531E510DB2}">
+      <thm15:themeFamily xmlns:thm15="http://schemas.microsoft.com/office/thememl/2012/main" name="Office Theme" id="{62F939B6-93AF-4DB8-9C6B-D6C7DFDC589F}" vid="{4A3C46E8-61CC-4603-A589-7422A47A8E4A}"/>
+    </a:ext>
+  </a:extLst>
+</a:theme>
+</file>
+
 <file path=customXml/item1.xml><?xml version="1.0" encoding="utf-8"?>
 <ct:contentTypeSchema xmlns:ct="http://schemas.microsoft.com/office/2006/metadata/contentType" xmlns:ma="http://schemas.microsoft.com/office/2006/metadata/properties/metaAttributes" ct:_="" ma:_="" ma:contentTypeName="Document" ma:contentTypeID="0x01010031D6908C9706DC43861724EF3F858898" ma:contentTypeVersion="0" ma:contentTypeDescription="Create a new document." ma:contentTypeScope="" ma:versionID="39b2408c7959e603139a5c954a71cf55">
   <xsd:schema xmlns:xsd="http://www.w3.org/2001/XMLSchema" xmlns:p="http://schemas.microsoft.com/office/2006/metadata/properties" targetNamespace="http://schemas.microsoft.com/office/2006/metadata/properties" ma:root="true" ma:fieldsID="2d9ac0e344db50f433fcb122b5d6bd0c">

</xml_diff>

<commit_message>
refactor to work dynamically with embeded slide masters
</commit_message>
<xml_diff>
--- a/samples/pptx/test-output.pptx
+++ b/samples/pptx/test-output.pptx
@@ -3,21 +3,21 @@
 <p:presentation xmlns:a="http://schemas.openxmlformats.org/drawingml/2006/main" xmlns:r="http://schemas.openxmlformats.org/officeDocument/2006/relationships" xmlns:p="http://schemas.openxmlformats.org/presentationml/2006/main" saveSubsetFonts="1">
   <p:sldMasterIdLst>
     <p:sldMasterId r:id="rId1"/>
-    <p:sldMasterId r:id="rId3"/>
+    <p:sldMasterId r:id="rId2"/>
   </p:sldMasterIdLst>
   <p:notesMasterIdLst>
-    <p:notesMasterId r:id="rId4"/>
+    <p:notesMasterId r:id="rId3"/>
   </p:notesMasterIdLst>
   <p:sldIdLst>
-    <p:sldId id="259" r:id="rId9"/>
-    <p:sldId id="260" r:id="rId10"/>
-    <p:sldId id="261" r:id="rId11"/>
-    <p:sldId id="262" r:id="rId12"/>
-    <p:sldId id="263" r:id="rId13"/>
-    <p:sldId id="264" r:id="rId14"/>
-    <p:sldId id="265" r:id="rId15"/>
-    <p:sldId id="266" r:id="rId16"/>
-    <p:sldId id="267" r:id="rId17"/>
+    <p:sldId id="259" r:id="rId4"/>
+    <p:sldId id="260" r:id="rId5"/>
+    <p:sldId id="261" r:id="rId6"/>
+    <p:sldId id="262" r:id="rId7"/>
+    <p:sldId id="263" r:id="rId8"/>
+    <p:sldId id="264" r:id="rId9"/>
+    <p:sldId id="265" r:id="rId10"/>
+    <p:sldId id="266" r:id="rId11"/>
+    <p:sldId id="267" r:id="rId12"/>
   </p:sldIdLst>
   <p:sldSz cx="9144000" cy="6858000" type="screen4x3"/>
   <p:notesSz cx="6858000" cy="9144000"/>
@@ -3153,7 +3153,7 @@
 </c:chartSpace>
 </file>
 
-<file path=ppt/notesMasters/notesMaster4.xml><?xml version="1.0" encoding="utf-8"?>
+<file path=ppt/notesMasters/notesMaster3.xml><?xml version="1.0" encoding="utf-8"?>
 <p:notesMaster xmlns:a="http://schemas.openxmlformats.org/drawingml/2006/main" xmlns:r="http://schemas.openxmlformats.org/officeDocument/2006/relationships" xmlns:p="http://schemas.openxmlformats.org/presentationml/2006/main">
   <p:cSld>
     <p:bg>
@@ -4783,7 +4783,7 @@
 </p:sldLayout>
 </file>
 
-<file path=ppt/slideLayouts/slideLayout11.xml><?xml version="1.0" encoding="utf-8"?>
+<file path=ppt/slideLayouts/slideLayout10.xml><?xml version="1.0" encoding="utf-8"?>
 <p:sldLayout xmlns:a="http://schemas.openxmlformats.org/drawingml/2006/main" xmlns:r="http://schemas.openxmlformats.org/officeDocument/2006/relationships" xmlns:p="http://schemas.openxmlformats.org/presentationml/2006/main" preserve="1">
   <p:cSld name="Title and Content Cyan">
     <p:spTree>
@@ -5375,7 +5375,7 @@
 </p:sldLayout>
 </file>
 
-<file path=ppt/slideLayouts/slideLayout12.xml><?xml version="1.0" encoding="utf-8"?>
+<file path=ppt/slideLayouts/slideLayout11.xml><?xml version="1.0" encoding="utf-8"?>
 <p:sldLayout xmlns:a="http://schemas.openxmlformats.org/drawingml/2006/main" xmlns:r="http://schemas.openxmlformats.org/officeDocument/2006/relationships" xmlns:p="http://schemas.openxmlformats.org/presentationml/2006/main" preserve="1">
   <p:cSld name="Title Only">
     <p:spTree>
@@ -5825,7 +5825,7 @@
 </p:sldLayout>
 </file>
 
-<file path=ppt/slideLayouts/slideLayout13.xml><?xml version="1.0" encoding="utf-8"?>
+<file path=ppt/slideLayouts/slideLayout12.xml><?xml version="1.0" encoding="utf-8"?>
 <p:sldLayout xmlns:a="http://schemas.openxmlformats.org/drawingml/2006/main" xmlns:r="http://schemas.openxmlformats.org/officeDocument/2006/relationships" xmlns:p="http://schemas.openxmlformats.org/presentationml/2006/main" preserve="1">
   <p:cSld name="Title Only Light Grey">
     <p:spTree>
@@ -6329,7 +6329,7 @@
 </p:sldLayout>
 </file>
 
-<file path=ppt/slideLayouts/slideLayout14.xml><?xml version="1.0" encoding="utf-8"?>
+<file path=ppt/slideLayouts/slideLayout13.xml><?xml version="1.0" encoding="utf-8"?>
 <p:sldLayout xmlns:a="http://schemas.openxmlformats.org/drawingml/2006/main" xmlns:r="http://schemas.openxmlformats.org/officeDocument/2006/relationships" xmlns:p="http://schemas.openxmlformats.org/presentationml/2006/main" preserve="1">
   <p:cSld name="Title Only Dark Grey">
     <p:spTree>
@@ -6824,7 +6824,7 @@
 </p:sldLayout>
 </file>
 
-<file path=ppt/slideLayouts/slideLayout15.xml><?xml version="1.0" encoding="utf-8"?>
+<file path=ppt/slideLayouts/slideLayout14.xml><?xml version="1.0" encoding="utf-8"?>
 <p:sldLayout xmlns:a="http://schemas.openxmlformats.org/drawingml/2006/main" xmlns:r="http://schemas.openxmlformats.org/officeDocument/2006/relationships" xmlns:p="http://schemas.openxmlformats.org/presentationml/2006/main" preserve="1">
   <p:cSld name="Title Only Cyan">
     <p:spTree>
@@ -7316,7 +7316,7 @@
 </p:sldLayout>
 </file>
 
-<file path=ppt/slideLayouts/slideLayout16.xml><?xml version="1.0" encoding="utf-8"?>
+<file path=ppt/slideLayouts/slideLayout15.xml><?xml version="1.0" encoding="utf-8"?>
 <p:sldLayout xmlns:a="http://schemas.openxmlformats.org/drawingml/2006/main" xmlns:r="http://schemas.openxmlformats.org/officeDocument/2006/relationships" xmlns:p="http://schemas.openxmlformats.org/presentationml/2006/main" preserve="1">
   <p:cSld name="Blank">
     <p:spTree>
@@ -7720,7 +7720,7 @@
 </p:sldLayout>
 </file>
 
-<file path=ppt/slideLayouts/slideLayout17.xml><?xml version="1.0" encoding="utf-8"?>
+<file path=ppt/slideLayouts/slideLayout16.xml><?xml version="1.0" encoding="utf-8"?>
 <p:sldLayout xmlns:a="http://schemas.openxmlformats.org/drawingml/2006/main" xmlns:r="http://schemas.openxmlformats.org/officeDocument/2006/relationships" xmlns:p="http://schemas.openxmlformats.org/presentationml/2006/main" preserve="1">
   <p:cSld name="Title and Content Dark Grey">
     <p:spTree>
@@ -8317,7 +8317,7 @@
 </p:sldLayout>
 </file>
 
-<file path=ppt/slideLayouts/slideLayout18.xml><?xml version="1.0" encoding="utf-8"?>
+<file path=ppt/slideLayouts/slideLayout17.xml><?xml version="1.0" encoding="utf-8"?>
 <p:sldLayout xmlns:a="http://schemas.openxmlformats.org/drawingml/2006/main" xmlns:r="http://schemas.openxmlformats.org/officeDocument/2006/relationships" xmlns:p="http://schemas.openxmlformats.org/presentationml/2006/main" preserve="1">
   <p:cSld name="Title and Content Light Grey">
     <p:spTree>
@@ -8910,7 +8910,7 @@
 </p:sldLayout>
 </file>
 
-<file path=ppt/slideLayouts/slideLayout19.xml><?xml version="1.0" encoding="utf-8"?>
+<file path=ppt/slideLayouts/slideLayout18.xml><?xml version="1.0" encoding="utf-8"?>
 <p:sldLayout xmlns:a="http://schemas.openxmlformats.org/drawingml/2006/main" xmlns:r="http://schemas.openxmlformats.org/officeDocument/2006/relationships" xmlns:p="http://schemas.openxmlformats.org/presentationml/2006/main" preserve="1">
   <p:cSld name="Title and Content">
     <p:spTree>
@@ -9456,665 +9456,7 @@
 </p:sldLayout>
 </file>
 
-<file path=ppt/slideLayouts/slideLayout2.xml><?xml version="1.0" encoding="utf-8"?>
-<p:sldLayout xmlns:a="http://schemas.openxmlformats.org/drawingml/2006/main" xmlns:r="http://schemas.openxmlformats.org/officeDocument/2006/relationships" xmlns:p="http://schemas.openxmlformats.org/presentationml/2006/main" preserve="1" userDrawn="1">
-  <p:cSld name="The Briefing">
-    <p:spTree>
-      <p:nvGrpSpPr>
-        <p:cNvPr id="1" name=""/>
-        <p:cNvGrpSpPr/>
-        <p:nvPr/>
-      </p:nvGrpSpPr>
-      <p:grpSpPr>
-        <a:xfrm>
-          <a:off x="0" y="0"/>
-          <a:ext cx="0" cy="0"/>
-          <a:chOff x="0" y="0"/>
-          <a:chExt cx="0" cy="0"/>
-        </a:xfrm>
-      </p:grpSpPr>
-      <p:sp>
-        <p:nvSpPr>
-          <p:cNvPr id="17" name="TextBox 16"/>
-          <p:cNvSpPr txBox="1"/>
-          <p:nvPr userDrawn="1"/>
-        </p:nvSpPr>
-        <p:spPr>
-          <a:xfrm>
-            <a:off x="8662881" y="6338849"/>
-            <a:ext cx="309700" cy="194925"/>
-          </a:xfrm>
-          <a:prstGeom prst="rect">
-            <a:avLst/>
-          </a:prstGeom>
-          <a:noFill/>
-        </p:spPr>
-        <p:txBody>
-          <a:bodyPr wrap="none" rtlCol="0" anchor="ctr">
-            <a:spAutoFit/>
-          </a:bodyPr>
-          <a:lstStyle/>
-          <a:p>
-            <a:pPr algn="r">
-              <a:lnSpc>
-                <a:spcPts val="800"/>
-              </a:lnSpc>
-            </a:pPr>
-            <a:fld id="{0E0A9B4E-19F2-4E81-81C4-98D63547DE75}" type="slidenum">
-              <a:rPr lang="en-GB" sz="800">
-                <a:solidFill>
-                  <a:srgbClr val="35BDB2"/>
-                </a:solidFill>
-                <a:cs typeface="Arial" pitchFamily="34" charset="0"/>
-              </a:rPr>
-              <a:pPr algn="r">
-                <a:lnSpc>
-                  <a:spcPts val="800"/>
-                </a:lnSpc>
-              </a:pPr>
-              <a:t>‹#›</a:t>
-            </a:fld>
-            <a:endParaRPr lang="en-GB" sz="800" dirty="0">
-              <a:solidFill>
-                <a:srgbClr val="35BDB2"/>
-              </a:solidFill>
-              <a:cs typeface="Arial" pitchFamily="34" charset="0"/>
-            </a:endParaRPr>
-          </a:p>
-        </p:txBody>
-      </p:sp>
-      <p:cxnSp>
-        <p:nvCxnSpPr>
-          <p:cNvPr id="18" name="Straight Connector 17"/>
-          <p:cNvCxnSpPr/>
-          <p:nvPr userDrawn="1"/>
-        </p:nvCxnSpPr>
-        <p:spPr>
-          <a:xfrm rot="5400000">
-            <a:off x="8330221" y="6547429"/>
-            <a:ext cx="619558" cy="1589"/>
-          </a:xfrm>
-          <a:prstGeom prst="line">
-            <a:avLst/>
-          </a:prstGeom>
-          <a:noFill/>
-          <a:ln w="19050" cap="flat" cmpd="sng" algn="ctr">
-            <a:solidFill>
-              <a:srgbClr val="35BDB2"/>
-            </a:solidFill>
-            <a:prstDash val="solid"/>
-          </a:ln>
-          <a:effectLst/>
-        </p:spPr>
-      </p:cxnSp>
-      <p:sp>
-        <p:nvSpPr>
-          <p:cNvPr id="19" name="Text Placeholder 14"/>
-          <p:cNvSpPr>
-            <a:spLocks noGrp="1"/>
-          </p:cNvSpPr>
-          <p:nvPr>
-            <p:ph type="body" sz="quarter" idx="10" hasCustomPrompt="1"/>
-          </p:nvPr>
-        </p:nvSpPr>
-        <p:spPr>
-          <a:xfrm>
-            <a:off x="684213" y="6338849"/>
-            <a:ext cx="7929834" cy="194925"/>
-          </a:xfrm>
-          <a:prstGeom prst="rect">
-            <a:avLst/>
-          </a:prstGeom>
-        </p:spPr>
-        <p:txBody>
-          <a:bodyPr anchor="ctr">
-            <a:noAutofit/>
-          </a:bodyPr>
-          <a:lstStyle>
-            <a:lvl1pPr marL="0" marR="0" indent="0" algn="r" defTabSz="457200" rtl="0" eaLnBrk="1" fontAlgn="auto" latinLnBrk="0" hangingPunct="1">
-              <a:lnSpc>
-                <a:spcPts val="800"/>
-              </a:lnSpc>
-              <a:spcBef>
-                <a:spcPts val="0"/>
-              </a:spcBef>
-              <a:spcAft>
-                <a:spcPts val="0"/>
-              </a:spcAft>
-              <a:buClrTx/>
-              <a:buSzTx/>
-              <a:buFont typeface="Arial"/>
-              <a:buNone/>
-              <a:tabLst/>
-              <a:defRPr sz="800" baseline="0">
-                <a:solidFill>
-                  <a:schemeClr val="tx1">
-                    <a:lumMod val="50000"/>
-                    <a:lumOff val="50000"/>
-                  </a:schemeClr>
-                </a:solidFill>
-              </a:defRPr>
-            </a:lvl1pPr>
-          </a:lstStyle>
-          <a:p>
-            <a:pPr marL="0" marR="0" lvl="0" indent="0" algn="r" defTabSz="457200" rtl="0" eaLnBrk="1" fontAlgn="auto" latinLnBrk="0" hangingPunct="1">
-              <a:lnSpc>
-                <a:spcPts val="800"/>
-              </a:lnSpc>
-              <a:spcBef>
-                <a:spcPts val="0"/>
-              </a:spcBef>
-              <a:spcAft>
-                <a:spcPts val="0"/>
-              </a:spcAft>
-              <a:buClrTx/>
-              <a:buSzTx/>
-              <a:buFont typeface="Arial"/>
-              <a:buNone/>
-              <a:tabLst/>
-              <a:defRPr/>
-            </a:pPr>
-            <a:r>
-              <a:rPr kumimoji="0" lang="en-GB" sz="800" b="0" i="0" u="none" strike="noStrike" kern="0" cap="none" spc="0" normalizeH="0" baseline="0" noProof="0" dirty="0">
-                <a:ln>
-                  <a:noFill/>
-                </a:ln>
-                <a:solidFill>
-                  <a:srgbClr val="000000">
-                    <a:lumMod val="50000"/>
-                    <a:lumOff val="50000"/>
-                  </a:srgbClr>
-                </a:solidFill>
-                <a:effectLst/>
-                <a:uLnTx/>
-                <a:uFillTx/>
-              </a:rPr>
-              <a:t>Insert source/photo credit here</a:t>
-            </a:r>
-          </a:p>
-        </p:txBody>
-      </p:sp>
-      <p:sp>
-        <p:nvSpPr>
-          <p:cNvPr id="20" name="Title 1"/>
-          <p:cNvSpPr>
-            <a:spLocks noGrp="1"/>
-          </p:cNvSpPr>
-          <p:nvPr>
-            <p:ph type="title" hasCustomPrompt="1"/>
-          </p:nvPr>
-        </p:nvSpPr>
-        <p:spPr>
-          <a:xfrm>
-            <a:off x="250827" y="260350"/>
-            <a:ext cx="8642348" cy="443198"/>
-          </a:xfrm>
-          <a:prstGeom prst="rect">
-            <a:avLst/>
-          </a:prstGeom>
-        </p:spPr>
-        <p:txBody>
-          <a:bodyPr wrap="square" lIns="0" tIns="0" rIns="0" bIns="0" anchor="t">
-            <a:spAutoFit/>
-          </a:bodyPr>
-          <a:lstStyle>
-            <a:lvl1pPr algn="l">
-              <a:lnSpc>
-                <a:spcPct val="90000"/>
-              </a:lnSpc>
-              <a:defRPr sz="3200">
-                <a:solidFill>
-                  <a:srgbClr val="35BDB2"/>
-                </a:solidFill>
-                <a:latin typeface="Arial" pitchFamily="34" charset="0"/>
-                <a:cs typeface="Arial" pitchFamily="34" charset="0"/>
-              </a:defRPr>
-            </a:lvl1pPr>
-          </a:lstStyle>
-          <a:p>
-            <a:pPr marL="0" marR="0" lvl="0" indent="0" algn="l" defTabSz="914400" eaLnBrk="1" fontAlgn="auto" latinLnBrk="0" hangingPunct="1">
-              <a:lnSpc>
-                <a:spcPct val="90000"/>
-              </a:lnSpc>
-              <a:spcBef>
-                <a:spcPts val="0"/>
-              </a:spcBef>
-              <a:spcAft>
-                <a:spcPts val="0"/>
-              </a:spcAft>
-              <a:buClrTx/>
-              <a:buSzTx/>
-              <a:buFontTx/>
-              <a:buNone/>
-              <a:tabLst/>
-              <a:defRPr/>
-            </a:pPr>
-            <a:r>
-              <a:rPr kumimoji="0" lang="en-US" sz="3200" b="0" i="0" u="none" strike="noStrike" kern="0" cap="none" spc="0" normalizeH="0" baseline="0" noProof="0" dirty="0">
-                <a:ln>
-                  <a:noFill/>
-                </a:ln>
-                <a:solidFill>
-                  <a:srgbClr val="35BDB2"/>
-                </a:solidFill>
-                <a:effectLst/>
-                <a:uLnTx/>
-                <a:uFillTx/>
-                <a:latin typeface="Arial" pitchFamily="34" charset="0"/>
-                <a:cs typeface="Arial" pitchFamily="34" charset="0"/>
-              </a:rPr>
-              <a:t>The Briefing</a:t>
-            </a:r>
-          </a:p>
-        </p:txBody>
-      </p:sp>
-      <p:grpSp>
-        <p:nvGrpSpPr>
-          <p:cNvPr id="21" name="Group 5"/>
-          <p:cNvGrpSpPr>
-            <a:grpSpLocks noChangeAspect="1"/>
-          </p:cNvGrpSpPr>
-          <p:nvPr userDrawn="1"/>
-        </p:nvGrpSpPr>
-        <p:grpSpPr bwMode="auto">
-          <a:xfrm>
-            <a:off x="250826" y="6236525"/>
-            <a:ext cx="433388" cy="361125"/>
-            <a:chOff x="-796" y="1752"/>
-            <a:chExt cx="2267" cy="1889"/>
-          </a:xfrm>
-          <a:solidFill>
-            <a:srgbClr val="35BDB2"/>
-          </a:solidFill>
-        </p:grpSpPr>
-        <p:sp>
-          <p:nvSpPr>
-            <p:cNvPr id="22" name="Freeform 6"/>
-            <p:cNvSpPr>
-              <a:spLocks/>
-            </p:cNvSpPr>
-            <p:nvPr userDrawn="1"/>
-          </p:nvSpPr>
-          <p:spPr bwMode="auto">
-            <a:xfrm>
-              <a:off x="-360" y="1752"/>
-              <a:ext cx="1831" cy="1889"/>
-            </a:xfrm>
-            <a:custGeom>
-              <a:avLst/>
-              <a:gdLst/>
-              <a:ahLst/>
-              <a:cxnLst>
-                <a:cxn ang="0">
-                  <a:pos x="1454" y="0"/>
-                </a:cxn>
-                <a:cxn ang="0">
-                  <a:pos x="1454" y="1511"/>
-                </a:cxn>
-                <a:cxn ang="0">
-                  <a:pos x="0" y="1511"/>
-                </a:cxn>
-                <a:cxn ang="0">
-                  <a:pos x="0" y="1889"/>
-                </a:cxn>
-                <a:cxn ang="0">
-                  <a:pos x="1831" y="1889"/>
-                </a:cxn>
-                <a:cxn ang="0">
-                  <a:pos x="1831" y="0"/>
-                </a:cxn>
-                <a:cxn ang="0">
-                  <a:pos x="1454" y="0"/>
-                </a:cxn>
-              </a:cxnLst>
-              <a:rect l="0" t="0" r="r" b="b"/>
-              <a:pathLst>
-                <a:path w="1831" h="1889">
-                  <a:moveTo>
-                    <a:pt x="1454" y="0"/>
-                  </a:moveTo>
-                  <a:lnTo>
-                    <a:pt x="1454" y="1511"/>
-                  </a:lnTo>
-                  <a:lnTo>
-                    <a:pt x="0" y="1511"/>
-                  </a:lnTo>
-                  <a:lnTo>
-                    <a:pt x="0" y="1889"/>
-                  </a:lnTo>
-                  <a:lnTo>
-                    <a:pt x="1831" y="1889"/>
-                  </a:lnTo>
-                  <a:lnTo>
-                    <a:pt x="1831" y="0"/>
-                  </a:lnTo>
-                  <a:lnTo>
-                    <a:pt x="1454" y="0"/>
-                  </a:lnTo>
-                  <a:close/>
-                </a:path>
-              </a:pathLst>
-            </a:custGeom>
-            <a:grpFill/>
-            <a:ln w="9525">
-              <a:noFill/>
-              <a:round/>
-              <a:headEnd/>
-              <a:tailEnd/>
-            </a:ln>
-          </p:spPr>
-          <p:txBody>
-            <a:bodyPr vert="horz" wrap="square" lIns="91440" tIns="45720" rIns="91440" bIns="45720" numCol="1" anchor="t" anchorCtr="0" compatLnSpc="1">
-              <a:prstTxWarp prst="textNoShape">
-                <a:avLst/>
-              </a:prstTxWarp>
-            </a:bodyPr>
-            <a:lstStyle/>
-            <a:p>
-              <a:pPr marL="0" marR="0" lvl="0" indent="0" defTabSz="914400" eaLnBrk="1" fontAlgn="auto" latinLnBrk="0" hangingPunct="1">
-                <a:lnSpc>
-                  <a:spcPct val="100000"/>
-                </a:lnSpc>
-                <a:spcBef>
-                  <a:spcPts val="0"/>
-                </a:spcBef>
-                <a:spcAft>
-                  <a:spcPts val="0"/>
-                </a:spcAft>
-                <a:buClrTx/>
-                <a:buSzTx/>
-                <a:buFontTx/>
-                <a:buNone/>
-                <a:tabLst/>
-                <a:defRPr/>
-              </a:pPr>
-              <a:endParaRPr kumimoji="0" lang="en-GB" sz="1800" b="0" i="0" u="none" strike="noStrike" kern="0" cap="none" spc="0" normalizeH="0" baseline="0" noProof="0">
-                <a:ln>
-                  <a:noFill/>
-                </a:ln>
-                <a:solidFill>
-                  <a:srgbClr val="000000"/>
-                </a:solidFill>
-                <a:effectLst/>
-                <a:uLnTx/>
-                <a:uFillTx/>
-              </a:endParaRPr>
-            </a:p>
-          </p:txBody>
-        </p:sp>
-        <p:sp>
-          <p:nvSpPr>
-            <p:cNvPr id="23" name="Freeform 7"/>
-            <p:cNvSpPr>
-              <a:spLocks/>
-            </p:cNvSpPr>
-            <p:nvPr userDrawn="1"/>
-          </p:nvSpPr>
-          <p:spPr bwMode="auto">
-            <a:xfrm>
-              <a:off x="-796" y="1752"/>
-              <a:ext cx="1832" cy="1889"/>
-            </a:xfrm>
-            <a:custGeom>
-              <a:avLst/>
-              <a:gdLst/>
-              <a:ahLst/>
-              <a:cxnLst>
-                <a:cxn ang="0">
-                  <a:pos x="1832" y="378"/>
-                </a:cxn>
-                <a:cxn ang="0">
-                  <a:pos x="1832" y="0"/>
-                </a:cxn>
-                <a:cxn ang="0">
-                  <a:pos x="0" y="0"/>
-                </a:cxn>
-                <a:cxn ang="0">
-                  <a:pos x="0" y="1889"/>
-                </a:cxn>
-                <a:cxn ang="0">
-                  <a:pos x="378" y="1889"/>
-                </a:cxn>
-                <a:cxn ang="0">
-                  <a:pos x="378" y="378"/>
-                </a:cxn>
-                <a:cxn ang="0">
-                  <a:pos x="1832" y="378"/>
-                </a:cxn>
-              </a:cxnLst>
-              <a:rect l="0" t="0" r="r" b="b"/>
-              <a:pathLst>
-                <a:path w="1832" h="1889">
-                  <a:moveTo>
-                    <a:pt x="1832" y="378"/>
-                  </a:moveTo>
-                  <a:lnTo>
-                    <a:pt x="1832" y="0"/>
-                  </a:lnTo>
-                  <a:lnTo>
-                    <a:pt x="0" y="0"/>
-                  </a:lnTo>
-                  <a:lnTo>
-                    <a:pt x="0" y="1889"/>
-                  </a:lnTo>
-                  <a:lnTo>
-                    <a:pt x="378" y="1889"/>
-                  </a:lnTo>
-                  <a:lnTo>
-                    <a:pt x="378" y="378"/>
-                  </a:lnTo>
-                  <a:lnTo>
-                    <a:pt x="1832" y="378"/>
-                  </a:lnTo>
-                  <a:close/>
-                </a:path>
-              </a:pathLst>
-            </a:custGeom>
-            <a:grpFill/>
-            <a:ln w="9525">
-              <a:noFill/>
-              <a:round/>
-              <a:headEnd/>
-              <a:tailEnd/>
-            </a:ln>
-          </p:spPr>
-          <p:txBody>
-            <a:bodyPr vert="horz" wrap="square" lIns="91440" tIns="45720" rIns="91440" bIns="45720" numCol="1" anchor="t" anchorCtr="0" compatLnSpc="1">
-              <a:prstTxWarp prst="textNoShape">
-                <a:avLst/>
-              </a:prstTxWarp>
-            </a:bodyPr>
-            <a:lstStyle/>
-            <a:p>
-              <a:pPr marL="0" marR="0" lvl="0" indent="0" defTabSz="914400" eaLnBrk="1" fontAlgn="auto" latinLnBrk="0" hangingPunct="1">
-                <a:lnSpc>
-                  <a:spcPct val="100000"/>
-                </a:lnSpc>
-                <a:spcBef>
-                  <a:spcPts val="0"/>
-                </a:spcBef>
-                <a:spcAft>
-                  <a:spcPts val="0"/>
-                </a:spcAft>
-                <a:buClrTx/>
-                <a:buSzTx/>
-                <a:buFontTx/>
-                <a:buNone/>
-                <a:tabLst/>
-                <a:defRPr/>
-              </a:pPr>
-              <a:endParaRPr kumimoji="0" lang="en-GB" sz="1800" b="0" i="0" u="none" strike="noStrike" kern="0" cap="none" spc="0" normalizeH="0" baseline="0" noProof="0">
-                <a:ln>
-                  <a:noFill/>
-                </a:ln>
-                <a:solidFill>
-                  <a:srgbClr val="000000"/>
-                </a:solidFill>
-                <a:effectLst/>
-                <a:uLnTx/>
-                <a:uFillTx/>
-              </a:endParaRPr>
-            </a:p>
-          </p:txBody>
-        </p:sp>
-        <p:sp>
-          <p:nvSpPr>
-            <p:cNvPr id="24" name="Rectangle 8"/>
-            <p:cNvSpPr>
-              <a:spLocks noChangeArrowheads="1"/>
-            </p:cNvSpPr>
-            <p:nvPr userDrawn="1"/>
-          </p:nvSpPr>
-          <p:spPr bwMode="auto">
-            <a:xfrm>
-              <a:off x="-40" y="2508"/>
-              <a:ext cx="756" cy="377"/>
-            </a:xfrm>
-            <a:prstGeom prst="rect">
-              <a:avLst/>
-            </a:prstGeom>
-            <a:grpFill/>
-            <a:ln w="9525">
-              <a:noFill/>
-              <a:miter lim="800000"/>
-              <a:headEnd/>
-              <a:tailEnd/>
-            </a:ln>
-          </p:spPr>
-          <p:txBody>
-            <a:bodyPr vert="horz" wrap="square" lIns="91440" tIns="45720" rIns="91440" bIns="45720" numCol="1" anchor="t" anchorCtr="0" compatLnSpc="1">
-              <a:prstTxWarp prst="textNoShape">
-                <a:avLst/>
-              </a:prstTxWarp>
-            </a:bodyPr>
-            <a:lstStyle/>
-            <a:p>
-              <a:pPr marL="0" marR="0" lvl="0" indent="0" defTabSz="914400" eaLnBrk="1" fontAlgn="auto" latinLnBrk="0" hangingPunct="1">
-                <a:lnSpc>
-                  <a:spcPct val="100000"/>
-                </a:lnSpc>
-                <a:spcBef>
-                  <a:spcPts val="0"/>
-                </a:spcBef>
-                <a:spcAft>
-                  <a:spcPts val="0"/>
-                </a:spcAft>
-                <a:buClrTx/>
-                <a:buSzTx/>
-                <a:buFontTx/>
-                <a:buNone/>
-                <a:tabLst/>
-                <a:defRPr/>
-              </a:pPr>
-              <a:endParaRPr kumimoji="0" lang="en-GB" sz="1800" b="0" i="0" u="none" strike="noStrike" kern="0" cap="none" spc="0" normalizeH="0" baseline="0" noProof="0">
-                <a:ln>
-                  <a:noFill/>
-                </a:ln>
-                <a:solidFill>
-                  <a:srgbClr val="000000"/>
-                </a:solidFill>
-                <a:effectLst/>
-                <a:uLnTx/>
-                <a:uFillTx/>
-              </a:endParaRPr>
-            </a:p>
-          </p:txBody>
-        </p:sp>
-      </p:grpSp>
-      <p:sp>
-        <p:nvSpPr>
-          <p:cNvPr id="26" name="Text Placeholder 25"/>
-          <p:cNvSpPr>
-            <a:spLocks noGrp="1"/>
-          </p:cNvSpPr>
-          <p:nvPr>
-            <p:ph type="body" sz="quarter" idx="11" hasCustomPrompt="1"/>
-          </p:nvPr>
-        </p:nvSpPr>
-        <p:spPr>
-          <a:xfrm>
-            <a:off x="250825" y="873125"/>
-            <a:ext cx="8642350" cy="5076825"/>
-          </a:xfrm>
-          <a:prstGeom prst="rect">
-            <a:avLst/>
-          </a:prstGeom>
-        </p:spPr>
-        <p:txBody>
-          <a:bodyPr>
-            <a:normAutofit/>
-          </a:bodyPr>
-          <a:lstStyle>
-            <a:lvl1pPr algn="ctr">
-              <a:buNone/>
-              <a:defRPr lang="en-GB" sz="1800" kern="1200" baseline="0" dirty="0" smtClean="0">
-                <a:solidFill>
-                  <a:schemeClr val="tx1">
-                    <a:lumMod val="65000"/>
-                    <a:lumOff val="35000"/>
-                  </a:schemeClr>
-                </a:solidFill>
-                <a:latin typeface="Arial" pitchFamily="34" charset="0"/>
-                <a:ea typeface="+mn-ea"/>
-                <a:cs typeface="Arial" pitchFamily="34" charset="0"/>
-              </a:defRPr>
-            </a:lvl1pPr>
-            <a:lvl2pPr>
-              <a:defRPr sz="1800">
-                <a:solidFill>
-                  <a:schemeClr val="tx1"/>
-                </a:solidFill>
-                <a:latin typeface="Arial" pitchFamily="34" charset="0"/>
-                <a:cs typeface="Arial" pitchFamily="34" charset="0"/>
-              </a:defRPr>
-            </a:lvl2pPr>
-            <a:lvl3pPr>
-              <a:defRPr sz="1800">
-                <a:solidFill>
-                  <a:schemeClr val="tx1"/>
-                </a:solidFill>
-                <a:latin typeface="Arial" pitchFamily="34" charset="0"/>
-                <a:cs typeface="Arial" pitchFamily="34" charset="0"/>
-              </a:defRPr>
-            </a:lvl3pPr>
-            <a:lvl4pPr>
-              <a:defRPr sz="1800">
-                <a:solidFill>
-                  <a:schemeClr val="tx1"/>
-                </a:solidFill>
-                <a:latin typeface="Arial" pitchFamily="34" charset="0"/>
-                <a:cs typeface="Arial" pitchFamily="34" charset="0"/>
-              </a:defRPr>
-            </a:lvl4pPr>
-            <a:lvl5pPr>
-              <a:defRPr sz="1800">
-                <a:solidFill>
-                  <a:schemeClr val="tx1"/>
-                </a:solidFill>
-                <a:latin typeface="Arial" pitchFamily="34" charset="0"/>
-                <a:cs typeface="Arial" pitchFamily="34" charset="0"/>
-              </a:defRPr>
-            </a:lvl5pPr>
-          </a:lstStyle>
-          <a:p>
-            <a:pPr lvl="0"/>
-            <a:r>
-              <a:rPr lang="en-US" dirty="0"/>
-              <a:t>&lt;Insert Briefing text&gt;</a:t>
-            </a:r>
-            <a:endParaRPr lang="en-GB" dirty="0"/>
-          </a:p>
-        </p:txBody>
-      </p:sp>
-    </p:spTree>
-  </p:cSld>
-  <p:clrMapOvr>
-    <a:masterClrMapping/>
-  </p:clrMapOvr>
-</p:sldLayout>
-</file>
-
-<file path=ppt/slideLayouts/slideLayout20.xml><?xml version="1.0" encoding="utf-8"?>
+<file path=ppt/slideLayouts/slideLayout19.xml><?xml version="1.0" encoding="utf-8"?>
 <p:sldLayout xmlns:a="http://schemas.openxmlformats.org/drawingml/2006/main" xmlns:r="http://schemas.openxmlformats.org/officeDocument/2006/relationships" xmlns:p="http://schemas.openxmlformats.org/presentationml/2006/main" preserve="1">
   <p:cSld name="Title Slide">
     <p:spTree>
@@ -13129,7 +12471,665 @@
 </p:sldLayout>
 </file>
 
-<file path=ppt/slideLayouts/slideLayout21.xml><?xml version="1.0" encoding="utf-8"?>
+<file path=ppt/slideLayouts/slideLayout2.xml><?xml version="1.0" encoding="utf-8"?>
+<p:sldLayout xmlns:a="http://schemas.openxmlformats.org/drawingml/2006/main" xmlns:r="http://schemas.openxmlformats.org/officeDocument/2006/relationships" xmlns:p="http://schemas.openxmlformats.org/presentationml/2006/main" preserve="1" userDrawn="1">
+  <p:cSld name="The Briefing">
+    <p:spTree>
+      <p:nvGrpSpPr>
+        <p:cNvPr id="1" name=""/>
+        <p:cNvGrpSpPr/>
+        <p:nvPr/>
+      </p:nvGrpSpPr>
+      <p:grpSpPr>
+        <a:xfrm>
+          <a:off x="0" y="0"/>
+          <a:ext cx="0" cy="0"/>
+          <a:chOff x="0" y="0"/>
+          <a:chExt cx="0" cy="0"/>
+        </a:xfrm>
+      </p:grpSpPr>
+      <p:sp>
+        <p:nvSpPr>
+          <p:cNvPr id="17" name="TextBox 16"/>
+          <p:cNvSpPr txBox="1"/>
+          <p:nvPr userDrawn="1"/>
+        </p:nvSpPr>
+        <p:spPr>
+          <a:xfrm>
+            <a:off x="8662881" y="6338849"/>
+            <a:ext cx="309700" cy="194925"/>
+          </a:xfrm>
+          <a:prstGeom prst="rect">
+            <a:avLst/>
+          </a:prstGeom>
+          <a:noFill/>
+        </p:spPr>
+        <p:txBody>
+          <a:bodyPr wrap="none" rtlCol="0" anchor="ctr">
+            <a:spAutoFit/>
+          </a:bodyPr>
+          <a:lstStyle/>
+          <a:p>
+            <a:pPr algn="r">
+              <a:lnSpc>
+                <a:spcPts val="800"/>
+              </a:lnSpc>
+            </a:pPr>
+            <a:fld id="{0E0A9B4E-19F2-4E81-81C4-98D63547DE75}" type="slidenum">
+              <a:rPr lang="en-GB" sz="800">
+                <a:solidFill>
+                  <a:srgbClr val="35BDB2"/>
+                </a:solidFill>
+                <a:cs typeface="Arial" pitchFamily="34" charset="0"/>
+              </a:rPr>
+              <a:pPr algn="r">
+                <a:lnSpc>
+                  <a:spcPts val="800"/>
+                </a:lnSpc>
+              </a:pPr>
+              <a:t>‹#›</a:t>
+            </a:fld>
+            <a:endParaRPr lang="en-GB" sz="800" dirty="0">
+              <a:solidFill>
+                <a:srgbClr val="35BDB2"/>
+              </a:solidFill>
+              <a:cs typeface="Arial" pitchFamily="34" charset="0"/>
+            </a:endParaRPr>
+          </a:p>
+        </p:txBody>
+      </p:sp>
+      <p:cxnSp>
+        <p:nvCxnSpPr>
+          <p:cNvPr id="18" name="Straight Connector 17"/>
+          <p:cNvCxnSpPr/>
+          <p:nvPr userDrawn="1"/>
+        </p:nvCxnSpPr>
+        <p:spPr>
+          <a:xfrm rot="5400000">
+            <a:off x="8330221" y="6547429"/>
+            <a:ext cx="619558" cy="1589"/>
+          </a:xfrm>
+          <a:prstGeom prst="line">
+            <a:avLst/>
+          </a:prstGeom>
+          <a:noFill/>
+          <a:ln w="19050" cap="flat" cmpd="sng" algn="ctr">
+            <a:solidFill>
+              <a:srgbClr val="35BDB2"/>
+            </a:solidFill>
+            <a:prstDash val="solid"/>
+          </a:ln>
+          <a:effectLst/>
+        </p:spPr>
+      </p:cxnSp>
+      <p:sp>
+        <p:nvSpPr>
+          <p:cNvPr id="19" name="Text Placeholder 14"/>
+          <p:cNvSpPr>
+            <a:spLocks noGrp="1"/>
+          </p:cNvSpPr>
+          <p:nvPr>
+            <p:ph type="body" sz="quarter" idx="10" hasCustomPrompt="1"/>
+          </p:nvPr>
+        </p:nvSpPr>
+        <p:spPr>
+          <a:xfrm>
+            <a:off x="684213" y="6338849"/>
+            <a:ext cx="7929834" cy="194925"/>
+          </a:xfrm>
+          <a:prstGeom prst="rect">
+            <a:avLst/>
+          </a:prstGeom>
+        </p:spPr>
+        <p:txBody>
+          <a:bodyPr anchor="ctr">
+            <a:noAutofit/>
+          </a:bodyPr>
+          <a:lstStyle>
+            <a:lvl1pPr marL="0" marR="0" indent="0" algn="r" defTabSz="457200" rtl="0" eaLnBrk="1" fontAlgn="auto" latinLnBrk="0" hangingPunct="1">
+              <a:lnSpc>
+                <a:spcPts val="800"/>
+              </a:lnSpc>
+              <a:spcBef>
+                <a:spcPts val="0"/>
+              </a:spcBef>
+              <a:spcAft>
+                <a:spcPts val="0"/>
+              </a:spcAft>
+              <a:buClrTx/>
+              <a:buSzTx/>
+              <a:buFont typeface="Arial"/>
+              <a:buNone/>
+              <a:tabLst/>
+              <a:defRPr sz="800" baseline="0">
+                <a:solidFill>
+                  <a:schemeClr val="tx1">
+                    <a:lumMod val="50000"/>
+                    <a:lumOff val="50000"/>
+                  </a:schemeClr>
+                </a:solidFill>
+              </a:defRPr>
+            </a:lvl1pPr>
+          </a:lstStyle>
+          <a:p>
+            <a:pPr marL="0" marR="0" lvl="0" indent="0" algn="r" defTabSz="457200" rtl="0" eaLnBrk="1" fontAlgn="auto" latinLnBrk="0" hangingPunct="1">
+              <a:lnSpc>
+                <a:spcPts val="800"/>
+              </a:lnSpc>
+              <a:spcBef>
+                <a:spcPts val="0"/>
+              </a:spcBef>
+              <a:spcAft>
+                <a:spcPts val="0"/>
+              </a:spcAft>
+              <a:buClrTx/>
+              <a:buSzTx/>
+              <a:buFont typeface="Arial"/>
+              <a:buNone/>
+              <a:tabLst/>
+              <a:defRPr/>
+            </a:pPr>
+            <a:r>
+              <a:rPr kumimoji="0" lang="en-GB" sz="800" b="0" i="0" u="none" strike="noStrike" kern="0" cap="none" spc="0" normalizeH="0" baseline="0" noProof="0" dirty="0">
+                <a:ln>
+                  <a:noFill/>
+                </a:ln>
+                <a:solidFill>
+                  <a:srgbClr val="000000">
+                    <a:lumMod val="50000"/>
+                    <a:lumOff val="50000"/>
+                  </a:srgbClr>
+                </a:solidFill>
+                <a:effectLst/>
+                <a:uLnTx/>
+                <a:uFillTx/>
+              </a:rPr>
+              <a:t>Insert source/photo credit here</a:t>
+            </a:r>
+          </a:p>
+        </p:txBody>
+      </p:sp>
+      <p:sp>
+        <p:nvSpPr>
+          <p:cNvPr id="20" name="Title 1"/>
+          <p:cNvSpPr>
+            <a:spLocks noGrp="1"/>
+          </p:cNvSpPr>
+          <p:nvPr>
+            <p:ph type="title" hasCustomPrompt="1"/>
+          </p:nvPr>
+        </p:nvSpPr>
+        <p:spPr>
+          <a:xfrm>
+            <a:off x="250827" y="260350"/>
+            <a:ext cx="8642348" cy="443198"/>
+          </a:xfrm>
+          <a:prstGeom prst="rect">
+            <a:avLst/>
+          </a:prstGeom>
+        </p:spPr>
+        <p:txBody>
+          <a:bodyPr wrap="square" lIns="0" tIns="0" rIns="0" bIns="0" anchor="t">
+            <a:spAutoFit/>
+          </a:bodyPr>
+          <a:lstStyle>
+            <a:lvl1pPr algn="l">
+              <a:lnSpc>
+                <a:spcPct val="90000"/>
+              </a:lnSpc>
+              <a:defRPr sz="3200">
+                <a:solidFill>
+                  <a:srgbClr val="35BDB2"/>
+                </a:solidFill>
+                <a:latin typeface="Arial" pitchFamily="34" charset="0"/>
+                <a:cs typeface="Arial" pitchFamily="34" charset="0"/>
+              </a:defRPr>
+            </a:lvl1pPr>
+          </a:lstStyle>
+          <a:p>
+            <a:pPr marL="0" marR="0" lvl="0" indent="0" algn="l" defTabSz="914400" eaLnBrk="1" fontAlgn="auto" latinLnBrk="0" hangingPunct="1">
+              <a:lnSpc>
+                <a:spcPct val="90000"/>
+              </a:lnSpc>
+              <a:spcBef>
+                <a:spcPts val="0"/>
+              </a:spcBef>
+              <a:spcAft>
+                <a:spcPts val="0"/>
+              </a:spcAft>
+              <a:buClrTx/>
+              <a:buSzTx/>
+              <a:buFontTx/>
+              <a:buNone/>
+              <a:tabLst/>
+              <a:defRPr/>
+            </a:pPr>
+            <a:r>
+              <a:rPr kumimoji="0" lang="en-US" sz="3200" b="0" i="0" u="none" strike="noStrike" kern="0" cap="none" spc="0" normalizeH="0" baseline="0" noProof="0" dirty="0">
+                <a:ln>
+                  <a:noFill/>
+                </a:ln>
+                <a:solidFill>
+                  <a:srgbClr val="35BDB2"/>
+                </a:solidFill>
+                <a:effectLst/>
+                <a:uLnTx/>
+                <a:uFillTx/>
+                <a:latin typeface="Arial" pitchFamily="34" charset="0"/>
+                <a:cs typeface="Arial" pitchFamily="34" charset="0"/>
+              </a:rPr>
+              <a:t>The Briefing</a:t>
+            </a:r>
+          </a:p>
+        </p:txBody>
+      </p:sp>
+      <p:grpSp>
+        <p:nvGrpSpPr>
+          <p:cNvPr id="21" name="Group 5"/>
+          <p:cNvGrpSpPr>
+            <a:grpSpLocks noChangeAspect="1"/>
+          </p:cNvGrpSpPr>
+          <p:nvPr userDrawn="1"/>
+        </p:nvGrpSpPr>
+        <p:grpSpPr bwMode="auto">
+          <a:xfrm>
+            <a:off x="250826" y="6236525"/>
+            <a:ext cx="433388" cy="361125"/>
+            <a:chOff x="-796" y="1752"/>
+            <a:chExt cx="2267" cy="1889"/>
+          </a:xfrm>
+          <a:solidFill>
+            <a:srgbClr val="35BDB2"/>
+          </a:solidFill>
+        </p:grpSpPr>
+        <p:sp>
+          <p:nvSpPr>
+            <p:cNvPr id="22" name="Freeform 6"/>
+            <p:cNvSpPr>
+              <a:spLocks/>
+            </p:cNvSpPr>
+            <p:nvPr userDrawn="1"/>
+          </p:nvSpPr>
+          <p:spPr bwMode="auto">
+            <a:xfrm>
+              <a:off x="-360" y="1752"/>
+              <a:ext cx="1831" cy="1889"/>
+            </a:xfrm>
+            <a:custGeom>
+              <a:avLst/>
+              <a:gdLst/>
+              <a:ahLst/>
+              <a:cxnLst>
+                <a:cxn ang="0">
+                  <a:pos x="1454" y="0"/>
+                </a:cxn>
+                <a:cxn ang="0">
+                  <a:pos x="1454" y="1511"/>
+                </a:cxn>
+                <a:cxn ang="0">
+                  <a:pos x="0" y="1511"/>
+                </a:cxn>
+                <a:cxn ang="0">
+                  <a:pos x="0" y="1889"/>
+                </a:cxn>
+                <a:cxn ang="0">
+                  <a:pos x="1831" y="1889"/>
+                </a:cxn>
+                <a:cxn ang="0">
+                  <a:pos x="1831" y="0"/>
+                </a:cxn>
+                <a:cxn ang="0">
+                  <a:pos x="1454" y="0"/>
+                </a:cxn>
+              </a:cxnLst>
+              <a:rect l="0" t="0" r="r" b="b"/>
+              <a:pathLst>
+                <a:path w="1831" h="1889">
+                  <a:moveTo>
+                    <a:pt x="1454" y="0"/>
+                  </a:moveTo>
+                  <a:lnTo>
+                    <a:pt x="1454" y="1511"/>
+                  </a:lnTo>
+                  <a:lnTo>
+                    <a:pt x="0" y="1511"/>
+                  </a:lnTo>
+                  <a:lnTo>
+                    <a:pt x="0" y="1889"/>
+                  </a:lnTo>
+                  <a:lnTo>
+                    <a:pt x="1831" y="1889"/>
+                  </a:lnTo>
+                  <a:lnTo>
+                    <a:pt x="1831" y="0"/>
+                  </a:lnTo>
+                  <a:lnTo>
+                    <a:pt x="1454" y="0"/>
+                  </a:lnTo>
+                  <a:close/>
+                </a:path>
+              </a:pathLst>
+            </a:custGeom>
+            <a:grpFill/>
+            <a:ln w="9525">
+              <a:noFill/>
+              <a:round/>
+              <a:headEnd/>
+              <a:tailEnd/>
+            </a:ln>
+          </p:spPr>
+          <p:txBody>
+            <a:bodyPr vert="horz" wrap="square" lIns="91440" tIns="45720" rIns="91440" bIns="45720" numCol="1" anchor="t" anchorCtr="0" compatLnSpc="1">
+              <a:prstTxWarp prst="textNoShape">
+                <a:avLst/>
+              </a:prstTxWarp>
+            </a:bodyPr>
+            <a:lstStyle/>
+            <a:p>
+              <a:pPr marL="0" marR="0" lvl="0" indent="0" defTabSz="914400" eaLnBrk="1" fontAlgn="auto" latinLnBrk="0" hangingPunct="1">
+                <a:lnSpc>
+                  <a:spcPct val="100000"/>
+                </a:lnSpc>
+                <a:spcBef>
+                  <a:spcPts val="0"/>
+                </a:spcBef>
+                <a:spcAft>
+                  <a:spcPts val="0"/>
+                </a:spcAft>
+                <a:buClrTx/>
+                <a:buSzTx/>
+                <a:buFontTx/>
+                <a:buNone/>
+                <a:tabLst/>
+                <a:defRPr/>
+              </a:pPr>
+              <a:endParaRPr kumimoji="0" lang="en-GB" sz="1800" b="0" i="0" u="none" strike="noStrike" kern="0" cap="none" spc="0" normalizeH="0" baseline="0" noProof="0">
+                <a:ln>
+                  <a:noFill/>
+                </a:ln>
+                <a:solidFill>
+                  <a:srgbClr val="000000"/>
+                </a:solidFill>
+                <a:effectLst/>
+                <a:uLnTx/>
+                <a:uFillTx/>
+              </a:endParaRPr>
+            </a:p>
+          </p:txBody>
+        </p:sp>
+        <p:sp>
+          <p:nvSpPr>
+            <p:cNvPr id="23" name="Freeform 7"/>
+            <p:cNvSpPr>
+              <a:spLocks/>
+            </p:cNvSpPr>
+            <p:nvPr userDrawn="1"/>
+          </p:nvSpPr>
+          <p:spPr bwMode="auto">
+            <a:xfrm>
+              <a:off x="-796" y="1752"/>
+              <a:ext cx="1832" cy="1889"/>
+            </a:xfrm>
+            <a:custGeom>
+              <a:avLst/>
+              <a:gdLst/>
+              <a:ahLst/>
+              <a:cxnLst>
+                <a:cxn ang="0">
+                  <a:pos x="1832" y="378"/>
+                </a:cxn>
+                <a:cxn ang="0">
+                  <a:pos x="1832" y="0"/>
+                </a:cxn>
+                <a:cxn ang="0">
+                  <a:pos x="0" y="0"/>
+                </a:cxn>
+                <a:cxn ang="0">
+                  <a:pos x="0" y="1889"/>
+                </a:cxn>
+                <a:cxn ang="0">
+                  <a:pos x="378" y="1889"/>
+                </a:cxn>
+                <a:cxn ang="0">
+                  <a:pos x="378" y="378"/>
+                </a:cxn>
+                <a:cxn ang="0">
+                  <a:pos x="1832" y="378"/>
+                </a:cxn>
+              </a:cxnLst>
+              <a:rect l="0" t="0" r="r" b="b"/>
+              <a:pathLst>
+                <a:path w="1832" h="1889">
+                  <a:moveTo>
+                    <a:pt x="1832" y="378"/>
+                  </a:moveTo>
+                  <a:lnTo>
+                    <a:pt x="1832" y="0"/>
+                  </a:lnTo>
+                  <a:lnTo>
+                    <a:pt x="0" y="0"/>
+                  </a:lnTo>
+                  <a:lnTo>
+                    <a:pt x="0" y="1889"/>
+                  </a:lnTo>
+                  <a:lnTo>
+                    <a:pt x="378" y="1889"/>
+                  </a:lnTo>
+                  <a:lnTo>
+                    <a:pt x="378" y="378"/>
+                  </a:lnTo>
+                  <a:lnTo>
+                    <a:pt x="1832" y="378"/>
+                  </a:lnTo>
+                  <a:close/>
+                </a:path>
+              </a:pathLst>
+            </a:custGeom>
+            <a:grpFill/>
+            <a:ln w="9525">
+              <a:noFill/>
+              <a:round/>
+              <a:headEnd/>
+              <a:tailEnd/>
+            </a:ln>
+          </p:spPr>
+          <p:txBody>
+            <a:bodyPr vert="horz" wrap="square" lIns="91440" tIns="45720" rIns="91440" bIns="45720" numCol="1" anchor="t" anchorCtr="0" compatLnSpc="1">
+              <a:prstTxWarp prst="textNoShape">
+                <a:avLst/>
+              </a:prstTxWarp>
+            </a:bodyPr>
+            <a:lstStyle/>
+            <a:p>
+              <a:pPr marL="0" marR="0" lvl="0" indent="0" defTabSz="914400" eaLnBrk="1" fontAlgn="auto" latinLnBrk="0" hangingPunct="1">
+                <a:lnSpc>
+                  <a:spcPct val="100000"/>
+                </a:lnSpc>
+                <a:spcBef>
+                  <a:spcPts val="0"/>
+                </a:spcBef>
+                <a:spcAft>
+                  <a:spcPts val="0"/>
+                </a:spcAft>
+                <a:buClrTx/>
+                <a:buSzTx/>
+                <a:buFontTx/>
+                <a:buNone/>
+                <a:tabLst/>
+                <a:defRPr/>
+              </a:pPr>
+              <a:endParaRPr kumimoji="0" lang="en-GB" sz="1800" b="0" i="0" u="none" strike="noStrike" kern="0" cap="none" spc="0" normalizeH="0" baseline="0" noProof="0">
+                <a:ln>
+                  <a:noFill/>
+                </a:ln>
+                <a:solidFill>
+                  <a:srgbClr val="000000"/>
+                </a:solidFill>
+                <a:effectLst/>
+                <a:uLnTx/>
+                <a:uFillTx/>
+              </a:endParaRPr>
+            </a:p>
+          </p:txBody>
+        </p:sp>
+        <p:sp>
+          <p:nvSpPr>
+            <p:cNvPr id="24" name="Rectangle 8"/>
+            <p:cNvSpPr>
+              <a:spLocks noChangeArrowheads="1"/>
+            </p:cNvSpPr>
+            <p:nvPr userDrawn="1"/>
+          </p:nvSpPr>
+          <p:spPr bwMode="auto">
+            <a:xfrm>
+              <a:off x="-40" y="2508"/>
+              <a:ext cx="756" cy="377"/>
+            </a:xfrm>
+            <a:prstGeom prst="rect">
+              <a:avLst/>
+            </a:prstGeom>
+            <a:grpFill/>
+            <a:ln w="9525">
+              <a:noFill/>
+              <a:miter lim="800000"/>
+              <a:headEnd/>
+              <a:tailEnd/>
+            </a:ln>
+          </p:spPr>
+          <p:txBody>
+            <a:bodyPr vert="horz" wrap="square" lIns="91440" tIns="45720" rIns="91440" bIns="45720" numCol="1" anchor="t" anchorCtr="0" compatLnSpc="1">
+              <a:prstTxWarp prst="textNoShape">
+                <a:avLst/>
+              </a:prstTxWarp>
+            </a:bodyPr>
+            <a:lstStyle/>
+            <a:p>
+              <a:pPr marL="0" marR="0" lvl="0" indent="0" defTabSz="914400" eaLnBrk="1" fontAlgn="auto" latinLnBrk="0" hangingPunct="1">
+                <a:lnSpc>
+                  <a:spcPct val="100000"/>
+                </a:lnSpc>
+                <a:spcBef>
+                  <a:spcPts val="0"/>
+                </a:spcBef>
+                <a:spcAft>
+                  <a:spcPts val="0"/>
+                </a:spcAft>
+                <a:buClrTx/>
+                <a:buSzTx/>
+                <a:buFontTx/>
+                <a:buNone/>
+                <a:tabLst/>
+                <a:defRPr/>
+              </a:pPr>
+              <a:endParaRPr kumimoji="0" lang="en-GB" sz="1800" b="0" i="0" u="none" strike="noStrike" kern="0" cap="none" spc="0" normalizeH="0" baseline="0" noProof="0">
+                <a:ln>
+                  <a:noFill/>
+                </a:ln>
+                <a:solidFill>
+                  <a:srgbClr val="000000"/>
+                </a:solidFill>
+                <a:effectLst/>
+                <a:uLnTx/>
+                <a:uFillTx/>
+              </a:endParaRPr>
+            </a:p>
+          </p:txBody>
+        </p:sp>
+      </p:grpSp>
+      <p:sp>
+        <p:nvSpPr>
+          <p:cNvPr id="26" name="Text Placeholder 25"/>
+          <p:cNvSpPr>
+            <a:spLocks noGrp="1"/>
+          </p:cNvSpPr>
+          <p:nvPr>
+            <p:ph type="body" sz="quarter" idx="11" hasCustomPrompt="1"/>
+          </p:nvPr>
+        </p:nvSpPr>
+        <p:spPr>
+          <a:xfrm>
+            <a:off x="250825" y="873125"/>
+            <a:ext cx="8642350" cy="5076825"/>
+          </a:xfrm>
+          <a:prstGeom prst="rect">
+            <a:avLst/>
+          </a:prstGeom>
+        </p:spPr>
+        <p:txBody>
+          <a:bodyPr>
+            <a:normAutofit/>
+          </a:bodyPr>
+          <a:lstStyle>
+            <a:lvl1pPr algn="ctr">
+              <a:buNone/>
+              <a:defRPr lang="en-GB" sz="1800" kern="1200" baseline="0" dirty="0" smtClean="0">
+                <a:solidFill>
+                  <a:schemeClr val="tx1">
+                    <a:lumMod val="65000"/>
+                    <a:lumOff val="35000"/>
+                  </a:schemeClr>
+                </a:solidFill>
+                <a:latin typeface="Arial" pitchFamily="34" charset="0"/>
+                <a:ea typeface="+mn-ea"/>
+                <a:cs typeface="Arial" pitchFamily="34" charset="0"/>
+              </a:defRPr>
+            </a:lvl1pPr>
+            <a:lvl2pPr>
+              <a:defRPr sz="1800">
+                <a:solidFill>
+                  <a:schemeClr val="tx1"/>
+                </a:solidFill>
+                <a:latin typeface="Arial" pitchFamily="34" charset="0"/>
+                <a:cs typeface="Arial" pitchFamily="34" charset="0"/>
+              </a:defRPr>
+            </a:lvl2pPr>
+            <a:lvl3pPr>
+              <a:defRPr sz="1800">
+                <a:solidFill>
+                  <a:schemeClr val="tx1"/>
+                </a:solidFill>
+                <a:latin typeface="Arial" pitchFamily="34" charset="0"/>
+                <a:cs typeface="Arial" pitchFamily="34" charset="0"/>
+              </a:defRPr>
+            </a:lvl3pPr>
+            <a:lvl4pPr>
+              <a:defRPr sz="1800">
+                <a:solidFill>
+                  <a:schemeClr val="tx1"/>
+                </a:solidFill>
+                <a:latin typeface="Arial" pitchFamily="34" charset="0"/>
+                <a:cs typeface="Arial" pitchFamily="34" charset="0"/>
+              </a:defRPr>
+            </a:lvl4pPr>
+            <a:lvl5pPr>
+              <a:defRPr sz="1800">
+                <a:solidFill>
+                  <a:schemeClr val="tx1"/>
+                </a:solidFill>
+                <a:latin typeface="Arial" pitchFamily="34" charset="0"/>
+                <a:cs typeface="Arial" pitchFamily="34" charset="0"/>
+              </a:defRPr>
+            </a:lvl5pPr>
+          </a:lstStyle>
+          <a:p>
+            <a:pPr lvl="0"/>
+            <a:r>
+              <a:rPr lang="en-US" dirty="0"/>
+              <a:t>&lt;Insert Briefing text&gt;</a:t>
+            </a:r>
+            <a:endParaRPr lang="en-GB" dirty="0"/>
+          </a:p>
+        </p:txBody>
+      </p:sp>
+    </p:spTree>
+  </p:cSld>
+  <p:clrMapOvr>
+    <a:masterClrMapping/>
+  </p:clrMapOvr>
+</p:sldLayout>
+</file>
+
+<file path=ppt/slideLayouts/slideLayout20.xml><?xml version="1.0" encoding="utf-8"?>
 <p:sldLayout xmlns:a="http://schemas.openxmlformats.org/drawingml/2006/main" xmlns:r="http://schemas.openxmlformats.org/officeDocument/2006/relationships" xmlns:p="http://schemas.openxmlformats.org/presentationml/2006/main" preserve="1">
   <p:cSld name="Title with Image Light">
     <p:spTree>
@@ -16150,7 +16150,7 @@
 </p:sldLayout>
 </file>
 
-<file path=ppt/slideLayouts/slideLayout22.xml><?xml version="1.0" encoding="utf-8"?>
+<file path=ppt/slideLayouts/slideLayout21.xml><?xml version="1.0" encoding="utf-8"?>
 <p:sldLayout xmlns:a="http://schemas.openxmlformats.org/drawingml/2006/main" xmlns:r="http://schemas.openxmlformats.org/officeDocument/2006/relationships" xmlns:p="http://schemas.openxmlformats.org/presentationml/2006/main" preserve="1">
   <p:cSld name="Title with Image Dark">
     <p:spTree>
@@ -19154,7 +19154,7 @@
 </p:sldLayout>
 </file>
 
-<file path=ppt/slideLayouts/slideLayout23.xml><?xml version="1.0" encoding="utf-8"?>
+<file path=ppt/slideLayouts/slideLayout22.xml><?xml version="1.0" encoding="utf-8"?>
 <p:sldLayout xmlns:a="http://schemas.openxmlformats.org/drawingml/2006/main" xmlns:r="http://schemas.openxmlformats.org/officeDocument/2006/relationships" xmlns:p="http://schemas.openxmlformats.org/presentationml/2006/main" preserve="1">
   <p:cSld name="Title with Half Pattern">
     <p:spTree>
@@ -22150,7 +22150,7 @@
 </p:sldLayout>
 </file>
 
-<file path=ppt/slideLayouts/slideLayout24.xml><?xml version="1.0" encoding="utf-8"?>
+<file path=ppt/slideLayouts/slideLayout23.xml><?xml version="1.0" encoding="utf-8"?>
 <p:sldLayout xmlns:a="http://schemas.openxmlformats.org/drawingml/2006/main" xmlns:r="http://schemas.openxmlformats.org/officeDocument/2006/relationships" xmlns:p="http://schemas.openxmlformats.org/presentationml/2006/main" preserve="1">
   <p:cSld name="Title with Half Image">
     <p:spTree>
@@ -25154,7 +25154,7 @@
 </p:sldLayout>
 </file>
 
-<file path=ppt/slideLayouts/slideLayout25.xml><?xml version="1.0" encoding="utf-8"?>
+<file path=ppt/slideLayouts/slideLayout24.xml><?xml version="1.0" encoding="utf-8"?>
 <p:sldLayout xmlns:a="http://schemas.openxmlformats.org/drawingml/2006/main" xmlns:r="http://schemas.openxmlformats.org/officeDocument/2006/relationships" xmlns:p="http://schemas.openxmlformats.org/presentationml/2006/main" preserve="1">
   <p:cSld name="Blank Light Grey">
     <p:spTree>
@@ -25605,7 +25605,7 @@
 </p:sldLayout>
 </file>
 
-<file path=ppt/slideLayouts/slideLayout26.xml><?xml version="1.0" encoding="utf-8"?>
+<file path=ppt/slideLayouts/slideLayout25.xml><?xml version="1.0" encoding="utf-8"?>
 <p:sldLayout xmlns:a="http://schemas.openxmlformats.org/drawingml/2006/main" xmlns:r="http://schemas.openxmlformats.org/officeDocument/2006/relationships" xmlns:p="http://schemas.openxmlformats.org/presentationml/2006/main" preserve="1">
   <p:cSld name="Blank Dark Grey">
     <p:spTree>
@@ -26054,7 +26054,7 @@
 </p:sldLayout>
 </file>
 
-<file path=ppt/slideLayouts/slideLayout27.xml><?xml version="1.0" encoding="utf-8"?>
+<file path=ppt/slideLayouts/slideLayout26.xml><?xml version="1.0" encoding="utf-8"?>
 <p:sldLayout xmlns:a="http://schemas.openxmlformats.org/drawingml/2006/main" xmlns:r="http://schemas.openxmlformats.org/officeDocument/2006/relationships" xmlns:p="http://schemas.openxmlformats.org/presentationml/2006/main" preserve="1">
   <p:cSld name="Blank Cyan">
     <p:spTree>
@@ -26507,7 +26507,7 @@
 </p:sldLayout>
 </file>
 
-<file path=ppt/slideLayouts/slideLayout28.xml><?xml version="1.0" encoding="utf-8"?>
+<file path=ppt/slideLayouts/slideLayout27.xml><?xml version="1.0" encoding="utf-8"?>
 <p:sldLayout xmlns:a="http://schemas.openxmlformats.org/drawingml/2006/main" xmlns:r="http://schemas.openxmlformats.org/officeDocument/2006/relationships" xmlns:p="http://schemas.openxmlformats.org/presentationml/2006/main" preserve="1">
   <p:cSld name="Intelligence Slide">
     <p:spTree>
@@ -27096,7 +27096,7 @@
 </p:sldLayout>
 </file>
 
-<file path=ppt/slideLayouts/slideLayout29.xml><?xml version="1.0" encoding="utf-8"?>
+<file path=ppt/slideLayouts/slideLayout28.xml><?xml version="1.0" encoding="utf-8"?>
 <p:sldLayout xmlns:a="http://schemas.openxmlformats.org/drawingml/2006/main" xmlns:r="http://schemas.openxmlformats.org/officeDocument/2006/relationships" xmlns:p="http://schemas.openxmlformats.org/presentationml/2006/main" preserve="1">
   <p:cSld name="End Slide">
     <p:spTree>
@@ -30031,6 +30031,461 @@
 </p:sldLayout>
 </file>
 
+<file path=ppt/slideLayouts/slideLayout29.xml><?xml version="1.0" encoding="utf-8"?>
+<p:sldLayout xmlns:a="http://schemas.openxmlformats.org/drawingml/2006/main" xmlns:r="http://schemas.openxmlformats.org/officeDocument/2006/relationships" xmlns:p="http://schemas.openxmlformats.org/presentationml/2006/main" preserve="1">
+  <p:cSld name="Pattern Cyan">
+    <p:spTree>
+      <p:nvGrpSpPr>
+        <p:cNvPr id="1" name=""/>
+        <p:cNvGrpSpPr/>
+        <p:nvPr/>
+      </p:nvGrpSpPr>
+      <p:grpSpPr>
+        <a:xfrm>
+          <a:off x="0" y="0"/>
+          <a:ext cx="0" cy="0"/>
+          <a:chOff x="0" y="0"/>
+          <a:chExt cx="0" cy="0"/>
+        </a:xfrm>
+      </p:grpSpPr>
+      <p:sp>
+        <p:nvSpPr>
+          <p:cNvPr id="11" name="Rectangle 10"/>
+          <p:cNvSpPr/>
+          <p:nvPr/>
+        </p:nvSpPr>
+        <p:spPr>
+          <a:xfrm>
+            <a:off x="0" y="0"/>
+            <a:ext cx="9144000" cy="6858000"/>
+          </a:xfrm>
+          <a:prstGeom prst="rect">
+            <a:avLst/>
+          </a:prstGeom>
+          <a:blipFill dpi="0" rotWithShape="1">
+            <a:blip r:embed="rId2" cstate="print"/>
+            <a:srcRect/>
+            <a:tile tx="0" ty="0" sx="86000" sy="86000" flip="none" algn="tl"/>
+          </a:blipFill>
+          <a:ln>
+            <a:noFill/>
+          </a:ln>
+          <a:effectLst/>
+        </p:spPr>
+        <p:style>
+          <a:lnRef idx="1">
+            <a:schemeClr val="accent1"/>
+          </a:lnRef>
+          <a:fillRef idx="3">
+            <a:schemeClr val="accent1"/>
+          </a:fillRef>
+          <a:effectRef idx="2">
+            <a:schemeClr val="accent1"/>
+          </a:effectRef>
+          <a:fontRef idx="minor">
+            <a:schemeClr val="lt1"/>
+          </a:fontRef>
+        </p:style>
+        <p:txBody>
+          <a:bodyPr rtlCol="0" anchor="ctr"/>
+          <a:lstStyle/>
+          <a:p>
+            <a:pPr algn="ctr"/>
+            <a:endParaRPr lang="en-GB"/>
+          </a:p>
+        </p:txBody>
+      </p:sp>
+      <p:sp>
+        <p:nvSpPr>
+          <p:cNvPr id="8" name="TextBox 7"/>
+          <p:cNvSpPr txBox="1"/>
+          <p:nvPr/>
+        </p:nvSpPr>
+        <p:spPr>
+          <a:xfrm>
+            <a:off x="8662881" y="6338849"/>
+            <a:ext cx="309700" cy="194925"/>
+          </a:xfrm>
+          <a:prstGeom prst="rect">
+            <a:avLst/>
+          </a:prstGeom>
+          <a:noFill/>
+        </p:spPr>
+        <p:txBody>
+          <a:bodyPr wrap="none" rtlCol="0" anchor="ctr">
+            <a:spAutoFit/>
+          </a:bodyPr>
+          <a:lstStyle/>
+          <a:p>
+            <a:pPr algn="r">
+              <a:lnSpc>
+                <a:spcPts val="800"/>
+              </a:lnSpc>
+            </a:pPr>
+            <a:fld id="{0E0A9B4E-19F2-4E81-81C4-98D63547DE75}" type="slidenum">
+              <a:rPr lang="en-GB" sz="800" smtClean="0">
+                <a:solidFill>
+                  <a:schemeClr val="bg1"/>
+                </a:solidFill>
+                <a:latin typeface="Arial" pitchFamily="34" charset="0"/>
+                <a:cs typeface="Arial" pitchFamily="34" charset="0"/>
+              </a:rPr>
+              <a:pPr algn="r">
+                <a:lnSpc>
+                  <a:spcPts val="800"/>
+                </a:lnSpc>
+              </a:pPr>
+              <a:t>‹#›</a:t>
+            </a:fld>
+            <a:endParaRPr lang="en-GB" sz="800" dirty="0">
+              <a:solidFill>
+                <a:schemeClr val="bg1"/>
+              </a:solidFill>
+              <a:latin typeface="Arial" pitchFamily="34" charset="0"/>
+              <a:cs typeface="Arial" pitchFamily="34" charset="0"/>
+            </a:endParaRPr>
+          </a:p>
+        </p:txBody>
+      </p:sp>
+      <p:cxnSp>
+        <p:nvCxnSpPr>
+          <p:cNvPr id="10" name="Straight Connector 9"/>
+          <p:cNvCxnSpPr/>
+          <p:nvPr/>
+        </p:nvCxnSpPr>
+        <p:spPr>
+          <a:xfrm rot="5400000">
+            <a:off x="8330221" y="6547429"/>
+            <a:ext cx="619558" cy="1589"/>
+          </a:xfrm>
+          <a:prstGeom prst="line">
+            <a:avLst/>
+          </a:prstGeom>
+          <a:ln w="19050">
+            <a:solidFill>
+              <a:schemeClr val="bg1"/>
+            </a:solidFill>
+          </a:ln>
+          <a:effectLst/>
+        </p:spPr>
+        <p:style>
+          <a:lnRef idx="2">
+            <a:schemeClr val="accent1"/>
+          </a:lnRef>
+          <a:fillRef idx="0">
+            <a:schemeClr val="accent1"/>
+          </a:fillRef>
+          <a:effectRef idx="1">
+            <a:schemeClr val="accent1"/>
+          </a:effectRef>
+          <a:fontRef idx="minor">
+            <a:schemeClr val="tx1"/>
+          </a:fontRef>
+        </p:style>
+      </p:cxnSp>
+      <p:sp>
+        <p:nvSpPr>
+          <p:cNvPr id="15" name="Text Placeholder 14"/>
+          <p:cNvSpPr>
+            <a:spLocks noGrp="1"/>
+          </p:cNvSpPr>
+          <p:nvPr>
+            <p:ph type="body" sz="quarter" idx="10" hasCustomPrompt="1"/>
+          </p:nvPr>
+        </p:nvSpPr>
+        <p:spPr>
+          <a:xfrm>
+            <a:off x="684213" y="6338849"/>
+            <a:ext cx="7929834" cy="194925"/>
+          </a:xfrm>
+          <a:prstGeom prst="rect">
+            <a:avLst/>
+          </a:prstGeom>
+        </p:spPr>
+        <p:txBody>
+          <a:bodyPr anchor="ctr">
+            <a:noAutofit/>
+          </a:bodyPr>
+          <a:lstStyle>
+            <a:lvl1pPr marL="0" marR="0" indent="0" algn="r" defTabSz="457200" rtl="0" eaLnBrk="1" fontAlgn="auto" latinLnBrk="0" hangingPunct="1">
+              <a:lnSpc>
+                <a:spcPts val="800"/>
+              </a:lnSpc>
+              <a:spcBef>
+                <a:spcPts val="0"/>
+              </a:spcBef>
+              <a:spcAft>
+                <a:spcPts val="0"/>
+              </a:spcAft>
+              <a:buClrTx/>
+              <a:buSzTx/>
+              <a:buFont typeface="Arial"/>
+              <a:buNone/>
+              <a:tabLst/>
+              <a:defRPr sz="800" baseline="0">
+                <a:solidFill>
+                  <a:schemeClr val="bg1"/>
+                </a:solidFill>
+              </a:defRPr>
+            </a:lvl1pPr>
+          </a:lstStyle>
+          <a:p>
+            <a:pPr lvl="0"/>
+            <a:r>
+              <a:rPr lang="en-GB" dirty="0" smtClean="0"/>
+              <a:t>Insert source/photo credit here</a:t>
+            </a:r>
+          </a:p>
+        </p:txBody>
+      </p:sp>
+      <p:grpSp>
+        <p:nvGrpSpPr>
+          <p:cNvPr id="2" name="Group 5"/>
+          <p:cNvGrpSpPr>
+            <a:grpSpLocks noChangeAspect="1"/>
+          </p:cNvGrpSpPr>
+          <p:nvPr/>
+        </p:nvGrpSpPr>
+        <p:grpSpPr bwMode="auto">
+          <a:xfrm>
+            <a:off x="250826" y="6236525"/>
+            <a:ext cx="433388" cy="361125"/>
+            <a:chOff x="-796" y="1752"/>
+            <a:chExt cx="2267" cy="1889"/>
+          </a:xfrm>
+          <a:solidFill>
+            <a:schemeClr val="bg1"/>
+          </a:solidFill>
+        </p:grpSpPr>
+        <p:sp>
+          <p:nvSpPr>
+            <p:cNvPr id="17" name="Freeform 6"/>
+            <p:cNvSpPr>
+              <a:spLocks/>
+            </p:cNvSpPr>
+            <p:nvPr userDrawn="1"/>
+          </p:nvSpPr>
+          <p:spPr bwMode="auto">
+            <a:xfrm>
+              <a:off x="-360" y="1752"/>
+              <a:ext cx="1831" cy="1889"/>
+            </a:xfrm>
+            <a:custGeom>
+              <a:avLst/>
+              <a:gdLst/>
+              <a:ahLst/>
+              <a:cxnLst>
+                <a:cxn ang="0">
+                  <a:pos x="1454" y="0"/>
+                </a:cxn>
+                <a:cxn ang="0">
+                  <a:pos x="1454" y="1511"/>
+                </a:cxn>
+                <a:cxn ang="0">
+                  <a:pos x="0" y="1511"/>
+                </a:cxn>
+                <a:cxn ang="0">
+                  <a:pos x="0" y="1889"/>
+                </a:cxn>
+                <a:cxn ang="0">
+                  <a:pos x="1831" y="1889"/>
+                </a:cxn>
+                <a:cxn ang="0">
+                  <a:pos x="1831" y="0"/>
+                </a:cxn>
+                <a:cxn ang="0">
+                  <a:pos x="1454" y="0"/>
+                </a:cxn>
+              </a:cxnLst>
+              <a:rect l="0" t="0" r="r" b="b"/>
+              <a:pathLst>
+                <a:path w="1831" h="1889">
+                  <a:moveTo>
+                    <a:pt x="1454" y="0"/>
+                  </a:moveTo>
+                  <a:lnTo>
+                    <a:pt x="1454" y="1511"/>
+                  </a:lnTo>
+                  <a:lnTo>
+                    <a:pt x="0" y="1511"/>
+                  </a:lnTo>
+                  <a:lnTo>
+                    <a:pt x="0" y="1889"/>
+                  </a:lnTo>
+                  <a:lnTo>
+                    <a:pt x="1831" y="1889"/>
+                  </a:lnTo>
+                  <a:lnTo>
+                    <a:pt x="1831" y="0"/>
+                  </a:lnTo>
+                  <a:lnTo>
+                    <a:pt x="1454" y="0"/>
+                  </a:lnTo>
+                  <a:close/>
+                </a:path>
+              </a:pathLst>
+            </a:custGeom>
+            <a:grpFill/>
+            <a:ln w="9525">
+              <a:noFill/>
+              <a:round/>
+              <a:headEnd/>
+              <a:tailEnd/>
+            </a:ln>
+          </p:spPr>
+          <p:txBody>
+            <a:bodyPr vert="horz" wrap="square" lIns="91440" tIns="45720" rIns="91440" bIns="45720" numCol="1" anchor="t" anchorCtr="0" compatLnSpc="1">
+              <a:prstTxWarp prst="textNoShape">
+                <a:avLst/>
+              </a:prstTxWarp>
+            </a:bodyPr>
+            <a:lstStyle/>
+            <a:p>
+              <a:endParaRPr lang="en-GB"/>
+            </a:p>
+          </p:txBody>
+        </p:sp>
+        <p:sp>
+          <p:nvSpPr>
+            <p:cNvPr id="18" name="Freeform 7"/>
+            <p:cNvSpPr>
+              <a:spLocks/>
+            </p:cNvSpPr>
+            <p:nvPr userDrawn="1"/>
+          </p:nvSpPr>
+          <p:spPr bwMode="auto">
+            <a:xfrm>
+              <a:off x="-796" y="1752"/>
+              <a:ext cx="1832" cy="1889"/>
+            </a:xfrm>
+            <a:custGeom>
+              <a:avLst/>
+              <a:gdLst/>
+              <a:ahLst/>
+              <a:cxnLst>
+                <a:cxn ang="0">
+                  <a:pos x="1832" y="378"/>
+                </a:cxn>
+                <a:cxn ang="0">
+                  <a:pos x="1832" y="0"/>
+                </a:cxn>
+                <a:cxn ang="0">
+                  <a:pos x="0" y="0"/>
+                </a:cxn>
+                <a:cxn ang="0">
+                  <a:pos x="0" y="1889"/>
+                </a:cxn>
+                <a:cxn ang="0">
+                  <a:pos x="378" y="1889"/>
+                </a:cxn>
+                <a:cxn ang="0">
+                  <a:pos x="378" y="378"/>
+                </a:cxn>
+                <a:cxn ang="0">
+                  <a:pos x="1832" y="378"/>
+                </a:cxn>
+              </a:cxnLst>
+              <a:rect l="0" t="0" r="r" b="b"/>
+              <a:pathLst>
+                <a:path w="1832" h="1889">
+                  <a:moveTo>
+                    <a:pt x="1832" y="378"/>
+                  </a:moveTo>
+                  <a:lnTo>
+                    <a:pt x="1832" y="0"/>
+                  </a:lnTo>
+                  <a:lnTo>
+                    <a:pt x="0" y="0"/>
+                  </a:lnTo>
+                  <a:lnTo>
+                    <a:pt x="0" y="1889"/>
+                  </a:lnTo>
+                  <a:lnTo>
+                    <a:pt x="378" y="1889"/>
+                  </a:lnTo>
+                  <a:lnTo>
+                    <a:pt x="378" y="378"/>
+                  </a:lnTo>
+                  <a:lnTo>
+                    <a:pt x="1832" y="378"/>
+                  </a:lnTo>
+                  <a:close/>
+                </a:path>
+              </a:pathLst>
+            </a:custGeom>
+            <a:grpFill/>
+            <a:ln w="9525">
+              <a:noFill/>
+              <a:round/>
+              <a:headEnd/>
+              <a:tailEnd/>
+            </a:ln>
+          </p:spPr>
+          <p:txBody>
+            <a:bodyPr vert="horz" wrap="square" lIns="91440" tIns="45720" rIns="91440" bIns="45720" numCol="1" anchor="t" anchorCtr="0" compatLnSpc="1">
+              <a:prstTxWarp prst="textNoShape">
+                <a:avLst/>
+              </a:prstTxWarp>
+            </a:bodyPr>
+            <a:lstStyle/>
+            <a:p>
+              <a:endParaRPr lang="en-GB"/>
+            </a:p>
+          </p:txBody>
+        </p:sp>
+        <p:sp>
+          <p:nvSpPr>
+            <p:cNvPr id="19" name="Rectangle 8"/>
+            <p:cNvSpPr>
+              <a:spLocks noChangeArrowheads="1"/>
+            </p:cNvSpPr>
+            <p:nvPr userDrawn="1"/>
+          </p:nvSpPr>
+          <p:spPr bwMode="auto">
+            <a:xfrm>
+              <a:off x="-40" y="2508"/>
+              <a:ext cx="756" cy="377"/>
+            </a:xfrm>
+            <a:prstGeom prst="rect">
+              <a:avLst/>
+            </a:prstGeom>
+            <a:grpFill/>
+            <a:ln w="9525">
+              <a:noFill/>
+              <a:miter lim="800000"/>
+              <a:headEnd/>
+              <a:tailEnd/>
+            </a:ln>
+          </p:spPr>
+          <p:txBody>
+            <a:bodyPr vert="horz" wrap="square" lIns="91440" tIns="45720" rIns="91440" bIns="45720" numCol="1" anchor="t" anchorCtr="0" compatLnSpc="1">
+              <a:prstTxWarp prst="textNoShape">
+                <a:avLst/>
+              </a:prstTxWarp>
+            </a:bodyPr>
+            <a:lstStyle/>
+            <a:p>
+              <a:endParaRPr lang="en-GB"/>
+            </a:p>
+          </p:txBody>
+        </p:sp>
+      </p:grpSp>
+    </p:spTree>
+  </p:cSld>
+  <p:clrMapOvr>
+    <a:masterClrMapping/>
+  </p:clrMapOvr>
+  <p:transition/>
+  <p:timing>
+    <p:tnLst>
+      <p:par>
+        <p:cTn id="1" dur="indefinite" restart="never" nodeType="tmRoot"/>
+      </p:par>
+    </p:tnLst>
+  </p:timing>
+</p:sldLayout>
+</file>
+
 <file path=ppt/slideLayouts/slideLayout3.xml><?xml version="1.0" encoding="utf-8"?>
 <p:sldLayout xmlns:a="http://schemas.openxmlformats.org/drawingml/2006/main" xmlns:r="http://schemas.openxmlformats.org/officeDocument/2006/relationships" xmlns:p="http://schemas.openxmlformats.org/presentationml/2006/main" preserve="1" userDrawn="1">
   <p:cSld name="Global differences">
@@ -30713,461 +31168,6 @@
 </file>
 
 <file path=ppt/slideLayouts/slideLayout30.xml><?xml version="1.0" encoding="utf-8"?>
-<p:sldLayout xmlns:a="http://schemas.openxmlformats.org/drawingml/2006/main" xmlns:r="http://schemas.openxmlformats.org/officeDocument/2006/relationships" xmlns:p="http://schemas.openxmlformats.org/presentationml/2006/main" preserve="1">
-  <p:cSld name="Pattern Cyan">
-    <p:spTree>
-      <p:nvGrpSpPr>
-        <p:cNvPr id="1" name=""/>
-        <p:cNvGrpSpPr/>
-        <p:nvPr/>
-      </p:nvGrpSpPr>
-      <p:grpSpPr>
-        <a:xfrm>
-          <a:off x="0" y="0"/>
-          <a:ext cx="0" cy="0"/>
-          <a:chOff x="0" y="0"/>
-          <a:chExt cx="0" cy="0"/>
-        </a:xfrm>
-      </p:grpSpPr>
-      <p:sp>
-        <p:nvSpPr>
-          <p:cNvPr id="11" name="Rectangle 10"/>
-          <p:cNvSpPr/>
-          <p:nvPr/>
-        </p:nvSpPr>
-        <p:spPr>
-          <a:xfrm>
-            <a:off x="0" y="0"/>
-            <a:ext cx="9144000" cy="6858000"/>
-          </a:xfrm>
-          <a:prstGeom prst="rect">
-            <a:avLst/>
-          </a:prstGeom>
-          <a:blipFill dpi="0" rotWithShape="1">
-            <a:blip r:embed="rId2" cstate="print"/>
-            <a:srcRect/>
-            <a:tile tx="0" ty="0" sx="86000" sy="86000" flip="none" algn="tl"/>
-          </a:blipFill>
-          <a:ln>
-            <a:noFill/>
-          </a:ln>
-          <a:effectLst/>
-        </p:spPr>
-        <p:style>
-          <a:lnRef idx="1">
-            <a:schemeClr val="accent1"/>
-          </a:lnRef>
-          <a:fillRef idx="3">
-            <a:schemeClr val="accent1"/>
-          </a:fillRef>
-          <a:effectRef idx="2">
-            <a:schemeClr val="accent1"/>
-          </a:effectRef>
-          <a:fontRef idx="minor">
-            <a:schemeClr val="lt1"/>
-          </a:fontRef>
-        </p:style>
-        <p:txBody>
-          <a:bodyPr rtlCol="0" anchor="ctr"/>
-          <a:lstStyle/>
-          <a:p>
-            <a:pPr algn="ctr"/>
-            <a:endParaRPr lang="en-GB"/>
-          </a:p>
-        </p:txBody>
-      </p:sp>
-      <p:sp>
-        <p:nvSpPr>
-          <p:cNvPr id="8" name="TextBox 7"/>
-          <p:cNvSpPr txBox="1"/>
-          <p:nvPr/>
-        </p:nvSpPr>
-        <p:spPr>
-          <a:xfrm>
-            <a:off x="8662881" y="6338849"/>
-            <a:ext cx="309700" cy="194925"/>
-          </a:xfrm>
-          <a:prstGeom prst="rect">
-            <a:avLst/>
-          </a:prstGeom>
-          <a:noFill/>
-        </p:spPr>
-        <p:txBody>
-          <a:bodyPr wrap="none" rtlCol="0" anchor="ctr">
-            <a:spAutoFit/>
-          </a:bodyPr>
-          <a:lstStyle/>
-          <a:p>
-            <a:pPr algn="r">
-              <a:lnSpc>
-                <a:spcPts val="800"/>
-              </a:lnSpc>
-            </a:pPr>
-            <a:fld id="{0E0A9B4E-19F2-4E81-81C4-98D63547DE75}" type="slidenum">
-              <a:rPr lang="en-GB" sz="800" smtClean="0">
-                <a:solidFill>
-                  <a:schemeClr val="bg1"/>
-                </a:solidFill>
-                <a:latin typeface="Arial" pitchFamily="34" charset="0"/>
-                <a:cs typeface="Arial" pitchFamily="34" charset="0"/>
-              </a:rPr>
-              <a:pPr algn="r">
-                <a:lnSpc>
-                  <a:spcPts val="800"/>
-                </a:lnSpc>
-              </a:pPr>
-              <a:t>‹#›</a:t>
-            </a:fld>
-            <a:endParaRPr lang="en-GB" sz="800" dirty="0">
-              <a:solidFill>
-                <a:schemeClr val="bg1"/>
-              </a:solidFill>
-              <a:latin typeface="Arial" pitchFamily="34" charset="0"/>
-              <a:cs typeface="Arial" pitchFamily="34" charset="0"/>
-            </a:endParaRPr>
-          </a:p>
-        </p:txBody>
-      </p:sp>
-      <p:cxnSp>
-        <p:nvCxnSpPr>
-          <p:cNvPr id="10" name="Straight Connector 9"/>
-          <p:cNvCxnSpPr/>
-          <p:nvPr/>
-        </p:nvCxnSpPr>
-        <p:spPr>
-          <a:xfrm rot="5400000">
-            <a:off x="8330221" y="6547429"/>
-            <a:ext cx="619558" cy="1589"/>
-          </a:xfrm>
-          <a:prstGeom prst="line">
-            <a:avLst/>
-          </a:prstGeom>
-          <a:ln w="19050">
-            <a:solidFill>
-              <a:schemeClr val="bg1"/>
-            </a:solidFill>
-          </a:ln>
-          <a:effectLst/>
-        </p:spPr>
-        <p:style>
-          <a:lnRef idx="2">
-            <a:schemeClr val="accent1"/>
-          </a:lnRef>
-          <a:fillRef idx="0">
-            <a:schemeClr val="accent1"/>
-          </a:fillRef>
-          <a:effectRef idx="1">
-            <a:schemeClr val="accent1"/>
-          </a:effectRef>
-          <a:fontRef idx="minor">
-            <a:schemeClr val="tx1"/>
-          </a:fontRef>
-        </p:style>
-      </p:cxnSp>
-      <p:sp>
-        <p:nvSpPr>
-          <p:cNvPr id="15" name="Text Placeholder 14"/>
-          <p:cNvSpPr>
-            <a:spLocks noGrp="1"/>
-          </p:cNvSpPr>
-          <p:nvPr>
-            <p:ph type="body" sz="quarter" idx="10" hasCustomPrompt="1"/>
-          </p:nvPr>
-        </p:nvSpPr>
-        <p:spPr>
-          <a:xfrm>
-            <a:off x="684213" y="6338849"/>
-            <a:ext cx="7929834" cy="194925"/>
-          </a:xfrm>
-          <a:prstGeom prst="rect">
-            <a:avLst/>
-          </a:prstGeom>
-        </p:spPr>
-        <p:txBody>
-          <a:bodyPr anchor="ctr">
-            <a:noAutofit/>
-          </a:bodyPr>
-          <a:lstStyle>
-            <a:lvl1pPr marL="0" marR="0" indent="0" algn="r" defTabSz="457200" rtl="0" eaLnBrk="1" fontAlgn="auto" latinLnBrk="0" hangingPunct="1">
-              <a:lnSpc>
-                <a:spcPts val="800"/>
-              </a:lnSpc>
-              <a:spcBef>
-                <a:spcPts val="0"/>
-              </a:spcBef>
-              <a:spcAft>
-                <a:spcPts val="0"/>
-              </a:spcAft>
-              <a:buClrTx/>
-              <a:buSzTx/>
-              <a:buFont typeface="Arial"/>
-              <a:buNone/>
-              <a:tabLst/>
-              <a:defRPr sz="800" baseline="0">
-                <a:solidFill>
-                  <a:schemeClr val="bg1"/>
-                </a:solidFill>
-              </a:defRPr>
-            </a:lvl1pPr>
-          </a:lstStyle>
-          <a:p>
-            <a:pPr lvl="0"/>
-            <a:r>
-              <a:rPr lang="en-GB" dirty="0" smtClean="0"/>
-              <a:t>Insert source/photo credit here</a:t>
-            </a:r>
-          </a:p>
-        </p:txBody>
-      </p:sp>
-      <p:grpSp>
-        <p:nvGrpSpPr>
-          <p:cNvPr id="2" name="Group 5"/>
-          <p:cNvGrpSpPr>
-            <a:grpSpLocks noChangeAspect="1"/>
-          </p:cNvGrpSpPr>
-          <p:nvPr/>
-        </p:nvGrpSpPr>
-        <p:grpSpPr bwMode="auto">
-          <a:xfrm>
-            <a:off x="250826" y="6236525"/>
-            <a:ext cx="433388" cy="361125"/>
-            <a:chOff x="-796" y="1752"/>
-            <a:chExt cx="2267" cy="1889"/>
-          </a:xfrm>
-          <a:solidFill>
-            <a:schemeClr val="bg1"/>
-          </a:solidFill>
-        </p:grpSpPr>
-        <p:sp>
-          <p:nvSpPr>
-            <p:cNvPr id="17" name="Freeform 6"/>
-            <p:cNvSpPr>
-              <a:spLocks/>
-            </p:cNvSpPr>
-            <p:nvPr userDrawn="1"/>
-          </p:nvSpPr>
-          <p:spPr bwMode="auto">
-            <a:xfrm>
-              <a:off x="-360" y="1752"/>
-              <a:ext cx="1831" cy="1889"/>
-            </a:xfrm>
-            <a:custGeom>
-              <a:avLst/>
-              <a:gdLst/>
-              <a:ahLst/>
-              <a:cxnLst>
-                <a:cxn ang="0">
-                  <a:pos x="1454" y="0"/>
-                </a:cxn>
-                <a:cxn ang="0">
-                  <a:pos x="1454" y="1511"/>
-                </a:cxn>
-                <a:cxn ang="0">
-                  <a:pos x="0" y="1511"/>
-                </a:cxn>
-                <a:cxn ang="0">
-                  <a:pos x="0" y="1889"/>
-                </a:cxn>
-                <a:cxn ang="0">
-                  <a:pos x="1831" y="1889"/>
-                </a:cxn>
-                <a:cxn ang="0">
-                  <a:pos x="1831" y="0"/>
-                </a:cxn>
-                <a:cxn ang="0">
-                  <a:pos x="1454" y="0"/>
-                </a:cxn>
-              </a:cxnLst>
-              <a:rect l="0" t="0" r="r" b="b"/>
-              <a:pathLst>
-                <a:path w="1831" h="1889">
-                  <a:moveTo>
-                    <a:pt x="1454" y="0"/>
-                  </a:moveTo>
-                  <a:lnTo>
-                    <a:pt x="1454" y="1511"/>
-                  </a:lnTo>
-                  <a:lnTo>
-                    <a:pt x="0" y="1511"/>
-                  </a:lnTo>
-                  <a:lnTo>
-                    <a:pt x="0" y="1889"/>
-                  </a:lnTo>
-                  <a:lnTo>
-                    <a:pt x="1831" y="1889"/>
-                  </a:lnTo>
-                  <a:lnTo>
-                    <a:pt x="1831" y="0"/>
-                  </a:lnTo>
-                  <a:lnTo>
-                    <a:pt x="1454" y="0"/>
-                  </a:lnTo>
-                  <a:close/>
-                </a:path>
-              </a:pathLst>
-            </a:custGeom>
-            <a:grpFill/>
-            <a:ln w="9525">
-              <a:noFill/>
-              <a:round/>
-              <a:headEnd/>
-              <a:tailEnd/>
-            </a:ln>
-          </p:spPr>
-          <p:txBody>
-            <a:bodyPr vert="horz" wrap="square" lIns="91440" tIns="45720" rIns="91440" bIns="45720" numCol="1" anchor="t" anchorCtr="0" compatLnSpc="1">
-              <a:prstTxWarp prst="textNoShape">
-                <a:avLst/>
-              </a:prstTxWarp>
-            </a:bodyPr>
-            <a:lstStyle/>
-            <a:p>
-              <a:endParaRPr lang="en-GB"/>
-            </a:p>
-          </p:txBody>
-        </p:sp>
-        <p:sp>
-          <p:nvSpPr>
-            <p:cNvPr id="18" name="Freeform 7"/>
-            <p:cNvSpPr>
-              <a:spLocks/>
-            </p:cNvSpPr>
-            <p:nvPr userDrawn="1"/>
-          </p:nvSpPr>
-          <p:spPr bwMode="auto">
-            <a:xfrm>
-              <a:off x="-796" y="1752"/>
-              <a:ext cx="1832" cy="1889"/>
-            </a:xfrm>
-            <a:custGeom>
-              <a:avLst/>
-              <a:gdLst/>
-              <a:ahLst/>
-              <a:cxnLst>
-                <a:cxn ang="0">
-                  <a:pos x="1832" y="378"/>
-                </a:cxn>
-                <a:cxn ang="0">
-                  <a:pos x="1832" y="0"/>
-                </a:cxn>
-                <a:cxn ang="0">
-                  <a:pos x="0" y="0"/>
-                </a:cxn>
-                <a:cxn ang="0">
-                  <a:pos x="0" y="1889"/>
-                </a:cxn>
-                <a:cxn ang="0">
-                  <a:pos x="378" y="1889"/>
-                </a:cxn>
-                <a:cxn ang="0">
-                  <a:pos x="378" y="378"/>
-                </a:cxn>
-                <a:cxn ang="0">
-                  <a:pos x="1832" y="378"/>
-                </a:cxn>
-              </a:cxnLst>
-              <a:rect l="0" t="0" r="r" b="b"/>
-              <a:pathLst>
-                <a:path w="1832" h="1889">
-                  <a:moveTo>
-                    <a:pt x="1832" y="378"/>
-                  </a:moveTo>
-                  <a:lnTo>
-                    <a:pt x="1832" y="0"/>
-                  </a:lnTo>
-                  <a:lnTo>
-                    <a:pt x="0" y="0"/>
-                  </a:lnTo>
-                  <a:lnTo>
-                    <a:pt x="0" y="1889"/>
-                  </a:lnTo>
-                  <a:lnTo>
-                    <a:pt x="378" y="1889"/>
-                  </a:lnTo>
-                  <a:lnTo>
-                    <a:pt x="378" y="378"/>
-                  </a:lnTo>
-                  <a:lnTo>
-                    <a:pt x="1832" y="378"/>
-                  </a:lnTo>
-                  <a:close/>
-                </a:path>
-              </a:pathLst>
-            </a:custGeom>
-            <a:grpFill/>
-            <a:ln w="9525">
-              <a:noFill/>
-              <a:round/>
-              <a:headEnd/>
-              <a:tailEnd/>
-            </a:ln>
-          </p:spPr>
-          <p:txBody>
-            <a:bodyPr vert="horz" wrap="square" lIns="91440" tIns="45720" rIns="91440" bIns="45720" numCol="1" anchor="t" anchorCtr="0" compatLnSpc="1">
-              <a:prstTxWarp prst="textNoShape">
-                <a:avLst/>
-              </a:prstTxWarp>
-            </a:bodyPr>
-            <a:lstStyle/>
-            <a:p>
-              <a:endParaRPr lang="en-GB"/>
-            </a:p>
-          </p:txBody>
-        </p:sp>
-        <p:sp>
-          <p:nvSpPr>
-            <p:cNvPr id="19" name="Rectangle 8"/>
-            <p:cNvSpPr>
-              <a:spLocks noChangeArrowheads="1"/>
-            </p:cNvSpPr>
-            <p:nvPr userDrawn="1"/>
-          </p:nvSpPr>
-          <p:spPr bwMode="auto">
-            <a:xfrm>
-              <a:off x="-40" y="2508"/>
-              <a:ext cx="756" cy="377"/>
-            </a:xfrm>
-            <a:prstGeom prst="rect">
-              <a:avLst/>
-            </a:prstGeom>
-            <a:grpFill/>
-            <a:ln w="9525">
-              <a:noFill/>
-              <a:miter lim="800000"/>
-              <a:headEnd/>
-              <a:tailEnd/>
-            </a:ln>
-          </p:spPr>
-          <p:txBody>
-            <a:bodyPr vert="horz" wrap="square" lIns="91440" tIns="45720" rIns="91440" bIns="45720" numCol="1" anchor="t" anchorCtr="0" compatLnSpc="1">
-              <a:prstTxWarp prst="textNoShape">
-                <a:avLst/>
-              </a:prstTxWarp>
-            </a:bodyPr>
-            <a:lstStyle/>
-            <a:p>
-              <a:endParaRPr lang="en-GB"/>
-            </a:p>
-          </p:txBody>
-        </p:sp>
-      </p:grpSp>
-    </p:spTree>
-  </p:cSld>
-  <p:clrMapOvr>
-    <a:masterClrMapping/>
-  </p:clrMapOvr>
-  <p:transition/>
-  <p:timing>
-    <p:tnLst>
-      <p:par>
-        <p:cTn id="1" dur="indefinite" restart="never" nodeType="tmRoot"/>
-      </p:par>
-    </p:tnLst>
-  </p:timing>
-</p:sldLayout>
-</file>
-
-<file path=ppt/slideLayouts/slideLayout31.xml><?xml version="1.0" encoding="utf-8"?>
 <p:sldLayout xmlns:a="http://schemas.openxmlformats.org/drawingml/2006/main" xmlns:r="http://schemas.openxmlformats.org/officeDocument/2006/relationships" xmlns:p="http://schemas.openxmlformats.org/presentationml/2006/main" preserve="1">
   <p:cSld name="Trend Slide">
     <p:spTree>
@@ -31819,7 +31819,7 @@
 </p:sldLayout>
 </file>
 
-<file path=ppt/slideLayouts/slideLayout32.xml><?xml version="1.0" encoding="utf-8"?>
+<file path=ppt/slideLayouts/slideLayout31.xml><?xml version="1.0" encoding="utf-8"?>
 <p:sldLayout xmlns:a="http://schemas.openxmlformats.org/drawingml/2006/main" xmlns:r="http://schemas.openxmlformats.org/officeDocument/2006/relationships" xmlns:p="http://schemas.openxmlformats.org/presentationml/2006/main" preserve="1">
   <p:cSld name="Pattern Light Grey">
     <p:spTree>
@@ -32280,7 +32280,7 @@
 </p:sldLayout>
 </file>
 
-<file path=ppt/slideLayouts/slideLayout33.xml><?xml version="1.0" encoding="utf-8"?>
+<file path=ppt/slideLayouts/slideLayout32.xml><?xml version="1.0" encoding="utf-8"?>
 <p:sldLayout xmlns:a="http://schemas.openxmlformats.org/drawingml/2006/main" xmlns:r="http://schemas.openxmlformats.org/officeDocument/2006/relationships" xmlns:p="http://schemas.openxmlformats.org/presentationml/2006/main" preserve="1">
   <p:cSld name="Image Slide Light">
     <p:spTree>
@@ -32942,7 +32942,7 @@
 </p:sldLayout>
 </file>
 
-<file path=ppt/slideLayouts/slideLayout34.xml><?xml version="1.0" encoding="utf-8"?>
+<file path=ppt/slideLayouts/slideLayout33.xml><?xml version="1.0" encoding="utf-8"?>
 <p:sldLayout xmlns:a="http://schemas.openxmlformats.org/drawingml/2006/main" xmlns:r="http://schemas.openxmlformats.org/officeDocument/2006/relationships" xmlns:p="http://schemas.openxmlformats.org/presentationml/2006/main" preserve="1">
   <p:cSld name="Image Slide Dark">
     <p:spTree>
@@ -33607,7 +33607,7 @@
 </p:sldLayout>
 </file>
 
-<file path=ppt/slideLayouts/slideLayout35.xml><?xml version="1.0" encoding="utf-8"?>
+<file path=ppt/slideLayouts/slideLayout34.xml><?xml version="1.0" encoding="utf-8"?>
 <p:sldLayout xmlns:a="http://schemas.openxmlformats.org/drawingml/2006/main" xmlns:r="http://schemas.openxmlformats.org/officeDocument/2006/relationships" xmlns:p="http://schemas.openxmlformats.org/presentationml/2006/main" preserve="1">
   <p:cSld name="Pattern Black">
     <p:spTree>
@@ -34065,7 +34065,7 @@
 </p:sldLayout>
 </file>
 
-<file path=ppt/slideLayouts/slideLayout36.xml><?xml version="1.0" encoding="utf-8"?>
+<file path=ppt/slideLayouts/slideLayout35.xml><?xml version="1.0" encoding="utf-8"?>
 <p:sldLayout xmlns:a="http://schemas.openxmlformats.org/drawingml/2006/main" xmlns:r="http://schemas.openxmlformats.org/officeDocument/2006/relationships" xmlns:p="http://schemas.openxmlformats.org/presentationml/2006/main" preserve="1">
   <p:cSld name="Section Header Numbered">
     <p:spTree>
@@ -34662,7 +34662,7 @@
 </p:sldLayout>
 </file>
 
-<file path=ppt/slideLayouts/slideLayout37.xml><?xml version="1.0" encoding="utf-8"?>
+<file path=ppt/slideLayouts/slideLayout36.xml><?xml version="1.0" encoding="utf-8"?>
 <p:sldLayout xmlns:a="http://schemas.openxmlformats.org/drawingml/2006/main" xmlns:r="http://schemas.openxmlformats.org/officeDocument/2006/relationships" xmlns:p="http://schemas.openxmlformats.org/presentationml/2006/main" preserve="1">
   <p:cSld name="Section Header">
     <p:spTree>
@@ -42810,15 +42810,15 @@
   </p:cSld>
   <p:clrMap bg1="lt1" tx1="dk1" bg2="lt2" tx2="dk2" accent1="accent1" accent2="accent2" accent3="accent3" accent4="accent4" accent5="accent5" accent6="accent6" hlink="hlink" folHlink="folHlink"/>
   <p:sldLayoutIdLst>
-    <p:sldLayoutId id="2147483649" r:id="rId1"/>
-    <p:sldLayoutId id="2147483650" r:id="rId2"/>
-    <p:sldLayoutId id="2147483651" r:id="rId3"/>
-    <p:sldLayoutId id="2147483659" r:id="rId4"/>
-    <p:sldLayoutId id="2147483652" r:id="rId5"/>
-    <p:sldLayoutId id="2147483656" r:id="rId6"/>
-    <p:sldLayoutId id="2147483657" r:id="rId7"/>
-    <p:sldLayoutId id="2147483658" r:id="rId8"/>
-    <p:sldLayoutId id="2147483653" r:id="rId9"/>
+    <p:sldLayoutId r:id="rId1"/>
+    <p:sldLayoutId r:id="rId2"/>
+    <p:sldLayoutId r:id="rId3"/>
+    <p:sldLayoutId r:id="rId4"/>
+    <p:sldLayoutId r:id="rId5"/>
+    <p:sldLayoutId r:id="rId6"/>
+    <p:sldLayoutId r:id="rId7"/>
+    <p:sldLayoutId r:id="rId8"/>
+    <p:sldLayoutId r:id="rId9"/>
   </p:sldLayoutIdLst>
   <p:txStyles>
     <p:titleStyle>
@@ -43073,7 +43073,7 @@
 </p:sldMaster>
 </file>
 
-<file path=ppt/slideMasters/slideMaster3.xml><?xml version="1.0" encoding="utf-8"?>
+<file path=ppt/slideMasters/slideMaster2.xml><?xml version="1.0" encoding="utf-8"?>
 <p:sldMaster xmlns:a="http://schemas.openxmlformats.org/drawingml/2006/main" xmlns:r="http://schemas.openxmlformats.org/officeDocument/2006/relationships" xmlns:p="http://schemas.openxmlformats.org/presentationml/2006/main">
   <p:cSld>
     <p:bg>
@@ -43099,33 +43099,33 @@
   </p:cSld>
   <p:clrMap bg1="lt1" tx1="dk1" bg2="lt2" tx2="dk2" accent1="accent1" accent2="accent2" accent3="accent3" accent4="accent4" accent5="accent5" accent6="accent6" hlink="hlink" folHlink="folHlink"/>
   <p:sldLayoutIdLst>
-    <p:sldLayoutId id="2147483661" r:id="rId1"/>
-    <p:sldLayoutId id="2147483662" r:id="rId2"/>
-    <p:sldLayoutId id="2147483663" r:id="rId3"/>
-    <p:sldLayoutId id="2147483664" r:id="rId4"/>
-    <p:sldLayoutId id="2147483665" r:id="rId5"/>
-    <p:sldLayoutId id="2147483666" r:id="rId6"/>
-    <p:sldLayoutId id="2147483667" r:id="rId7"/>
-    <p:sldLayoutId id="2147483668" r:id="rId8"/>
-    <p:sldLayoutId id="2147483669" r:id="rId9"/>
-    <p:sldLayoutId id="2147483670" r:id="rId10"/>
-    <p:sldLayoutId id="2147483671" r:id="rId11"/>
-    <p:sldLayoutId id="2147483672" r:id="rId12"/>
-    <p:sldLayoutId id="2147483673" r:id="rId13"/>
-    <p:sldLayoutId id="2147483674" r:id="rId14"/>
-    <p:sldLayoutId id="2147483675" r:id="rId15"/>
-    <p:sldLayoutId id="2147483676" r:id="rId16"/>
-    <p:sldLayoutId id="2147483677" r:id="rId17"/>
-    <p:sldLayoutId id="2147483678" r:id="rId18"/>
-    <p:sldLayoutId id="2147483679" r:id="rId19"/>
-    <p:sldLayoutId id="2147483680" r:id="rId20"/>
-    <p:sldLayoutId id="2147483681" r:id="rId21"/>
-    <p:sldLayoutId id="2147483682" r:id="rId22"/>
-    <p:sldLayoutId id="2147483683" r:id="rId23"/>
-    <p:sldLayoutId id="2147483684" r:id="rId24"/>
-    <p:sldLayoutId id="2147483685" r:id="rId25"/>
-    <p:sldLayoutId id="2147483686" r:id="rId26"/>
-    <p:sldLayoutId id="2147483687" r:id="rId27"/>
+    <p:sldLayoutId r:id="rId10"/>
+    <p:sldLayoutId r:id="rId11"/>
+    <p:sldLayoutId r:id="rId12"/>
+    <p:sldLayoutId r:id="rId13"/>
+    <p:sldLayoutId r:id="rId14"/>
+    <p:sldLayoutId r:id="rId15"/>
+    <p:sldLayoutId r:id="rId16"/>
+    <p:sldLayoutId r:id="rId17"/>
+    <p:sldLayoutId r:id="rId18"/>
+    <p:sldLayoutId r:id="rId19"/>
+    <p:sldLayoutId r:id="rId20"/>
+    <p:sldLayoutId r:id="rId21"/>
+    <p:sldLayoutId r:id="rId22"/>
+    <p:sldLayoutId r:id="rId23"/>
+    <p:sldLayoutId r:id="rId24"/>
+    <p:sldLayoutId r:id="rId25"/>
+    <p:sldLayoutId r:id="rId26"/>
+    <p:sldLayoutId r:id="rId27"/>
+    <p:sldLayoutId r:id="rId28"/>
+    <p:sldLayoutId r:id="rId29"/>
+    <p:sldLayoutId r:id="rId30"/>
+    <p:sldLayoutId r:id="rId31"/>
+    <p:sldLayoutId r:id="rId32"/>
+    <p:sldLayoutId r:id="rId33"/>
+    <p:sldLayoutId r:id="rId34"/>
+    <p:sldLayoutId r:id="rId35"/>
+    <p:sldLayoutId r:id="rId36"/>
   </p:sldLayoutIdLst>
   <p:timing>
     <p:tnLst>
@@ -47144,7 +47144,7 @@
 </file>
 
 <file path=ppt/theme/theme2.xml><?xml version="1.0" encoding="utf-8"?>
-<a:theme xmlns:a="http://schemas.openxmlformats.org/drawingml/2006/main" name="FF2016">
+<a:theme xmlns:a="http://schemas.openxmlformats.org/drawingml/2006/main" name="FF2015">
   <a:themeElements>
     <a:clrScheme name="FFIX2014">
       <a:dk1>
@@ -47480,301 +47480,6 @@
 </a:theme>
 </file>
 
-<file path=ppt/theme/theme3.xml><?xml version="1.0" encoding="utf-8"?>
-<a:theme xmlns:a="http://schemas.openxmlformats.org/drawingml/2006/main" name="Office Theme">
-  <a:themeElements>
-    <a:clrScheme name="Office">
-      <a:dk1>
-        <a:sysClr val="windowText" lastClr="000000"/>
-      </a:dk1>
-      <a:lt1>
-        <a:sysClr val="window" lastClr="FFFFFF"/>
-      </a:lt1>
-      <a:dk2>
-        <a:srgbClr val="44546A"/>
-      </a:dk2>
-      <a:lt2>
-        <a:srgbClr val="E7E6E6"/>
-      </a:lt2>
-      <a:accent1>
-        <a:srgbClr val="5B9BD5"/>
-      </a:accent1>
-      <a:accent2>
-        <a:srgbClr val="ED7D31"/>
-      </a:accent2>
-      <a:accent3>
-        <a:srgbClr val="A5A5A5"/>
-      </a:accent3>
-      <a:accent4>
-        <a:srgbClr val="FFC000"/>
-      </a:accent4>
-      <a:accent5>
-        <a:srgbClr val="4472C4"/>
-      </a:accent5>
-      <a:accent6>
-        <a:srgbClr val="70AD47"/>
-      </a:accent6>
-      <a:hlink>
-        <a:srgbClr val="0563C1"/>
-      </a:hlink>
-      <a:folHlink>
-        <a:srgbClr val="954F72"/>
-      </a:folHlink>
-    </a:clrScheme>
-    <a:fontScheme name="Office">
-      <a:majorFont>
-        <a:latin typeface="Calibri Light" panose="020F0302020204030204"/>
-        <a:ea typeface=""/>
-        <a:cs typeface=""/>
-        <a:font script="Jpan" typeface="游ゴシック Light"/>
-        <a:font script="Hang" typeface="맑은 고딕"/>
-        <a:font script="Hans" typeface="等线 Light"/>
-        <a:font script="Hant" typeface="新細明體"/>
-        <a:font script="Arab" typeface="Times New Roman"/>
-        <a:font script="Hebr" typeface="Times New Roman"/>
-        <a:font script="Thai" typeface="Angsana New"/>
-        <a:font script="Ethi" typeface="Nyala"/>
-        <a:font script="Beng" typeface="Vrinda"/>
-        <a:font script="Gujr" typeface="Shruti"/>
-        <a:font script="Khmr" typeface="MoolBoran"/>
-        <a:font script="Knda" typeface="Tunga"/>
-        <a:font script="Guru" typeface="Raavi"/>
-        <a:font script="Cans" typeface="Euphemia"/>
-        <a:font script="Cher" typeface="Plantagenet Cherokee"/>
-        <a:font script="Yiii" typeface="Microsoft Yi Baiti"/>
-        <a:font script="Tibt" typeface="Microsoft Himalaya"/>
-        <a:font script="Thaa" typeface="MV Boli"/>
-        <a:font script="Deva" typeface="Mangal"/>
-        <a:font script="Telu" typeface="Gautami"/>
-        <a:font script="Taml" typeface="Latha"/>
-        <a:font script="Syrc" typeface="Estrangelo Edessa"/>
-        <a:font script="Orya" typeface="Kalinga"/>
-        <a:font script="Mlym" typeface="Kartika"/>
-        <a:font script="Laoo" typeface="DokChampa"/>
-        <a:font script="Sinh" typeface="Iskoola Pota"/>
-        <a:font script="Mong" typeface="Mongolian Baiti"/>
-        <a:font script="Viet" typeface="Times New Roman"/>
-        <a:font script="Uigh" typeface="Microsoft Uighur"/>
-        <a:font script="Geor" typeface="Sylfaen"/>
-        <a:font script="Armn" typeface="Arial"/>
-        <a:font script="Bugi" typeface="Leelawadee UI"/>
-        <a:font script="Bopo" typeface="Microsoft JhengHei"/>
-        <a:font script="Java" typeface="Javanese Text"/>
-        <a:font script="Lisu" typeface="Segoe UI"/>
-        <a:font script="Mymr" typeface="Myanmar Text"/>
-        <a:font script="Nkoo" typeface="Ebrima"/>
-        <a:font script="Olck" typeface="Nirmala UI"/>
-        <a:font script="Osma" typeface="Ebrima"/>
-        <a:font script="Phag" typeface="Phagspa"/>
-        <a:font script="Syrn" typeface="Estrangelo Edessa"/>
-        <a:font script="Syrj" typeface="Estrangelo Edessa"/>
-        <a:font script="Syre" typeface="Estrangelo Edessa"/>
-        <a:font script="Sora" typeface="Nirmala UI"/>
-        <a:font script="Tale" typeface="Microsoft Tai Le"/>
-        <a:font script="Talu" typeface="Microsoft New Tai Lue"/>
-        <a:font script="Tfng" typeface="Ebrima"/>
-      </a:majorFont>
-      <a:minorFont>
-        <a:latin typeface="Calibri" panose="020F0502020204030204"/>
-        <a:ea typeface=""/>
-        <a:cs typeface=""/>
-        <a:font script="Jpan" typeface="游ゴシック"/>
-        <a:font script="Hang" typeface="맑은 고딕"/>
-        <a:font script="Hans" typeface="等线"/>
-        <a:font script="Hant" typeface="新細明體"/>
-        <a:font script="Arab" typeface="Arial"/>
-        <a:font script="Hebr" typeface="Arial"/>
-        <a:font script="Thai" typeface="Cordia New"/>
-        <a:font script="Ethi" typeface="Nyala"/>
-        <a:font script="Beng" typeface="Vrinda"/>
-        <a:font script="Gujr" typeface="Shruti"/>
-        <a:font script="Khmr" typeface="DaunPenh"/>
-        <a:font script="Knda" typeface="Tunga"/>
-        <a:font script="Guru" typeface="Raavi"/>
-        <a:font script="Cans" typeface="Euphemia"/>
-        <a:font script="Cher" typeface="Plantagenet Cherokee"/>
-        <a:font script="Yiii" typeface="Microsoft Yi Baiti"/>
-        <a:font script="Tibt" typeface="Microsoft Himalaya"/>
-        <a:font script="Thaa" typeface="MV Boli"/>
-        <a:font script="Deva" typeface="Mangal"/>
-        <a:font script="Telu" typeface="Gautami"/>
-        <a:font script="Taml" typeface="Latha"/>
-        <a:font script="Syrc" typeface="Estrangelo Edessa"/>
-        <a:font script="Orya" typeface="Kalinga"/>
-        <a:font script="Mlym" typeface="Kartika"/>
-        <a:font script="Laoo" typeface="DokChampa"/>
-        <a:font script="Sinh" typeface="Iskoola Pota"/>
-        <a:font script="Mong" typeface="Mongolian Baiti"/>
-        <a:font script="Viet" typeface="Arial"/>
-        <a:font script="Uigh" typeface="Microsoft Uighur"/>
-        <a:font script="Geor" typeface="Sylfaen"/>
-        <a:font script="Armn" typeface="Arial"/>
-        <a:font script="Bugi" typeface="Leelawadee UI"/>
-        <a:font script="Bopo" typeface="Microsoft JhengHei"/>
-        <a:font script="Java" typeface="Javanese Text"/>
-        <a:font script="Lisu" typeface="Segoe UI"/>
-        <a:font script="Mymr" typeface="Myanmar Text"/>
-        <a:font script="Nkoo" typeface="Ebrima"/>
-        <a:font script="Olck" typeface="Nirmala UI"/>
-        <a:font script="Osma" typeface="Ebrima"/>
-        <a:font script="Phag" typeface="Phagspa"/>
-        <a:font script="Syrn" typeface="Estrangelo Edessa"/>
-        <a:font script="Syrj" typeface="Estrangelo Edessa"/>
-        <a:font script="Syre" typeface="Estrangelo Edessa"/>
-        <a:font script="Sora" typeface="Nirmala UI"/>
-        <a:font script="Tale" typeface="Microsoft Tai Le"/>
-        <a:font script="Talu" typeface="Microsoft New Tai Lue"/>
-        <a:font script="Tfng" typeface="Ebrima"/>
-      </a:minorFont>
-    </a:fontScheme>
-    <a:fmtScheme name="Office">
-      <a:fillStyleLst>
-        <a:solidFill>
-          <a:schemeClr val="phClr"/>
-        </a:solidFill>
-        <a:gradFill rotWithShape="1">
-          <a:gsLst>
-            <a:gs pos="0">
-              <a:schemeClr val="phClr">
-                <a:lumMod val="110000"/>
-                <a:satMod val="105000"/>
-                <a:tint val="67000"/>
-              </a:schemeClr>
-            </a:gs>
-            <a:gs pos="50000">
-              <a:schemeClr val="phClr">
-                <a:lumMod val="105000"/>
-                <a:satMod val="103000"/>
-                <a:tint val="73000"/>
-              </a:schemeClr>
-            </a:gs>
-            <a:gs pos="100000">
-              <a:schemeClr val="phClr">
-                <a:lumMod val="105000"/>
-                <a:satMod val="109000"/>
-                <a:tint val="81000"/>
-              </a:schemeClr>
-            </a:gs>
-          </a:gsLst>
-          <a:lin ang="5400000" scaled="0"/>
-        </a:gradFill>
-        <a:gradFill rotWithShape="1">
-          <a:gsLst>
-            <a:gs pos="0">
-              <a:schemeClr val="phClr">
-                <a:satMod val="103000"/>
-                <a:lumMod val="102000"/>
-                <a:tint val="94000"/>
-              </a:schemeClr>
-            </a:gs>
-            <a:gs pos="50000">
-              <a:schemeClr val="phClr">
-                <a:satMod val="110000"/>
-                <a:lumMod val="100000"/>
-                <a:shade val="100000"/>
-              </a:schemeClr>
-            </a:gs>
-            <a:gs pos="100000">
-              <a:schemeClr val="phClr">
-                <a:lumMod val="99000"/>
-                <a:satMod val="120000"/>
-                <a:shade val="78000"/>
-              </a:schemeClr>
-            </a:gs>
-          </a:gsLst>
-          <a:lin ang="5400000" scaled="0"/>
-        </a:gradFill>
-      </a:fillStyleLst>
-      <a:lnStyleLst>
-        <a:ln w="6350" cap="flat" cmpd="sng" algn="ctr">
-          <a:solidFill>
-            <a:schemeClr val="phClr"/>
-          </a:solidFill>
-          <a:prstDash val="solid"/>
-          <a:miter lim="800000"/>
-        </a:ln>
-        <a:ln w="12700" cap="flat" cmpd="sng" algn="ctr">
-          <a:solidFill>
-            <a:schemeClr val="phClr"/>
-          </a:solidFill>
-          <a:prstDash val="solid"/>
-          <a:miter lim="800000"/>
-        </a:ln>
-        <a:ln w="19050" cap="flat" cmpd="sng" algn="ctr">
-          <a:solidFill>
-            <a:schemeClr val="phClr"/>
-          </a:solidFill>
-          <a:prstDash val="solid"/>
-          <a:miter lim="800000"/>
-        </a:ln>
-      </a:lnStyleLst>
-      <a:effectStyleLst>
-        <a:effectStyle>
-          <a:effectLst/>
-        </a:effectStyle>
-        <a:effectStyle>
-          <a:effectLst/>
-        </a:effectStyle>
-        <a:effectStyle>
-          <a:effectLst>
-            <a:outerShdw blurRad="57150" dist="19050" dir="5400000" algn="ctr" rotWithShape="0">
-              <a:srgbClr val="000000">
-                <a:alpha val="63000"/>
-              </a:srgbClr>
-            </a:outerShdw>
-          </a:effectLst>
-        </a:effectStyle>
-      </a:effectStyleLst>
-      <a:bgFillStyleLst>
-        <a:solidFill>
-          <a:schemeClr val="phClr"/>
-        </a:solidFill>
-        <a:solidFill>
-          <a:schemeClr val="phClr">
-            <a:tint val="95000"/>
-            <a:satMod val="170000"/>
-          </a:schemeClr>
-        </a:solidFill>
-        <a:gradFill rotWithShape="1">
-          <a:gsLst>
-            <a:gs pos="0">
-              <a:schemeClr val="phClr">
-                <a:tint val="93000"/>
-                <a:satMod val="150000"/>
-                <a:shade val="98000"/>
-                <a:lumMod val="102000"/>
-              </a:schemeClr>
-            </a:gs>
-            <a:gs pos="50000">
-              <a:schemeClr val="phClr">
-                <a:tint val="98000"/>
-                <a:satMod val="130000"/>
-                <a:shade val="90000"/>
-                <a:lumMod val="103000"/>
-              </a:schemeClr>
-            </a:gs>
-            <a:gs pos="100000">
-              <a:schemeClr val="phClr">
-                <a:shade val="63000"/>
-                <a:satMod val="120000"/>
-              </a:schemeClr>
-            </a:gs>
-          </a:gsLst>
-          <a:lin ang="5400000" scaled="0"/>
-        </a:gradFill>
-      </a:bgFillStyleLst>
-    </a:fmtScheme>
-  </a:themeElements>
-  <a:objectDefaults/>
-  <a:extraClrSchemeLst/>
-  <a:extLst>
-    <a:ext uri="{05A4C25C-085E-4340-85A3-A5531E510DB2}">
-      <thm15:themeFamily xmlns:thm15="http://schemas.microsoft.com/office/thememl/2012/main" name="Office Theme" id="{62F939B6-93AF-4DB8-9C6B-D6C7DFDC589F}" vid="{4A3C46E8-61CC-4603-A589-7422A47A8E4A}"/>
-    </a:ext>
-  </a:extLst>
-</a:theme>
-</file>
-
 <file path=customXml/item1.xml><?xml version="1.0" encoding="utf-8"?>
 <ct:contentTypeSchema xmlns:ct="http://schemas.microsoft.com/office/2006/metadata/contentType" xmlns:ma="http://schemas.microsoft.com/office/2006/metadata/properties/metaAttributes" ct:_="" ma:_="" ma:contentTypeName="Document" ma:contentTypeID="0x01010031D6908C9706DC43861724EF3F858898" ma:contentTypeVersion="0" ma:contentTypeDescription="Create a new document." ma:contentTypeScope="" ma:versionID="39b2408c7959e603139a5c954a71cf55">
   <xsd:schema xmlns:xsd="http://www.w3.org/2001/XMLSchema" xmlns:p="http://schemas.microsoft.com/office/2006/metadata/properties" targetNamespace="http://schemas.microsoft.com/office/2006/metadata/properties" ma:root="true" ma:fieldsID="2d9ac0e344db50f433fcb122b5d6bd0c">

</xml_diff>